<commit_message>
[NOBTS] add new architecture doc.
</commit_message>
<xml_diff>
--- a/docs/ngrinder_system_architecture.pptx
+++ b/docs/ngrinder_system_architecture.pptx
@@ -6,6 +6,8 @@
   </p:sldMasterIdLst>
   <p:sldIdLst>
     <p:sldId id="258" r:id="rId2"/>
+    <p:sldId id="259" r:id="rId3"/>
+    <p:sldId id="260" r:id="rId4"/>
   </p:sldIdLst>
   <p:sldSz cx="9144000" cy="6858000" type="screen4x3"/>
   <p:notesSz cx="6858000" cy="9144000"/>
@@ -288,7 +290,8 @@
           <a:p>
             <a:fld id="{26036BE6-1911-40BC-AA55-6B3310415E80}" type="datetimeFigureOut">
               <a:rPr lang="ko-KR" altLang="en-US" smtClean="0"/>
-              <a:t>2012-10-08</a:t>
+              <a:pPr/>
+              <a:t>2012-11-23</a:t>
             </a:fld>
             <a:endParaRPr lang="ko-KR" altLang="en-US"/>
           </a:p>
@@ -330,6 +333,7 @@
           <a:p>
             <a:fld id="{36464287-23A2-4A10-9573-4CAF11A22EAF}" type="slidenum">
               <a:rPr lang="ko-KR" altLang="en-US" smtClean="0"/>
+              <a:pPr/>
               <a:t>‹#›</a:t>
             </a:fld>
             <a:endParaRPr lang="ko-KR" altLang="en-US"/>
@@ -339,7 +343,7 @@
     </p:spTree>
     <p:extLst>
       <p:ext uri="{BB962C8B-B14F-4D97-AF65-F5344CB8AC3E}">
-        <p14:creationId xmlns:p14="http://schemas.microsoft.com/office/powerpoint/2010/main" val="3077336313"/>
+        <p14:creationId xmlns:p14="http://schemas.microsoft.com/office/powerpoint/2010/main" xmlns="" val="3077336313"/>
       </p:ext>
     </p:extLst>
   </p:cSld>
@@ -458,7 +462,8 @@
           <a:p>
             <a:fld id="{26036BE6-1911-40BC-AA55-6B3310415E80}" type="datetimeFigureOut">
               <a:rPr lang="ko-KR" altLang="en-US" smtClean="0"/>
-              <a:t>2012-10-08</a:t>
+              <a:pPr/>
+              <a:t>2012-11-23</a:t>
             </a:fld>
             <a:endParaRPr lang="ko-KR" altLang="en-US"/>
           </a:p>
@@ -500,6 +505,7 @@
           <a:p>
             <a:fld id="{36464287-23A2-4A10-9573-4CAF11A22EAF}" type="slidenum">
               <a:rPr lang="ko-KR" altLang="en-US" smtClean="0"/>
+              <a:pPr/>
               <a:t>‹#›</a:t>
             </a:fld>
             <a:endParaRPr lang="ko-KR" altLang="en-US"/>
@@ -509,7 +515,7 @@
     </p:spTree>
     <p:extLst>
       <p:ext uri="{BB962C8B-B14F-4D97-AF65-F5344CB8AC3E}">
-        <p14:creationId xmlns:p14="http://schemas.microsoft.com/office/powerpoint/2010/main" val="2152157510"/>
+        <p14:creationId xmlns:p14="http://schemas.microsoft.com/office/powerpoint/2010/main" xmlns="" val="2152157510"/>
       </p:ext>
     </p:extLst>
   </p:cSld>
@@ -638,7 +644,8 @@
           <a:p>
             <a:fld id="{26036BE6-1911-40BC-AA55-6B3310415E80}" type="datetimeFigureOut">
               <a:rPr lang="ko-KR" altLang="en-US" smtClean="0"/>
-              <a:t>2012-10-08</a:t>
+              <a:pPr/>
+              <a:t>2012-11-23</a:t>
             </a:fld>
             <a:endParaRPr lang="ko-KR" altLang="en-US"/>
           </a:p>
@@ -680,6 +687,7 @@
           <a:p>
             <a:fld id="{36464287-23A2-4A10-9573-4CAF11A22EAF}" type="slidenum">
               <a:rPr lang="ko-KR" altLang="en-US" smtClean="0"/>
+              <a:pPr/>
               <a:t>‹#›</a:t>
             </a:fld>
             <a:endParaRPr lang="ko-KR" altLang="en-US"/>
@@ -689,7 +697,7 @@
     </p:spTree>
     <p:extLst>
       <p:ext uri="{BB962C8B-B14F-4D97-AF65-F5344CB8AC3E}">
-        <p14:creationId xmlns:p14="http://schemas.microsoft.com/office/powerpoint/2010/main" val="1010425084"/>
+        <p14:creationId xmlns:p14="http://schemas.microsoft.com/office/powerpoint/2010/main" xmlns="" val="1010425084"/>
       </p:ext>
     </p:extLst>
   </p:cSld>
@@ -808,7 +816,8 @@
           <a:p>
             <a:fld id="{26036BE6-1911-40BC-AA55-6B3310415E80}" type="datetimeFigureOut">
               <a:rPr lang="ko-KR" altLang="en-US" smtClean="0"/>
-              <a:t>2012-10-08</a:t>
+              <a:pPr/>
+              <a:t>2012-11-23</a:t>
             </a:fld>
             <a:endParaRPr lang="ko-KR" altLang="en-US"/>
           </a:p>
@@ -850,6 +859,7 @@
           <a:p>
             <a:fld id="{36464287-23A2-4A10-9573-4CAF11A22EAF}" type="slidenum">
               <a:rPr lang="ko-KR" altLang="en-US" smtClean="0"/>
+              <a:pPr/>
               <a:t>‹#›</a:t>
             </a:fld>
             <a:endParaRPr lang="ko-KR" altLang="en-US"/>
@@ -859,7 +869,7 @@
     </p:spTree>
     <p:extLst>
       <p:ext uri="{BB962C8B-B14F-4D97-AF65-F5344CB8AC3E}">
-        <p14:creationId xmlns:p14="http://schemas.microsoft.com/office/powerpoint/2010/main" val="719456391"/>
+        <p14:creationId xmlns:p14="http://schemas.microsoft.com/office/powerpoint/2010/main" xmlns="" val="719456391"/>
       </p:ext>
     </p:extLst>
   </p:cSld>
@@ -1054,7 +1064,8 @@
           <a:p>
             <a:fld id="{26036BE6-1911-40BC-AA55-6B3310415E80}" type="datetimeFigureOut">
               <a:rPr lang="ko-KR" altLang="en-US" smtClean="0"/>
-              <a:t>2012-10-08</a:t>
+              <a:pPr/>
+              <a:t>2012-11-23</a:t>
             </a:fld>
             <a:endParaRPr lang="ko-KR" altLang="en-US"/>
           </a:p>
@@ -1096,6 +1107,7 @@
           <a:p>
             <a:fld id="{36464287-23A2-4A10-9573-4CAF11A22EAF}" type="slidenum">
               <a:rPr lang="ko-KR" altLang="en-US" smtClean="0"/>
+              <a:pPr/>
               <a:t>‹#›</a:t>
             </a:fld>
             <a:endParaRPr lang="ko-KR" altLang="en-US"/>
@@ -1105,7 +1117,7 @@
     </p:spTree>
     <p:extLst>
       <p:ext uri="{BB962C8B-B14F-4D97-AF65-F5344CB8AC3E}">
-        <p14:creationId xmlns:p14="http://schemas.microsoft.com/office/powerpoint/2010/main" val="2546602862"/>
+        <p14:creationId xmlns:p14="http://schemas.microsoft.com/office/powerpoint/2010/main" xmlns="" val="2546602862"/>
       </p:ext>
     </p:extLst>
   </p:cSld>
@@ -1342,7 +1354,8 @@
           <a:p>
             <a:fld id="{26036BE6-1911-40BC-AA55-6B3310415E80}" type="datetimeFigureOut">
               <a:rPr lang="ko-KR" altLang="en-US" smtClean="0"/>
-              <a:t>2012-10-08</a:t>
+              <a:pPr/>
+              <a:t>2012-11-23</a:t>
             </a:fld>
             <a:endParaRPr lang="ko-KR" altLang="en-US"/>
           </a:p>
@@ -1384,6 +1397,7 @@
           <a:p>
             <a:fld id="{36464287-23A2-4A10-9573-4CAF11A22EAF}" type="slidenum">
               <a:rPr lang="ko-KR" altLang="en-US" smtClean="0"/>
+              <a:pPr/>
               <a:t>‹#›</a:t>
             </a:fld>
             <a:endParaRPr lang="ko-KR" altLang="en-US"/>
@@ -1393,7 +1407,7 @@
     </p:spTree>
     <p:extLst>
       <p:ext uri="{BB962C8B-B14F-4D97-AF65-F5344CB8AC3E}">
-        <p14:creationId xmlns:p14="http://schemas.microsoft.com/office/powerpoint/2010/main" val="3089458713"/>
+        <p14:creationId xmlns:p14="http://schemas.microsoft.com/office/powerpoint/2010/main" xmlns="" val="3089458713"/>
       </p:ext>
     </p:extLst>
   </p:cSld>
@@ -1764,7 +1778,8 @@
           <a:p>
             <a:fld id="{26036BE6-1911-40BC-AA55-6B3310415E80}" type="datetimeFigureOut">
               <a:rPr lang="ko-KR" altLang="en-US" smtClean="0"/>
-              <a:t>2012-10-08</a:t>
+              <a:pPr/>
+              <a:t>2012-11-23</a:t>
             </a:fld>
             <a:endParaRPr lang="ko-KR" altLang="en-US"/>
           </a:p>
@@ -1806,6 +1821,7 @@
           <a:p>
             <a:fld id="{36464287-23A2-4A10-9573-4CAF11A22EAF}" type="slidenum">
               <a:rPr lang="ko-KR" altLang="en-US" smtClean="0"/>
+              <a:pPr/>
               <a:t>‹#›</a:t>
             </a:fld>
             <a:endParaRPr lang="ko-KR" altLang="en-US"/>
@@ -1815,7 +1831,7 @@
     </p:spTree>
     <p:extLst>
       <p:ext uri="{BB962C8B-B14F-4D97-AF65-F5344CB8AC3E}">
-        <p14:creationId xmlns:p14="http://schemas.microsoft.com/office/powerpoint/2010/main" val="2473760828"/>
+        <p14:creationId xmlns:p14="http://schemas.microsoft.com/office/powerpoint/2010/main" xmlns="" val="2473760828"/>
       </p:ext>
     </p:extLst>
   </p:cSld>
@@ -1882,7 +1898,8 @@
           <a:p>
             <a:fld id="{26036BE6-1911-40BC-AA55-6B3310415E80}" type="datetimeFigureOut">
               <a:rPr lang="ko-KR" altLang="en-US" smtClean="0"/>
-              <a:t>2012-10-08</a:t>
+              <a:pPr/>
+              <a:t>2012-11-23</a:t>
             </a:fld>
             <a:endParaRPr lang="ko-KR" altLang="en-US"/>
           </a:p>
@@ -1924,6 +1941,7 @@
           <a:p>
             <a:fld id="{36464287-23A2-4A10-9573-4CAF11A22EAF}" type="slidenum">
               <a:rPr lang="ko-KR" altLang="en-US" smtClean="0"/>
+              <a:pPr/>
               <a:t>‹#›</a:t>
             </a:fld>
             <a:endParaRPr lang="ko-KR" altLang="en-US"/>
@@ -1933,7 +1951,7 @@
     </p:spTree>
     <p:extLst>
       <p:ext uri="{BB962C8B-B14F-4D97-AF65-F5344CB8AC3E}">
-        <p14:creationId xmlns:p14="http://schemas.microsoft.com/office/powerpoint/2010/main" val="934617496"/>
+        <p14:creationId xmlns:p14="http://schemas.microsoft.com/office/powerpoint/2010/main" xmlns="" val="934617496"/>
       </p:ext>
     </p:extLst>
   </p:cSld>
@@ -1977,7 +1995,8 @@
           <a:p>
             <a:fld id="{26036BE6-1911-40BC-AA55-6B3310415E80}" type="datetimeFigureOut">
               <a:rPr lang="ko-KR" altLang="en-US" smtClean="0"/>
-              <a:t>2012-10-08</a:t>
+              <a:pPr/>
+              <a:t>2012-11-23</a:t>
             </a:fld>
             <a:endParaRPr lang="ko-KR" altLang="en-US"/>
           </a:p>
@@ -2019,6 +2038,7 @@
           <a:p>
             <a:fld id="{36464287-23A2-4A10-9573-4CAF11A22EAF}" type="slidenum">
               <a:rPr lang="ko-KR" altLang="en-US" smtClean="0"/>
+              <a:pPr/>
               <a:t>‹#›</a:t>
             </a:fld>
             <a:endParaRPr lang="ko-KR" altLang="en-US"/>
@@ -2028,7 +2048,7 @@
     </p:spTree>
     <p:extLst>
       <p:ext uri="{BB962C8B-B14F-4D97-AF65-F5344CB8AC3E}">
-        <p14:creationId xmlns:p14="http://schemas.microsoft.com/office/powerpoint/2010/main" val="3007388380"/>
+        <p14:creationId xmlns:p14="http://schemas.microsoft.com/office/powerpoint/2010/main" xmlns="" val="3007388380"/>
       </p:ext>
     </p:extLst>
   </p:cSld>
@@ -2254,7 +2274,8 @@
           <a:p>
             <a:fld id="{26036BE6-1911-40BC-AA55-6B3310415E80}" type="datetimeFigureOut">
               <a:rPr lang="ko-KR" altLang="en-US" smtClean="0"/>
-              <a:t>2012-10-08</a:t>
+              <a:pPr/>
+              <a:t>2012-11-23</a:t>
             </a:fld>
             <a:endParaRPr lang="ko-KR" altLang="en-US"/>
           </a:p>
@@ -2296,6 +2317,7 @@
           <a:p>
             <a:fld id="{36464287-23A2-4A10-9573-4CAF11A22EAF}" type="slidenum">
               <a:rPr lang="ko-KR" altLang="en-US" smtClean="0"/>
+              <a:pPr/>
               <a:t>‹#›</a:t>
             </a:fld>
             <a:endParaRPr lang="ko-KR" altLang="en-US"/>
@@ -2305,7 +2327,7 @@
     </p:spTree>
     <p:extLst>
       <p:ext uri="{BB962C8B-B14F-4D97-AF65-F5344CB8AC3E}">
-        <p14:creationId xmlns:p14="http://schemas.microsoft.com/office/powerpoint/2010/main" val="3155733758"/>
+        <p14:creationId xmlns:p14="http://schemas.microsoft.com/office/powerpoint/2010/main" xmlns="" val="3155733758"/>
       </p:ext>
     </p:extLst>
   </p:cSld>
@@ -2507,7 +2529,8 @@
           <a:p>
             <a:fld id="{26036BE6-1911-40BC-AA55-6B3310415E80}" type="datetimeFigureOut">
               <a:rPr lang="ko-KR" altLang="en-US" smtClean="0"/>
-              <a:t>2012-10-08</a:t>
+              <a:pPr/>
+              <a:t>2012-11-23</a:t>
             </a:fld>
             <a:endParaRPr lang="ko-KR" altLang="en-US"/>
           </a:p>
@@ -2549,6 +2572,7 @@
           <a:p>
             <a:fld id="{36464287-23A2-4A10-9573-4CAF11A22EAF}" type="slidenum">
               <a:rPr lang="ko-KR" altLang="en-US" smtClean="0"/>
+              <a:pPr/>
               <a:t>‹#›</a:t>
             </a:fld>
             <a:endParaRPr lang="ko-KR" altLang="en-US"/>
@@ -2558,7 +2582,7 @@
     </p:spTree>
     <p:extLst>
       <p:ext uri="{BB962C8B-B14F-4D97-AF65-F5344CB8AC3E}">
-        <p14:creationId xmlns:p14="http://schemas.microsoft.com/office/powerpoint/2010/main" val="1191744711"/>
+        <p14:creationId xmlns:p14="http://schemas.microsoft.com/office/powerpoint/2010/main" xmlns="" val="1191744711"/>
       </p:ext>
     </p:extLst>
   </p:cSld>
@@ -2720,7 +2744,8 @@
           <a:p>
             <a:fld id="{26036BE6-1911-40BC-AA55-6B3310415E80}" type="datetimeFigureOut">
               <a:rPr lang="ko-KR" altLang="en-US" smtClean="0"/>
-              <a:t>2012-10-08</a:t>
+              <a:pPr/>
+              <a:t>2012-11-23</a:t>
             </a:fld>
             <a:endParaRPr lang="ko-KR" altLang="en-US"/>
           </a:p>
@@ -2798,6 +2823,7 @@
           <a:p>
             <a:fld id="{36464287-23A2-4A10-9573-4CAF11A22EAF}" type="slidenum">
               <a:rPr lang="ko-KR" altLang="en-US" smtClean="0"/>
+              <a:pPr/>
               <a:t>‹#›</a:t>
             </a:fld>
             <a:endParaRPr lang="ko-KR" altLang="en-US"/>
@@ -2807,7 +2833,7 @@
     </p:spTree>
     <p:extLst>
       <p:ext uri="{BB962C8B-B14F-4D97-AF65-F5344CB8AC3E}">
-        <p14:creationId xmlns:p14="http://schemas.microsoft.com/office/powerpoint/2010/main" val="487819654"/>
+        <p14:creationId xmlns:p14="http://schemas.microsoft.com/office/powerpoint/2010/main" xmlns="" val="487819654"/>
       </p:ext>
     </p:extLst>
   </p:cSld>
@@ -4855,7 +4881,7 @@
           <a:blip r:embed="rId2" cstate="print">
             <a:extLst>
               <a:ext uri="{28A0092B-C50C-407E-A947-70E740481C1C}">
-                <a14:useLocalDpi xmlns:a14="http://schemas.microsoft.com/office/drawing/2010/main" val="0"/>
+                <a14:useLocalDpi xmlns:a14="http://schemas.microsoft.com/office/drawing/2010/main" xmlns="" val="0"/>
               </a:ext>
             </a:extLst>
           </a:blip>
@@ -4875,7 +4901,7 @@
           <a:noFill/>
           <a:extLst>
             <a:ext uri="{909E8E84-426E-40DD-AFC4-6F175D3DCCD1}">
-              <a14:hiddenFill xmlns:a14="http://schemas.microsoft.com/office/drawing/2010/main">
+              <a14:hiddenFill xmlns:a14="http://schemas.microsoft.com/office/drawing/2010/main" xmlns="">
                 <a:solidFill>
                   <a:srgbClr val="FFFFFF"/>
                 </a:solidFill>
@@ -4896,7 +4922,7 @@
           <a:blip r:embed="rId2" cstate="print">
             <a:extLst>
               <a:ext uri="{28A0092B-C50C-407E-A947-70E740481C1C}">
-                <a14:useLocalDpi xmlns:a14="http://schemas.microsoft.com/office/drawing/2010/main" val="0"/>
+                <a14:useLocalDpi xmlns:a14="http://schemas.microsoft.com/office/drawing/2010/main" xmlns="" val="0"/>
               </a:ext>
             </a:extLst>
           </a:blip>
@@ -4916,7 +4942,7 @@
           <a:noFill/>
           <a:extLst>
             <a:ext uri="{909E8E84-426E-40DD-AFC4-6F175D3DCCD1}">
-              <a14:hiddenFill xmlns:a14="http://schemas.microsoft.com/office/drawing/2010/main">
+              <a14:hiddenFill xmlns:a14="http://schemas.microsoft.com/office/drawing/2010/main" xmlns="">
                 <a:solidFill>
                   <a:srgbClr val="FFFFFF"/>
                 </a:solidFill>
@@ -4937,7 +4963,7 @@
           <a:blip r:embed="rId3" cstate="print">
             <a:extLst>
               <a:ext uri="{28A0092B-C50C-407E-A947-70E740481C1C}">
-                <a14:useLocalDpi xmlns:a14="http://schemas.microsoft.com/office/drawing/2010/main" val="0"/>
+                <a14:useLocalDpi xmlns:a14="http://schemas.microsoft.com/office/drawing/2010/main" xmlns="" val="0"/>
               </a:ext>
             </a:extLst>
           </a:blip>
@@ -4957,7 +4983,7 @@
           <a:noFill/>
           <a:extLst>
             <a:ext uri="{909E8E84-426E-40DD-AFC4-6F175D3DCCD1}">
-              <a14:hiddenFill xmlns:a14="http://schemas.microsoft.com/office/drawing/2010/main">
+              <a14:hiddenFill xmlns:a14="http://schemas.microsoft.com/office/drawing/2010/main" xmlns="">
                 <a:solidFill>
                   <a:srgbClr val="FFFFFF"/>
                 </a:solidFill>
@@ -4978,7 +5004,7 @@
           <a:blip r:embed="rId2" cstate="print">
             <a:extLst>
               <a:ext uri="{28A0092B-C50C-407E-A947-70E740481C1C}">
-                <a14:useLocalDpi xmlns:a14="http://schemas.microsoft.com/office/drawing/2010/main" val="0"/>
+                <a14:useLocalDpi xmlns:a14="http://schemas.microsoft.com/office/drawing/2010/main" xmlns="" val="0"/>
               </a:ext>
             </a:extLst>
           </a:blip>
@@ -4998,7 +5024,7 @@
           <a:noFill/>
           <a:extLst>
             <a:ext uri="{909E8E84-426E-40DD-AFC4-6F175D3DCCD1}">
-              <a14:hiddenFill xmlns:a14="http://schemas.microsoft.com/office/drawing/2010/main">
+              <a14:hiddenFill xmlns:a14="http://schemas.microsoft.com/office/drawing/2010/main" xmlns="">
                 <a:solidFill>
                   <a:srgbClr val="FFFFFF"/>
                 </a:solidFill>
@@ -5019,7 +5045,7 @@
           <a:blip r:embed="rId4" cstate="print">
             <a:extLst>
               <a:ext uri="{28A0092B-C50C-407E-A947-70E740481C1C}">
-                <a14:useLocalDpi xmlns:a14="http://schemas.microsoft.com/office/drawing/2010/main" val="0"/>
+                <a14:useLocalDpi xmlns:a14="http://schemas.microsoft.com/office/drawing/2010/main" xmlns="" val="0"/>
               </a:ext>
             </a:extLst>
           </a:blip>
@@ -5039,7 +5065,7 @@
           <a:noFill/>
           <a:extLst>
             <a:ext uri="{909E8E84-426E-40DD-AFC4-6F175D3DCCD1}">
-              <a14:hiddenFill xmlns:a14="http://schemas.microsoft.com/office/drawing/2010/main">
+              <a14:hiddenFill xmlns:a14="http://schemas.microsoft.com/office/drawing/2010/main" xmlns="">
                 <a:solidFill>
                   <a:srgbClr val="FFFFFF"/>
                 </a:solidFill>
@@ -5060,7 +5086,7 @@
           <a:blip r:embed="rId4" cstate="print">
             <a:extLst>
               <a:ext uri="{28A0092B-C50C-407E-A947-70E740481C1C}">
-                <a14:useLocalDpi xmlns:a14="http://schemas.microsoft.com/office/drawing/2010/main" val="0"/>
+                <a14:useLocalDpi xmlns:a14="http://schemas.microsoft.com/office/drawing/2010/main" xmlns="" val="0"/>
               </a:ext>
             </a:extLst>
           </a:blip>
@@ -5080,7 +5106,7 @@
           <a:noFill/>
           <a:extLst>
             <a:ext uri="{909E8E84-426E-40DD-AFC4-6F175D3DCCD1}">
-              <a14:hiddenFill xmlns:a14="http://schemas.microsoft.com/office/drawing/2010/main">
+              <a14:hiddenFill xmlns:a14="http://schemas.microsoft.com/office/drawing/2010/main" xmlns="">
                 <a:solidFill>
                   <a:srgbClr val="FFFFFF"/>
                 </a:solidFill>
@@ -5666,10 +5692,10 @@
           <p:nvPr/>
         </p:nvPicPr>
         <p:blipFill>
-          <a:blip r:embed="rId5">
+          <a:blip r:embed="rId5" cstate="print">
             <a:extLst>
               <a:ext uri="{28A0092B-C50C-407E-A947-70E740481C1C}">
-                <a14:useLocalDpi xmlns:a14="http://schemas.microsoft.com/office/drawing/2010/main" val="0"/>
+                <a14:useLocalDpi xmlns:a14="http://schemas.microsoft.com/office/drawing/2010/main" xmlns="" val="0"/>
               </a:ext>
             </a:extLst>
           </a:blip>
@@ -5689,7 +5715,7 @@
           <a:noFill/>
           <a:extLst>
             <a:ext uri="{909E8E84-426E-40DD-AFC4-6F175D3DCCD1}">
-              <a14:hiddenFill xmlns:a14="http://schemas.microsoft.com/office/drawing/2010/main">
+              <a14:hiddenFill xmlns:a14="http://schemas.microsoft.com/office/drawing/2010/main" xmlns="">
                 <a:solidFill>
                   <a:srgbClr val="FFFFFF"/>
                 </a:solidFill>
@@ -5706,8 +5732,8 @@
         </p:nvSpPr>
         <p:spPr>
           <a:xfrm>
-            <a:off x="2247900" y="78009"/>
-            <a:ext cx="4855417" cy="400110"/>
+            <a:off x="1828800" y="152400"/>
+            <a:ext cx="5295900" cy="523220"/>
           </a:xfrm>
           <a:prstGeom prst="rect">
             <a:avLst/>
@@ -5722,23 +5748,3283 @@
           <a:p>
             <a:pPr algn="ctr"/>
             <a:r>
-              <a:rPr lang="en-US" altLang="ko-KR" sz="2000" b="1" dirty="0" err="1" smtClean="0"/>
+              <a:rPr lang="en-US" altLang="ko-KR" sz="2800" b="1" dirty="0" err="1" smtClean="0">
+                <a:latin typeface="Arial" pitchFamily="34" charset="0"/>
+                <a:ea typeface="+mj-ea"/>
+                <a:cs typeface="Arial" pitchFamily="34" charset="0"/>
+              </a:rPr>
               <a:t>nGrinder</a:t>
             </a:r>
             <a:r>
               <a:rPr lang="en-US" altLang="ko-KR" sz="2000" b="1" dirty="0" smtClean="0"/>
-              <a:t> System Architecture</a:t>
-            </a:r>
-            <a:endParaRPr lang="ko-KR" altLang="en-US" sz="2000" b="1" dirty="0"/>
+              <a:t> </a:t>
+            </a:r>
+            <a:r>
+              <a:rPr lang="en-US" altLang="ko-KR" sz="2800" b="1" dirty="0" smtClean="0">
+                <a:latin typeface="Arial" pitchFamily="34" charset="0"/>
+                <a:ea typeface="+mj-ea"/>
+                <a:cs typeface="Arial" pitchFamily="34" charset="0"/>
+              </a:rPr>
+              <a:t>System Architecture</a:t>
+            </a:r>
+            <a:endParaRPr lang="ko-KR" altLang="en-US" sz="2800" b="1" dirty="0">
+              <a:latin typeface="Arial" pitchFamily="34" charset="0"/>
+              <a:ea typeface="+mj-ea"/>
+              <a:cs typeface="Arial" pitchFamily="34" charset="0"/>
+            </a:endParaRPr>
           </a:p>
         </p:txBody>
       </p:sp>
     </p:spTree>
     <p:extLst>
       <p:ext uri="{BB962C8B-B14F-4D97-AF65-F5344CB8AC3E}">
-        <p14:creationId xmlns:p14="http://schemas.microsoft.com/office/powerpoint/2010/main" val="1608807360"/>
+        <p14:creationId xmlns:p14="http://schemas.microsoft.com/office/powerpoint/2010/main" xmlns="" val="1608807360"/>
       </p:ext>
     </p:extLst>
+  </p:cSld>
+  <p:clrMapOvr>
+    <a:masterClrMapping/>
+  </p:clrMapOvr>
+</p:sld>
+</file>
+
+<file path=ppt/slides/slide2.xml><?xml version="1.0" encoding="utf-8"?>
+<p:sld xmlns:a="http://schemas.openxmlformats.org/drawingml/2006/main" xmlns:r="http://schemas.openxmlformats.org/officeDocument/2006/relationships" xmlns:p="http://schemas.openxmlformats.org/presentationml/2006/main">
+  <p:cSld>
+    <p:spTree>
+      <p:nvGrpSpPr>
+        <p:cNvPr id="1" name=""/>
+        <p:cNvGrpSpPr/>
+        <p:nvPr/>
+      </p:nvGrpSpPr>
+      <p:grpSpPr>
+        <a:xfrm>
+          <a:off x="0" y="0"/>
+          <a:ext cx="0" cy="0"/>
+          <a:chOff x="0" y="0"/>
+          <a:chExt cx="0" cy="0"/>
+        </a:xfrm>
+      </p:grpSpPr>
+      <p:sp>
+        <p:nvSpPr>
+          <p:cNvPr id="2" name="标题 1"/>
+          <p:cNvSpPr>
+            <a:spLocks noGrp="1"/>
+          </p:cNvSpPr>
+          <p:nvPr>
+            <p:ph type="title"/>
+          </p:nvPr>
+        </p:nvSpPr>
+        <p:spPr/>
+        <p:txBody>
+          <a:bodyPr>
+            <a:normAutofit/>
+          </a:bodyPr>
+          <a:lstStyle/>
+          <a:p>
+            <a:pPr algn="l"/>
+            <a:r>
+              <a:rPr lang="en-US" altLang="zh-CN" sz="2800" b="1" dirty="0" smtClean="0">
+                <a:latin typeface="Arial" pitchFamily="34" charset="0"/>
+                <a:cs typeface="Arial" pitchFamily="34" charset="0"/>
+              </a:rPr>
+              <a:t>nGrinder </a:t>
+            </a:r>
+            <a:r>
+              <a:rPr lang="en-US" altLang="zh-CN" sz="2800" b="1" dirty="0" smtClean="0">
+                <a:latin typeface="Arial" pitchFamily="34" charset="0"/>
+                <a:cs typeface="Arial" pitchFamily="34" charset="0"/>
+              </a:rPr>
+              <a:t>controller – </a:t>
+            </a:r>
+            <a:r>
+              <a:rPr lang="en-US" altLang="zh-CN" sz="2800" b="1" dirty="0" smtClean="0">
+                <a:latin typeface="Arial" pitchFamily="34" charset="0"/>
+                <a:cs typeface="Arial" pitchFamily="34" charset="0"/>
+              </a:rPr>
+              <a:t>before cluster</a:t>
+            </a:r>
+            <a:endParaRPr lang="zh-CN" altLang="en-US" sz="2800" b="1" dirty="0" smtClean="0">
+              <a:latin typeface="Arial" pitchFamily="34" charset="0"/>
+              <a:cs typeface="Arial" pitchFamily="34" charset="0"/>
+            </a:endParaRPr>
+          </a:p>
+        </p:txBody>
+      </p:sp>
+      <p:sp>
+        <p:nvSpPr>
+          <p:cNvPr id="5" name="矩形 4"/>
+          <p:cNvSpPr/>
+          <p:nvPr/>
+        </p:nvSpPr>
+        <p:spPr>
+          <a:xfrm>
+            <a:off x="2438400" y="5638800"/>
+            <a:ext cx="5562600" cy="914400"/>
+          </a:xfrm>
+          <a:prstGeom prst="rect">
+            <a:avLst/>
+          </a:prstGeom>
+          <a:ln>
+            <a:solidFill>
+              <a:schemeClr val="bg1">
+                <a:lumMod val="65000"/>
+              </a:schemeClr>
+            </a:solidFill>
+          </a:ln>
+        </p:spPr>
+        <p:style>
+          <a:lnRef idx="2">
+            <a:schemeClr val="accent1">
+              <a:shade val="50000"/>
+            </a:schemeClr>
+          </a:lnRef>
+          <a:fillRef idx="1">
+            <a:schemeClr val="accent1"/>
+          </a:fillRef>
+          <a:effectRef idx="0">
+            <a:schemeClr val="accent1"/>
+          </a:effectRef>
+          <a:fontRef idx="minor">
+            <a:schemeClr val="lt1"/>
+          </a:fontRef>
+        </p:style>
+        <p:txBody>
+          <a:bodyPr rtlCol="0" anchor="ctr"/>
+          <a:lstStyle/>
+          <a:p>
+            <a:pPr algn="ctr"/>
+            <a:endParaRPr lang="zh-CN" altLang="en-US" sz="1400">
+              <a:solidFill>
+                <a:schemeClr val="tx1"/>
+              </a:solidFill>
+              <a:latin typeface="Arial" pitchFamily="34" charset="0"/>
+              <a:cs typeface="Arial" pitchFamily="34" charset="0"/>
+            </a:endParaRPr>
+          </a:p>
+        </p:txBody>
+      </p:sp>
+      <p:sp>
+        <p:nvSpPr>
+          <p:cNvPr id="6" name="矩形 5"/>
+          <p:cNvSpPr/>
+          <p:nvPr/>
+        </p:nvSpPr>
+        <p:spPr>
+          <a:xfrm>
+            <a:off x="2438400" y="2438400"/>
+            <a:ext cx="5562600" cy="2971800"/>
+          </a:xfrm>
+          <a:prstGeom prst="rect">
+            <a:avLst/>
+          </a:prstGeom>
+          <a:solidFill>
+            <a:schemeClr val="tx2">
+              <a:lumMod val="40000"/>
+              <a:lumOff val="60000"/>
+            </a:schemeClr>
+          </a:solidFill>
+          <a:ln>
+            <a:solidFill>
+              <a:schemeClr val="tx2">
+                <a:lumMod val="60000"/>
+                <a:lumOff val="40000"/>
+              </a:schemeClr>
+            </a:solidFill>
+          </a:ln>
+        </p:spPr>
+        <p:style>
+          <a:lnRef idx="2">
+            <a:schemeClr val="accent1">
+              <a:shade val="50000"/>
+            </a:schemeClr>
+          </a:lnRef>
+          <a:fillRef idx="1">
+            <a:schemeClr val="accent1"/>
+          </a:fillRef>
+          <a:effectRef idx="0">
+            <a:schemeClr val="accent1"/>
+          </a:effectRef>
+          <a:fontRef idx="minor">
+            <a:schemeClr val="lt1"/>
+          </a:fontRef>
+        </p:style>
+        <p:txBody>
+          <a:bodyPr rtlCol="0" anchor="t"/>
+          <a:lstStyle/>
+          <a:p>
+            <a:pPr algn="ctr"/>
+            <a:r>
+              <a:rPr lang="en-US" altLang="zh-CN" sz="1400" b="1" dirty="0" smtClean="0">
+                <a:solidFill>
+                  <a:schemeClr val="tx1"/>
+                </a:solidFill>
+                <a:latin typeface="Arial" pitchFamily="34" charset="0"/>
+                <a:cs typeface="Arial" pitchFamily="34" charset="0"/>
+              </a:rPr>
+              <a:t>          </a:t>
+            </a:r>
+          </a:p>
+        </p:txBody>
+      </p:sp>
+      <p:sp>
+        <p:nvSpPr>
+          <p:cNvPr id="7" name="圆角矩形 6"/>
+          <p:cNvSpPr/>
+          <p:nvPr/>
+        </p:nvSpPr>
+        <p:spPr>
+          <a:xfrm>
+            <a:off x="2895600" y="5791200"/>
+            <a:ext cx="2286000" cy="609600"/>
+          </a:xfrm>
+          <a:prstGeom prst="roundRect">
+            <a:avLst/>
+          </a:prstGeom>
+          <a:solidFill>
+            <a:schemeClr val="tx2">
+              <a:lumMod val="40000"/>
+              <a:lumOff val="60000"/>
+            </a:schemeClr>
+          </a:solidFill>
+        </p:spPr>
+        <p:style>
+          <a:lnRef idx="2">
+            <a:schemeClr val="accent1">
+              <a:shade val="50000"/>
+            </a:schemeClr>
+          </a:lnRef>
+          <a:fillRef idx="1">
+            <a:schemeClr val="accent1"/>
+          </a:fillRef>
+          <a:effectRef idx="0">
+            <a:schemeClr val="accent1"/>
+          </a:effectRef>
+          <a:fontRef idx="minor">
+            <a:schemeClr val="lt1"/>
+          </a:fontRef>
+        </p:style>
+        <p:txBody>
+          <a:bodyPr rtlCol="0" anchor="ctr"/>
+          <a:lstStyle/>
+          <a:p>
+            <a:pPr algn="ctr"/>
+            <a:r>
+              <a:rPr lang="en-US" altLang="zh-CN" sz="1400" dirty="0" smtClean="0">
+                <a:solidFill>
+                  <a:schemeClr val="tx1"/>
+                </a:solidFill>
+                <a:latin typeface="Arial" pitchFamily="34" charset="0"/>
+                <a:cs typeface="Arial" pitchFamily="34" charset="0"/>
+              </a:rPr>
+              <a:t>DB</a:t>
+            </a:r>
+            <a:endParaRPr lang="zh-CN" altLang="en-US" sz="1400" dirty="0">
+              <a:solidFill>
+                <a:schemeClr val="tx1"/>
+              </a:solidFill>
+              <a:latin typeface="Arial" pitchFamily="34" charset="0"/>
+              <a:cs typeface="Arial" pitchFamily="34" charset="0"/>
+            </a:endParaRPr>
+          </a:p>
+        </p:txBody>
+      </p:sp>
+      <p:sp>
+        <p:nvSpPr>
+          <p:cNvPr id="8" name="圆角矩形 7"/>
+          <p:cNvSpPr/>
+          <p:nvPr/>
+        </p:nvSpPr>
+        <p:spPr>
+          <a:xfrm>
+            <a:off x="5410200" y="5791200"/>
+            <a:ext cx="2362200" cy="609600"/>
+          </a:xfrm>
+          <a:prstGeom prst="roundRect">
+            <a:avLst/>
+          </a:prstGeom>
+          <a:solidFill>
+            <a:schemeClr val="tx2">
+              <a:lumMod val="40000"/>
+              <a:lumOff val="60000"/>
+            </a:schemeClr>
+          </a:solidFill>
+        </p:spPr>
+        <p:style>
+          <a:lnRef idx="2">
+            <a:schemeClr val="accent1">
+              <a:shade val="50000"/>
+            </a:schemeClr>
+          </a:lnRef>
+          <a:fillRef idx="1">
+            <a:schemeClr val="accent1"/>
+          </a:fillRef>
+          <a:effectRef idx="0">
+            <a:schemeClr val="accent1"/>
+          </a:effectRef>
+          <a:fontRef idx="minor">
+            <a:schemeClr val="lt1"/>
+          </a:fontRef>
+        </p:style>
+        <p:txBody>
+          <a:bodyPr rtlCol="0" anchor="ctr"/>
+          <a:lstStyle/>
+          <a:p>
+            <a:pPr algn="ctr"/>
+            <a:r>
+              <a:rPr lang="en-US" altLang="zh-CN" sz="1400" dirty="0" smtClean="0">
+                <a:solidFill>
+                  <a:schemeClr val="tx1"/>
+                </a:solidFill>
+                <a:latin typeface="Arial" pitchFamily="34" charset="0"/>
+                <a:cs typeface="Arial" pitchFamily="34" charset="0"/>
+              </a:rPr>
+              <a:t>home directory</a:t>
+            </a:r>
+            <a:endParaRPr lang="zh-CN" altLang="en-US" sz="1400" dirty="0">
+              <a:solidFill>
+                <a:schemeClr val="tx1"/>
+              </a:solidFill>
+              <a:latin typeface="Arial" pitchFamily="34" charset="0"/>
+              <a:cs typeface="Arial" pitchFamily="34" charset="0"/>
+            </a:endParaRPr>
+          </a:p>
+        </p:txBody>
+      </p:sp>
+      <p:sp>
+        <p:nvSpPr>
+          <p:cNvPr id="9" name="圆角矩形 8"/>
+          <p:cNvSpPr/>
+          <p:nvPr/>
+        </p:nvSpPr>
+        <p:spPr>
+          <a:xfrm>
+            <a:off x="3886200" y="4724400"/>
+            <a:ext cx="1828800" cy="533400"/>
+          </a:xfrm>
+          <a:prstGeom prst="roundRect">
+            <a:avLst/>
+          </a:prstGeom>
+          <a:solidFill>
+            <a:schemeClr val="tx2">
+              <a:lumMod val="20000"/>
+              <a:lumOff val="80000"/>
+            </a:schemeClr>
+          </a:solidFill>
+        </p:spPr>
+        <p:style>
+          <a:lnRef idx="2">
+            <a:schemeClr val="accent1">
+              <a:shade val="50000"/>
+            </a:schemeClr>
+          </a:lnRef>
+          <a:fillRef idx="1">
+            <a:schemeClr val="accent1"/>
+          </a:fillRef>
+          <a:effectRef idx="0">
+            <a:schemeClr val="accent1"/>
+          </a:effectRef>
+          <a:fontRef idx="minor">
+            <a:schemeClr val="lt1"/>
+          </a:fontRef>
+        </p:style>
+        <p:txBody>
+          <a:bodyPr rtlCol="0" anchor="ctr"/>
+          <a:lstStyle/>
+          <a:p>
+            <a:pPr algn="ctr"/>
+            <a:r>
+              <a:rPr lang="en-US" altLang="zh-CN" sz="1400" dirty="0" smtClean="0">
+                <a:solidFill>
+                  <a:schemeClr val="tx1"/>
+                </a:solidFill>
+                <a:latin typeface="Arial" pitchFamily="34" charset="0"/>
+                <a:cs typeface="Arial" pitchFamily="34" charset="0"/>
+              </a:rPr>
+              <a:t>Spring Data</a:t>
+            </a:r>
+            <a:endParaRPr lang="zh-CN" altLang="en-US" sz="1400" dirty="0">
+              <a:solidFill>
+                <a:schemeClr val="tx1"/>
+              </a:solidFill>
+              <a:latin typeface="Arial" pitchFamily="34" charset="0"/>
+              <a:cs typeface="Arial" pitchFamily="34" charset="0"/>
+            </a:endParaRPr>
+          </a:p>
+        </p:txBody>
+      </p:sp>
+      <p:sp>
+        <p:nvSpPr>
+          <p:cNvPr id="10" name="圆角矩形 9"/>
+          <p:cNvSpPr/>
+          <p:nvPr/>
+        </p:nvSpPr>
+        <p:spPr>
+          <a:xfrm>
+            <a:off x="5867400" y="4724400"/>
+            <a:ext cx="1905000" cy="533400"/>
+          </a:xfrm>
+          <a:prstGeom prst="roundRect">
+            <a:avLst/>
+          </a:prstGeom>
+          <a:solidFill>
+            <a:schemeClr val="tx2">
+              <a:lumMod val="20000"/>
+              <a:lumOff val="80000"/>
+            </a:schemeClr>
+          </a:solidFill>
+        </p:spPr>
+        <p:style>
+          <a:lnRef idx="2">
+            <a:schemeClr val="accent1">
+              <a:shade val="50000"/>
+            </a:schemeClr>
+          </a:lnRef>
+          <a:fillRef idx="1">
+            <a:schemeClr val="accent1"/>
+          </a:fillRef>
+          <a:effectRef idx="0">
+            <a:schemeClr val="accent1"/>
+          </a:effectRef>
+          <a:fontRef idx="minor">
+            <a:schemeClr val="lt1"/>
+          </a:fontRef>
+        </p:style>
+        <p:txBody>
+          <a:bodyPr rtlCol="0" anchor="ctr"/>
+          <a:lstStyle/>
+          <a:p>
+            <a:pPr algn="ctr"/>
+            <a:r>
+              <a:rPr lang="en-US" altLang="zh-CN" sz="1400" dirty="0" smtClean="0">
+                <a:solidFill>
+                  <a:schemeClr val="tx1"/>
+                </a:solidFill>
+                <a:latin typeface="Arial" pitchFamily="34" charset="0"/>
+                <a:cs typeface="Arial" pitchFamily="34" charset="0"/>
+              </a:rPr>
+              <a:t>Embedded SVN</a:t>
+            </a:r>
+            <a:endParaRPr lang="zh-CN" altLang="en-US" sz="1400" dirty="0">
+              <a:solidFill>
+                <a:schemeClr val="tx1"/>
+              </a:solidFill>
+              <a:latin typeface="Arial" pitchFamily="34" charset="0"/>
+              <a:cs typeface="Arial" pitchFamily="34" charset="0"/>
+            </a:endParaRPr>
+          </a:p>
+        </p:txBody>
+      </p:sp>
+      <p:sp>
+        <p:nvSpPr>
+          <p:cNvPr id="11" name="圆角矩形 10"/>
+          <p:cNvSpPr/>
+          <p:nvPr/>
+        </p:nvSpPr>
+        <p:spPr>
+          <a:xfrm>
+            <a:off x="3886200" y="4038600"/>
+            <a:ext cx="3886200" cy="609600"/>
+          </a:xfrm>
+          <a:prstGeom prst="roundRect">
+            <a:avLst/>
+          </a:prstGeom>
+          <a:solidFill>
+            <a:schemeClr val="tx2">
+              <a:lumMod val="20000"/>
+              <a:lumOff val="80000"/>
+            </a:schemeClr>
+          </a:solidFill>
+        </p:spPr>
+        <p:style>
+          <a:lnRef idx="2">
+            <a:schemeClr val="accent1">
+              <a:shade val="50000"/>
+            </a:schemeClr>
+          </a:lnRef>
+          <a:fillRef idx="1">
+            <a:schemeClr val="accent1"/>
+          </a:fillRef>
+          <a:effectRef idx="0">
+            <a:schemeClr val="accent1"/>
+          </a:effectRef>
+          <a:fontRef idx="minor">
+            <a:schemeClr val="lt1"/>
+          </a:fontRef>
+        </p:style>
+        <p:txBody>
+          <a:bodyPr rtlCol="0" anchor="ctr"/>
+          <a:lstStyle/>
+          <a:p>
+            <a:pPr algn="ctr"/>
+            <a:r>
+              <a:rPr lang="en-US" altLang="zh-CN" sz="1400" dirty="0" err="1" smtClean="0">
+                <a:solidFill>
+                  <a:schemeClr val="tx1"/>
+                </a:solidFill>
+                <a:latin typeface="Arial" pitchFamily="34" charset="0"/>
+                <a:cs typeface="Arial" pitchFamily="34" charset="0"/>
+              </a:rPr>
+              <a:t>EhCache</a:t>
+            </a:r>
+            <a:endParaRPr lang="zh-CN" altLang="en-US" sz="1400" dirty="0">
+              <a:solidFill>
+                <a:schemeClr val="tx1"/>
+              </a:solidFill>
+              <a:latin typeface="Arial" pitchFamily="34" charset="0"/>
+              <a:cs typeface="Arial" pitchFamily="34" charset="0"/>
+            </a:endParaRPr>
+          </a:p>
+        </p:txBody>
+      </p:sp>
+      <p:sp>
+        <p:nvSpPr>
+          <p:cNvPr id="12" name="圆角矩形 11"/>
+          <p:cNvSpPr/>
+          <p:nvPr/>
+        </p:nvSpPr>
+        <p:spPr>
+          <a:xfrm>
+            <a:off x="2590800" y="4038600"/>
+            <a:ext cx="1143000" cy="1219200"/>
+          </a:xfrm>
+          <a:prstGeom prst="roundRect">
+            <a:avLst/>
+          </a:prstGeom>
+          <a:solidFill>
+            <a:schemeClr val="tx2">
+              <a:lumMod val="20000"/>
+              <a:lumOff val="80000"/>
+            </a:schemeClr>
+          </a:solidFill>
+        </p:spPr>
+        <p:style>
+          <a:lnRef idx="2">
+            <a:schemeClr val="accent1">
+              <a:shade val="50000"/>
+            </a:schemeClr>
+          </a:lnRef>
+          <a:fillRef idx="1">
+            <a:schemeClr val="accent1"/>
+          </a:fillRef>
+          <a:effectRef idx="0">
+            <a:schemeClr val="accent1"/>
+          </a:effectRef>
+          <a:fontRef idx="minor">
+            <a:schemeClr val="lt1"/>
+          </a:fontRef>
+        </p:style>
+        <p:txBody>
+          <a:bodyPr rtlCol="0" anchor="ctr"/>
+          <a:lstStyle/>
+          <a:p>
+            <a:pPr algn="ctr"/>
+            <a:r>
+              <a:rPr lang="en-US" altLang="zh-CN" sz="1400" dirty="0" smtClean="0">
+                <a:solidFill>
+                  <a:schemeClr val="tx1"/>
+                </a:solidFill>
+                <a:latin typeface="Arial" pitchFamily="34" charset="0"/>
+                <a:cs typeface="Arial" pitchFamily="34" charset="0"/>
+              </a:rPr>
+              <a:t>Spring</a:t>
+            </a:r>
+          </a:p>
+          <a:p>
+            <a:pPr algn="ctr"/>
+            <a:r>
+              <a:rPr lang="en-US" altLang="zh-CN" sz="1400" dirty="0" smtClean="0">
+                <a:solidFill>
+                  <a:schemeClr val="tx1"/>
+                </a:solidFill>
+                <a:latin typeface="Arial" pitchFamily="34" charset="0"/>
+                <a:cs typeface="Arial" pitchFamily="34" charset="0"/>
+              </a:rPr>
+              <a:t>Security</a:t>
+            </a:r>
+            <a:endParaRPr lang="zh-CN" altLang="en-US" sz="1400" dirty="0">
+              <a:solidFill>
+                <a:schemeClr val="tx1"/>
+              </a:solidFill>
+              <a:latin typeface="Arial" pitchFamily="34" charset="0"/>
+              <a:cs typeface="Arial" pitchFamily="34" charset="0"/>
+            </a:endParaRPr>
+          </a:p>
+        </p:txBody>
+      </p:sp>
+      <p:sp>
+        <p:nvSpPr>
+          <p:cNvPr id="13" name="圆角矩形 12"/>
+          <p:cNvSpPr/>
+          <p:nvPr/>
+        </p:nvSpPr>
+        <p:spPr>
+          <a:xfrm>
+            <a:off x="2590800" y="2514600"/>
+            <a:ext cx="1143000" cy="1371600"/>
+          </a:xfrm>
+          <a:prstGeom prst="roundRect">
+            <a:avLst/>
+          </a:prstGeom>
+          <a:solidFill>
+            <a:schemeClr val="tx2">
+              <a:lumMod val="20000"/>
+              <a:lumOff val="80000"/>
+            </a:schemeClr>
+          </a:solidFill>
+        </p:spPr>
+        <p:style>
+          <a:lnRef idx="2">
+            <a:schemeClr val="accent1">
+              <a:shade val="50000"/>
+            </a:schemeClr>
+          </a:lnRef>
+          <a:fillRef idx="1">
+            <a:schemeClr val="accent1"/>
+          </a:fillRef>
+          <a:effectRef idx="0">
+            <a:schemeClr val="accent1"/>
+          </a:effectRef>
+          <a:fontRef idx="minor">
+            <a:schemeClr val="lt1"/>
+          </a:fontRef>
+        </p:style>
+        <p:txBody>
+          <a:bodyPr rtlCol="0" anchor="ctr"/>
+          <a:lstStyle/>
+          <a:p>
+            <a:pPr algn="ctr"/>
+            <a:r>
+              <a:rPr lang="en-US" altLang="zh-CN" sz="1400" dirty="0" smtClean="0">
+                <a:solidFill>
+                  <a:schemeClr val="tx1"/>
+                </a:solidFill>
+                <a:latin typeface="Arial" pitchFamily="34" charset="0"/>
+                <a:cs typeface="Arial" pitchFamily="34" charset="0"/>
+              </a:rPr>
+              <a:t>Plugin</a:t>
+            </a:r>
+          </a:p>
+          <a:p>
+            <a:pPr algn="ctr"/>
+            <a:r>
+              <a:rPr lang="en-US" altLang="zh-CN" sz="1400" dirty="0" smtClean="0">
+                <a:solidFill>
+                  <a:schemeClr val="tx1"/>
+                </a:solidFill>
+                <a:latin typeface="Arial" pitchFamily="34" charset="0"/>
+                <a:cs typeface="Arial" pitchFamily="34" charset="0"/>
+              </a:rPr>
+              <a:t>System</a:t>
+            </a:r>
+            <a:endParaRPr lang="zh-CN" altLang="en-US" sz="1400" dirty="0">
+              <a:solidFill>
+                <a:schemeClr val="tx1"/>
+              </a:solidFill>
+              <a:latin typeface="Arial" pitchFamily="34" charset="0"/>
+              <a:cs typeface="Arial" pitchFamily="34" charset="0"/>
+            </a:endParaRPr>
+          </a:p>
+        </p:txBody>
+      </p:sp>
+      <p:sp>
+        <p:nvSpPr>
+          <p:cNvPr id="14" name="下箭头 13"/>
+          <p:cNvSpPr/>
+          <p:nvPr/>
+        </p:nvSpPr>
+        <p:spPr>
+          <a:xfrm>
+            <a:off x="6477000" y="5410200"/>
+            <a:ext cx="457200" cy="381000"/>
+          </a:xfrm>
+          <a:prstGeom prst="downArrow">
+            <a:avLst/>
+          </a:prstGeom>
+          <a:solidFill>
+            <a:schemeClr val="tx2">
+              <a:lumMod val="40000"/>
+              <a:lumOff val="60000"/>
+            </a:schemeClr>
+          </a:solidFill>
+          <a:ln>
+            <a:solidFill>
+              <a:schemeClr val="accent1">
+                <a:lumMod val="40000"/>
+                <a:lumOff val="60000"/>
+              </a:schemeClr>
+            </a:solidFill>
+          </a:ln>
+        </p:spPr>
+        <p:style>
+          <a:lnRef idx="2">
+            <a:schemeClr val="accent1">
+              <a:shade val="50000"/>
+            </a:schemeClr>
+          </a:lnRef>
+          <a:fillRef idx="1">
+            <a:schemeClr val="accent1"/>
+          </a:fillRef>
+          <a:effectRef idx="0">
+            <a:schemeClr val="accent1"/>
+          </a:effectRef>
+          <a:fontRef idx="minor">
+            <a:schemeClr val="lt1"/>
+          </a:fontRef>
+        </p:style>
+        <p:txBody>
+          <a:bodyPr rtlCol="0" anchor="ctr"/>
+          <a:lstStyle/>
+          <a:p>
+            <a:pPr algn="ctr"/>
+            <a:endParaRPr lang="zh-CN" altLang="en-US" sz="1400">
+              <a:solidFill>
+                <a:schemeClr val="tx1"/>
+              </a:solidFill>
+              <a:latin typeface="Arial" pitchFamily="34" charset="0"/>
+              <a:cs typeface="Arial" pitchFamily="34" charset="0"/>
+            </a:endParaRPr>
+          </a:p>
+        </p:txBody>
+      </p:sp>
+      <p:sp>
+        <p:nvSpPr>
+          <p:cNvPr id="15" name="下箭头 14"/>
+          <p:cNvSpPr/>
+          <p:nvPr/>
+        </p:nvSpPr>
+        <p:spPr>
+          <a:xfrm>
+            <a:off x="4419600" y="5410200"/>
+            <a:ext cx="457200" cy="381000"/>
+          </a:xfrm>
+          <a:prstGeom prst="downArrow">
+            <a:avLst/>
+          </a:prstGeom>
+          <a:solidFill>
+            <a:schemeClr val="tx2">
+              <a:lumMod val="40000"/>
+              <a:lumOff val="60000"/>
+            </a:schemeClr>
+          </a:solidFill>
+          <a:ln>
+            <a:solidFill>
+              <a:schemeClr val="accent1">
+                <a:lumMod val="40000"/>
+                <a:lumOff val="60000"/>
+              </a:schemeClr>
+            </a:solidFill>
+          </a:ln>
+        </p:spPr>
+        <p:style>
+          <a:lnRef idx="2">
+            <a:schemeClr val="accent1">
+              <a:shade val="50000"/>
+            </a:schemeClr>
+          </a:lnRef>
+          <a:fillRef idx="1">
+            <a:schemeClr val="accent1"/>
+          </a:fillRef>
+          <a:effectRef idx="0">
+            <a:schemeClr val="accent1"/>
+          </a:effectRef>
+          <a:fontRef idx="minor">
+            <a:schemeClr val="lt1"/>
+          </a:fontRef>
+        </p:style>
+        <p:txBody>
+          <a:bodyPr rtlCol="0" anchor="ctr"/>
+          <a:lstStyle/>
+          <a:p>
+            <a:pPr algn="ctr"/>
+            <a:endParaRPr lang="zh-CN" altLang="en-US" sz="1400">
+              <a:solidFill>
+                <a:schemeClr val="tx1"/>
+              </a:solidFill>
+              <a:latin typeface="Arial" pitchFamily="34" charset="0"/>
+              <a:cs typeface="Arial" pitchFamily="34" charset="0"/>
+            </a:endParaRPr>
+          </a:p>
+        </p:txBody>
+      </p:sp>
+      <p:sp>
+        <p:nvSpPr>
+          <p:cNvPr id="16" name="TextBox 15"/>
+          <p:cNvSpPr txBox="1"/>
+          <p:nvPr/>
+        </p:nvSpPr>
+        <p:spPr>
+          <a:xfrm>
+            <a:off x="4267200" y="1752600"/>
+            <a:ext cx="2170722" cy="369332"/>
+          </a:xfrm>
+          <a:prstGeom prst="rect">
+            <a:avLst/>
+          </a:prstGeom>
+          <a:noFill/>
+        </p:spPr>
+        <p:txBody>
+          <a:bodyPr wrap="none" rtlCol="0">
+            <a:spAutoFit/>
+          </a:bodyPr>
+          <a:lstStyle/>
+          <a:p>
+            <a:r>
+              <a:rPr lang="en-US" altLang="zh-CN" dirty="0" smtClean="0">
+                <a:latin typeface="Arial" pitchFamily="34" charset="0"/>
+                <a:cs typeface="Arial" pitchFamily="34" charset="0"/>
+              </a:rPr>
+              <a:t>nGrinder controller</a:t>
+            </a:r>
+            <a:endParaRPr lang="zh-CN" altLang="en-US" dirty="0">
+              <a:latin typeface="Arial" pitchFamily="34" charset="0"/>
+              <a:cs typeface="Arial" pitchFamily="34" charset="0"/>
+            </a:endParaRPr>
+          </a:p>
+        </p:txBody>
+      </p:sp>
+      <p:grpSp>
+        <p:nvGrpSpPr>
+          <p:cNvPr id="24" name="组合 23"/>
+          <p:cNvGrpSpPr/>
+          <p:nvPr/>
+        </p:nvGrpSpPr>
+        <p:grpSpPr>
+          <a:xfrm>
+            <a:off x="5943600" y="2514600"/>
+            <a:ext cx="1828800" cy="1371600"/>
+            <a:chOff x="5943600" y="2514600"/>
+            <a:chExt cx="1828800" cy="1371600"/>
+          </a:xfrm>
+        </p:grpSpPr>
+        <p:sp>
+          <p:nvSpPr>
+            <p:cNvPr id="17" name="圆角矩形 16"/>
+            <p:cNvSpPr/>
+            <p:nvPr/>
+          </p:nvSpPr>
+          <p:spPr>
+            <a:xfrm>
+              <a:off x="5943600" y="2514600"/>
+              <a:ext cx="1828800" cy="1371600"/>
+            </a:xfrm>
+            <a:prstGeom prst="roundRect">
+              <a:avLst/>
+            </a:prstGeom>
+            <a:solidFill>
+              <a:schemeClr val="tx2">
+                <a:lumMod val="20000"/>
+                <a:lumOff val="80000"/>
+              </a:schemeClr>
+            </a:solidFill>
+          </p:spPr>
+          <p:style>
+            <a:lnRef idx="2">
+              <a:schemeClr val="accent1">
+                <a:shade val="50000"/>
+              </a:schemeClr>
+            </a:lnRef>
+            <a:fillRef idx="1">
+              <a:schemeClr val="accent1"/>
+            </a:fillRef>
+            <a:effectRef idx="0">
+              <a:schemeClr val="accent1"/>
+            </a:effectRef>
+            <a:fontRef idx="minor">
+              <a:schemeClr val="lt1"/>
+            </a:fontRef>
+          </p:style>
+          <p:txBody>
+            <a:bodyPr rtlCol="0" anchor="ctr"/>
+            <a:lstStyle/>
+            <a:p>
+              <a:pPr algn="ctr"/>
+              <a:endParaRPr lang="zh-CN" altLang="en-US" sz="1400" dirty="0">
+                <a:solidFill>
+                  <a:schemeClr val="tx1"/>
+                </a:solidFill>
+                <a:latin typeface="Arial" pitchFamily="34" charset="0"/>
+                <a:cs typeface="Arial" pitchFamily="34" charset="0"/>
+              </a:endParaRPr>
+            </a:p>
+          </p:txBody>
+        </p:sp>
+        <p:sp>
+          <p:nvSpPr>
+            <p:cNvPr id="20" name="모서리가 둥근 직사각형 9"/>
+            <p:cNvSpPr/>
+            <p:nvPr/>
+          </p:nvSpPr>
+          <p:spPr>
+            <a:xfrm>
+              <a:off x="6400800" y="3352800"/>
+              <a:ext cx="1219200" cy="304800"/>
+            </a:xfrm>
+            <a:prstGeom prst="roundRect">
+              <a:avLst/>
+            </a:prstGeom>
+          </p:spPr>
+          <p:style>
+            <a:lnRef idx="1">
+              <a:schemeClr val="accent1"/>
+            </a:lnRef>
+            <a:fillRef idx="3">
+              <a:schemeClr val="accent1"/>
+            </a:fillRef>
+            <a:effectRef idx="2">
+              <a:schemeClr val="accent1"/>
+            </a:effectRef>
+            <a:fontRef idx="minor">
+              <a:schemeClr val="lt1"/>
+            </a:fontRef>
+          </p:style>
+          <p:txBody>
+            <a:bodyPr rtlCol="0" anchor="ctr"/>
+            <a:lstStyle/>
+            <a:p>
+              <a:pPr algn="ctr"/>
+              <a:endParaRPr lang="ko-KR" altLang="en-US" sz="1400" dirty="0">
+                <a:latin typeface="Arial" pitchFamily="34" charset="0"/>
+                <a:cs typeface="Arial" pitchFamily="34" charset="0"/>
+              </a:endParaRPr>
+            </a:p>
+          </p:txBody>
+        </p:sp>
+        <p:sp>
+          <p:nvSpPr>
+            <p:cNvPr id="19" name="모서리가 둥근 직사각형 9"/>
+            <p:cNvSpPr/>
+            <p:nvPr/>
+          </p:nvSpPr>
+          <p:spPr>
+            <a:xfrm>
+              <a:off x="6248400" y="3276600"/>
+              <a:ext cx="1219200" cy="304800"/>
+            </a:xfrm>
+            <a:prstGeom prst="roundRect">
+              <a:avLst/>
+            </a:prstGeom>
+          </p:spPr>
+          <p:style>
+            <a:lnRef idx="1">
+              <a:schemeClr val="accent1"/>
+            </a:lnRef>
+            <a:fillRef idx="3">
+              <a:schemeClr val="accent1"/>
+            </a:fillRef>
+            <a:effectRef idx="2">
+              <a:schemeClr val="accent1"/>
+            </a:effectRef>
+            <a:fontRef idx="minor">
+              <a:schemeClr val="lt1"/>
+            </a:fontRef>
+          </p:style>
+          <p:txBody>
+            <a:bodyPr rtlCol="0" anchor="ctr"/>
+            <a:lstStyle/>
+            <a:p>
+              <a:pPr algn="ctr"/>
+              <a:endParaRPr lang="ko-KR" altLang="en-US" sz="1400" dirty="0">
+                <a:latin typeface="Arial" pitchFamily="34" charset="0"/>
+                <a:cs typeface="Arial" pitchFamily="34" charset="0"/>
+              </a:endParaRPr>
+            </a:p>
+          </p:txBody>
+        </p:sp>
+        <p:sp>
+          <p:nvSpPr>
+            <p:cNvPr id="18" name="모서리가 둥근 직사각형 9"/>
+            <p:cNvSpPr/>
+            <p:nvPr/>
+          </p:nvSpPr>
+          <p:spPr>
+            <a:xfrm>
+              <a:off x="6096000" y="3200400"/>
+              <a:ext cx="1219200" cy="304800"/>
+            </a:xfrm>
+            <a:prstGeom prst="roundRect">
+              <a:avLst/>
+            </a:prstGeom>
+          </p:spPr>
+          <p:style>
+            <a:lnRef idx="1">
+              <a:schemeClr val="accent1"/>
+            </a:lnRef>
+            <a:fillRef idx="3">
+              <a:schemeClr val="accent1"/>
+            </a:fillRef>
+            <a:effectRef idx="2">
+              <a:schemeClr val="accent1"/>
+            </a:effectRef>
+            <a:fontRef idx="minor">
+              <a:schemeClr val="lt1"/>
+            </a:fontRef>
+          </p:style>
+          <p:txBody>
+            <a:bodyPr rtlCol="0" anchor="ctr"/>
+            <a:lstStyle/>
+            <a:p>
+              <a:pPr algn="ctr"/>
+              <a:r>
+                <a:rPr lang="en-US" altLang="ko-KR" sz="1050" dirty="0" smtClean="0">
+                  <a:latin typeface="Arial" pitchFamily="34" charset="0"/>
+                  <a:cs typeface="Arial" pitchFamily="34" charset="0"/>
+                </a:rPr>
+                <a:t>Grinder </a:t>
+              </a:r>
+              <a:r>
+                <a:rPr lang="en-US" altLang="ko-KR" sz="1050" dirty="0" smtClean="0">
+                  <a:latin typeface="Arial" pitchFamily="34" charset="0"/>
+                  <a:cs typeface="Arial" pitchFamily="34" charset="0"/>
+                </a:rPr>
+                <a:t>Console</a:t>
+              </a:r>
+              <a:endParaRPr lang="ko-KR" altLang="en-US" sz="1050" dirty="0">
+                <a:latin typeface="Arial" pitchFamily="34" charset="0"/>
+                <a:cs typeface="Arial" pitchFamily="34" charset="0"/>
+              </a:endParaRPr>
+            </a:p>
+          </p:txBody>
+        </p:sp>
+        <p:sp>
+          <p:nvSpPr>
+            <p:cNvPr id="21" name="TextBox 20"/>
+            <p:cNvSpPr txBox="1"/>
+            <p:nvPr/>
+          </p:nvSpPr>
+          <p:spPr>
+            <a:xfrm>
+              <a:off x="6019800" y="2667000"/>
+              <a:ext cx="1616148" cy="307777"/>
+            </a:xfrm>
+            <a:prstGeom prst="rect">
+              <a:avLst/>
+            </a:prstGeom>
+            <a:noFill/>
+          </p:spPr>
+          <p:txBody>
+            <a:bodyPr wrap="none" rtlCol="0">
+              <a:spAutoFit/>
+            </a:bodyPr>
+            <a:lstStyle/>
+            <a:p>
+              <a:r>
+                <a:rPr lang="en-US" altLang="zh-CN" sz="1400" dirty="0" smtClean="0">
+                  <a:latin typeface="Arial" pitchFamily="34" charset="0"/>
+                  <a:cs typeface="Arial" pitchFamily="34" charset="0"/>
+                </a:rPr>
+                <a:t>Console manager</a:t>
+              </a:r>
+              <a:endParaRPr lang="zh-CN" altLang="en-US" sz="1400" dirty="0">
+                <a:latin typeface="Arial" pitchFamily="34" charset="0"/>
+                <a:cs typeface="Arial" pitchFamily="34" charset="0"/>
+              </a:endParaRPr>
+            </a:p>
+          </p:txBody>
+        </p:sp>
+      </p:grpSp>
+      <p:grpSp>
+        <p:nvGrpSpPr>
+          <p:cNvPr id="25" name="组合 24"/>
+          <p:cNvGrpSpPr/>
+          <p:nvPr/>
+        </p:nvGrpSpPr>
+        <p:grpSpPr>
+          <a:xfrm>
+            <a:off x="3886200" y="2514600"/>
+            <a:ext cx="1828800" cy="1371600"/>
+            <a:chOff x="3886200" y="2514600"/>
+            <a:chExt cx="1828800" cy="1371600"/>
+          </a:xfrm>
+        </p:grpSpPr>
+        <p:sp>
+          <p:nvSpPr>
+            <p:cNvPr id="22" name="圆角矩形 21"/>
+            <p:cNvSpPr/>
+            <p:nvPr/>
+          </p:nvSpPr>
+          <p:spPr>
+            <a:xfrm>
+              <a:off x="3886200" y="2514600"/>
+              <a:ext cx="1828800" cy="1371600"/>
+            </a:xfrm>
+            <a:prstGeom prst="roundRect">
+              <a:avLst/>
+            </a:prstGeom>
+            <a:solidFill>
+              <a:schemeClr val="tx2">
+                <a:lumMod val="20000"/>
+                <a:lumOff val="80000"/>
+              </a:schemeClr>
+            </a:solidFill>
+          </p:spPr>
+          <p:style>
+            <a:lnRef idx="2">
+              <a:schemeClr val="accent1">
+                <a:shade val="50000"/>
+              </a:schemeClr>
+            </a:lnRef>
+            <a:fillRef idx="1">
+              <a:schemeClr val="accent1"/>
+            </a:fillRef>
+            <a:effectRef idx="0">
+              <a:schemeClr val="accent1"/>
+            </a:effectRef>
+            <a:fontRef idx="minor">
+              <a:schemeClr val="lt1"/>
+            </a:fontRef>
+          </p:style>
+          <p:txBody>
+            <a:bodyPr rtlCol="0" anchor="ctr"/>
+            <a:lstStyle/>
+            <a:p>
+              <a:pPr algn="ctr"/>
+              <a:endParaRPr lang="zh-CN" altLang="en-US" sz="1400" dirty="0">
+                <a:solidFill>
+                  <a:schemeClr val="tx1"/>
+                </a:solidFill>
+                <a:latin typeface="Arial" pitchFamily="34" charset="0"/>
+                <a:cs typeface="Arial" pitchFamily="34" charset="0"/>
+              </a:endParaRPr>
+            </a:p>
+          </p:txBody>
+        </p:sp>
+        <p:sp>
+          <p:nvSpPr>
+            <p:cNvPr id="23" name="TextBox 22"/>
+            <p:cNvSpPr txBox="1"/>
+            <p:nvPr/>
+          </p:nvSpPr>
+          <p:spPr>
+            <a:xfrm>
+              <a:off x="4267200" y="2743200"/>
+              <a:ext cx="1000338" cy="954107"/>
+            </a:xfrm>
+            <a:prstGeom prst="rect">
+              <a:avLst/>
+            </a:prstGeom>
+            <a:noFill/>
+          </p:spPr>
+          <p:txBody>
+            <a:bodyPr wrap="none" rtlCol="0">
+              <a:spAutoFit/>
+            </a:bodyPr>
+            <a:lstStyle/>
+            <a:p>
+              <a:r>
+                <a:rPr lang="en-US" altLang="zh-CN" sz="1400" dirty="0" smtClean="0">
+                  <a:latin typeface="Arial" pitchFamily="34" charset="0"/>
+                  <a:cs typeface="Arial" pitchFamily="34" charset="0"/>
+                </a:rPr>
+                <a:t>nGrinder</a:t>
+              </a:r>
+            </a:p>
+            <a:p>
+              <a:r>
+                <a:rPr lang="en-US" altLang="zh-CN" sz="1400" dirty="0" smtClean="0">
+                  <a:latin typeface="Arial" pitchFamily="34" charset="0"/>
+                  <a:cs typeface="Arial" pitchFamily="34" charset="0"/>
+                </a:rPr>
+                <a:t>Controller,</a:t>
+              </a:r>
+            </a:p>
+            <a:p>
+              <a:r>
+                <a:rPr lang="en-US" altLang="zh-CN" sz="1400" dirty="0" smtClean="0">
+                  <a:latin typeface="Arial" pitchFamily="34" charset="0"/>
+                  <a:cs typeface="Arial" pitchFamily="34" charset="0"/>
+                </a:rPr>
+                <a:t>Services,</a:t>
+              </a:r>
+            </a:p>
+            <a:p>
+              <a:r>
+                <a:rPr lang="en-US" altLang="zh-CN" sz="1400" dirty="0" smtClean="0">
+                  <a:latin typeface="Arial" pitchFamily="34" charset="0"/>
+                  <a:cs typeface="Arial" pitchFamily="34" charset="0"/>
+                </a:rPr>
+                <a:t>Utilities.</a:t>
+              </a:r>
+              <a:endParaRPr lang="zh-CN" altLang="en-US" sz="1400" dirty="0">
+                <a:latin typeface="Arial" pitchFamily="34" charset="0"/>
+                <a:cs typeface="Arial" pitchFamily="34" charset="0"/>
+              </a:endParaRPr>
+            </a:p>
+          </p:txBody>
+        </p:sp>
+      </p:grpSp>
+    </p:spTree>
+  </p:cSld>
+  <p:clrMapOvr>
+    <a:masterClrMapping/>
+  </p:clrMapOvr>
+</p:sld>
+</file>
+
+<file path=ppt/slides/slide3.xml><?xml version="1.0" encoding="utf-8"?>
+<p:sld xmlns:a="http://schemas.openxmlformats.org/drawingml/2006/main" xmlns:r="http://schemas.openxmlformats.org/officeDocument/2006/relationships" xmlns:p="http://schemas.openxmlformats.org/presentationml/2006/main">
+  <p:cSld>
+    <p:spTree>
+      <p:nvGrpSpPr>
+        <p:cNvPr id="1" name=""/>
+        <p:cNvGrpSpPr/>
+        <p:nvPr/>
+      </p:nvGrpSpPr>
+      <p:grpSpPr>
+        <a:xfrm>
+          <a:off x="0" y="0"/>
+          <a:ext cx="0" cy="0"/>
+          <a:chOff x="0" y="0"/>
+          <a:chExt cx="0" cy="0"/>
+        </a:xfrm>
+      </p:grpSpPr>
+      <p:sp>
+        <p:nvSpPr>
+          <p:cNvPr id="2" name="标题 1"/>
+          <p:cNvSpPr>
+            <a:spLocks noGrp="1"/>
+          </p:cNvSpPr>
+          <p:nvPr>
+            <p:ph type="title"/>
+          </p:nvPr>
+        </p:nvSpPr>
+        <p:spPr/>
+        <p:txBody>
+          <a:bodyPr>
+            <a:normAutofit/>
+          </a:bodyPr>
+          <a:lstStyle/>
+          <a:p>
+            <a:pPr algn="l"/>
+            <a:r>
+              <a:rPr lang="en-US" altLang="zh-CN" sz="2800" b="1" dirty="0" smtClean="0">
+                <a:latin typeface="Arial" pitchFamily="34" charset="0"/>
+                <a:cs typeface="Arial" pitchFamily="34" charset="0"/>
+              </a:rPr>
+              <a:t>nGrinder controller – after cluster</a:t>
+            </a:r>
+            <a:endParaRPr lang="zh-CN" altLang="en-US" sz="2800" b="1" dirty="0">
+              <a:latin typeface="Arial" pitchFamily="34" charset="0"/>
+              <a:cs typeface="Arial" pitchFamily="34" charset="0"/>
+            </a:endParaRPr>
+          </a:p>
+        </p:txBody>
+      </p:sp>
+      <p:sp>
+        <p:nvSpPr>
+          <p:cNvPr id="6" name="矩形 5"/>
+          <p:cNvSpPr/>
+          <p:nvPr/>
+        </p:nvSpPr>
+        <p:spPr>
+          <a:xfrm>
+            <a:off x="228600" y="1752600"/>
+            <a:ext cx="4267200" cy="3581400"/>
+          </a:xfrm>
+          <a:prstGeom prst="rect">
+            <a:avLst/>
+          </a:prstGeom>
+          <a:solidFill>
+            <a:schemeClr val="tx2">
+              <a:lumMod val="40000"/>
+              <a:lumOff val="60000"/>
+            </a:schemeClr>
+          </a:solidFill>
+          <a:ln>
+            <a:solidFill>
+              <a:schemeClr val="tx2">
+                <a:lumMod val="60000"/>
+                <a:lumOff val="40000"/>
+              </a:schemeClr>
+            </a:solidFill>
+          </a:ln>
+        </p:spPr>
+        <p:style>
+          <a:lnRef idx="2">
+            <a:schemeClr val="accent1">
+              <a:shade val="50000"/>
+            </a:schemeClr>
+          </a:lnRef>
+          <a:fillRef idx="1">
+            <a:schemeClr val="accent1"/>
+          </a:fillRef>
+          <a:effectRef idx="0">
+            <a:schemeClr val="accent1"/>
+          </a:effectRef>
+          <a:fontRef idx="minor">
+            <a:schemeClr val="lt1"/>
+          </a:fontRef>
+        </p:style>
+        <p:txBody>
+          <a:bodyPr rtlCol="0" anchor="t"/>
+          <a:lstStyle/>
+          <a:p>
+            <a:pPr algn="ctr"/>
+            <a:r>
+              <a:rPr lang="en-US" altLang="zh-CN" sz="2800" b="1" dirty="0" smtClean="0">
+                <a:latin typeface="Arial" pitchFamily="34" charset="0"/>
+                <a:cs typeface="Arial" pitchFamily="34" charset="0"/>
+              </a:rPr>
+              <a:t>   </a:t>
+            </a:r>
+          </a:p>
+        </p:txBody>
+      </p:sp>
+      <p:sp>
+        <p:nvSpPr>
+          <p:cNvPr id="9" name="圆角矩形 8"/>
+          <p:cNvSpPr/>
+          <p:nvPr/>
+        </p:nvSpPr>
+        <p:spPr>
+          <a:xfrm>
+            <a:off x="1371600" y="4724400"/>
+            <a:ext cx="1371600" cy="457200"/>
+          </a:xfrm>
+          <a:prstGeom prst="roundRect">
+            <a:avLst/>
+          </a:prstGeom>
+          <a:solidFill>
+            <a:schemeClr val="tx2">
+              <a:lumMod val="20000"/>
+              <a:lumOff val="80000"/>
+            </a:schemeClr>
+          </a:solidFill>
+        </p:spPr>
+        <p:style>
+          <a:lnRef idx="2">
+            <a:schemeClr val="accent1">
+              <a:shade val="50000"/>
+            </a:schemeClr>
+          </a:lnRef>
+          <a:fillRef idx="1">
+            <a:schemeClr val="accent1"/>
+          </a:fillRef>
+          <a:effectRef idx="0">
+            <a:schemeClr val="accent1"/>
+          </a:effectRef>
+          <a:fontRef idx="minor">
+            <a:schemeClr val="lt1"/>
+          </a:fontRef>
+        </p:style>
+        <p:txBody>
+          <a:bodyPr rtlCol="0" anchor="ctr"/>
+          <a:lstStyle/>
+          <a:p>
+            <a:pPr algn="ctr"/>
+            <a:r>
+              <a:rPr lang="en-US" altLang="zh-CN" sz="1400" dirty="0" smtClean="0">
+                <a:solidFill>
+                  <a:schemeClr val="tx1"/>
+                </a:solidFill>
+              </a:rPr>
+              <a:t>Spring Data</a:t>
+            </a:r>
+            <a:endParaRPr lang="zh-CN" altLang="en-US" sz="1400" dirty="0">
+              <a:solidFill>
+                <a:schemeClr val="tx1"/>
+              </a:solidFill>
+            </a:endParaRPr>
+          </a:p>
+        </p:txBody>
+      </p:sp>
+      <p:sp>
+        <p:nvSpPr>
+          <p:cNvPr id="10" name="圆角矩形 9"/>
+          <p:cNvSpPr/>
+          <p:nvPr/>
+        </p:nvSpPr>
+        <p:spPr>
+          <a:xfrm>
+            <a:off x="2819400" y="4724400"/>
+            <a:ext cx="1600200" cy="457200"/>
+          </a:xfrm>
+          <a:prstGeom prst="roundRect">
+            <a:avLst/>
+          </a:prstGeom>
+          <a:solidFill>
+            <a:schemeClr val="tx2">
+              <a:lumMod val="20000"/>
+              <a:lumOff val="80000"/>
+            </a:schemeClr>
+          </a:solidFill>
+        </p:spPr>
+        <p:style>
+          <a:lnRef idx="2">
+            <a:schemeClr val="accent1">
+              <a:shade val="50000"/>
+            </a:schemeClr>
+          </a:lnRef>
+          <a:fillRef idx="1">
+            <a:schemeClr val="accent1"/>
+          </a:fillRef>
+          <a:effectRef idx="0">
+            <a:schemeClr val="accent1"/>
+          </a:effectRef>
+          <a:fontRef idx="minor">
+            <a:schemeClr val="lt1"/>
+          </a:fontRef>
+        </p:style>
+        <p:txBody>
+          <a:bodyPr rtlCol="0" anchor="ctr"/>
+          <a:lstStyle/>
+          <a:p>
+            <a:pPr algn="ctr"/>
+            <a:r>
+              <a:rPr lang="en-US" altLang="zh-CN" sz="1400" dirty="0" smtClean="0">
+                <a:solidFill>
+                  <a:schemeClr val="tx1"/>
+                </a:solidFill>
+              </a:rPr>
+              <a:t>Embedded SVN</a:t>
+            </a:r>
+            <a:endParaRPr lang="zh-CN" altLang="en-US" sz="1400" dirty="0">
+              <a:solidFill>
+                <a:schemeClr val="tx1"/>
+              </a:solidFill>
+            </a:endParaRPr>
+          </a:p>
+        </p:txBody>
+      </p:sp>
+      <p:sp>
+        <p:nvSpPr>
+          <p:cNvPr id="12" name="圆角矩形 11"/>
+          <p:cNvSpPr/>
+          <p:nvPr/>
+        </p:nvSpPr>
+        <p:spPr>
+          <a:xfrm>
+            <a:off x="304800" y="3886200"/>
+            <a:ext cx="838200" cy="1295400"/>
+          </a:xfrm>
+          <a:prstGeom prst="roundRect">
+            <a:avLst/>
+          </a:prstGeom>
+          <a:solidFill>
+            <a:schemeClr val="tx2">
+              <a:lumMod val="20000"/>
+              <a:lumOff val="80000"/>
+            </a:schemeClr>
+          </a:solidFill>
+        </p:spPr>
+        <p:style>
+          <a:lnRef idx="2">
+            <a:schemeClr val="accent1">
+              <a:shade val="50000"/>
+            </a:schemeClr>
+          </a:lnRef>
+          <a:fillRef idx="1">
+            <a:schemeClr val="accent1"/>
+          </a:fillRef>
+          <a:effectRef idx="0">
+            <a:schemeClr val="accent1"/>
+          </a:effectRef>
+          <a:fontRef idx="minor">
+            <a:schemeClr val="lt1"/>
+          </a:fontRef>
+        </p:style>
+        <p:txBody>
+          <a:bodyPr rtlCol="0" anchor="ctr"/>
+          <a:lstStyle/>
+          <a:p>
+            <a:pPr algn="ctr"/>
+            <a:r>
+              <a:rPr lang="en-US" altLang="zh-CN" sz="1400" dirty="0" smtClean="0">
+                <a:solidFill>
+                  <a:schemeClr val="tx1"/>
+                </a:solidFill>
+              </a:rPr>
+              <a:t>Spring </a:t>
+            </a:r>
+            <a:r>
+              <a:rPr lang="en-US" altLang="zh-CN" sz="1200" dirty="0" smtClean="0">
+                <a:solidFill>
+                  <a:schemeClr val="tx1"/>
+                </a:solidFill>
+              </a:rPr>
+              <a:t>Security</a:t>
+            </a:r>
+            <a:endParaRPr lang="zh-CN" altLang="en-US" sz="1200" dirty="0">
+              <a:solidFill>
+                <a:schemeClr val="tx1"/>
+              </a:solidFill>
+            </a:endParaRPr>
+          </a:p>
+        </p:txBody>
+      </p:sp>
+      <p:sp>
+        <p:nvSpPr>
+          <p:cNvPr id="13" name="圆角矩形 12"/>
+          <p:cNvSpPr/>
+          <p:nvPr/>
+        </p:nvSpPr>
+        <p:spPr>
+          <a:xfrm>
+            <a:off x="304800" y="2362200"/>
+            <a:ext cx="838200" cy="1371600"/>
+          </a:xfrm>
+          <a:prstGeom prst="roundRect">
+            <a:avLst/>
+          </a:prstGeom>
+          <a:solidFill>
+            <a:schemeClr val="tx2">
+              <a:lumMod val="20000"/>
+              <a:lumOff val="80000"/>
+            </a:schemeClr>
+          </a:solidFill>
+        </p:spPr>
+        <p:style>
+          <a:lnRef idx="2">
+            <a:schemeClr val="accent1">
+              <a:shade val="50000"/>
+            </a:schemeClr>
+          </a:lnRef>
+          <a:fillRef idx="1">
+            <a:schemeClr val="accent1"/>
+          </a:fillRef>
+          <a:effectRef idx="0">
+            <a:schemeClr val="accent1"/>
+          </a:effectRef>
+          <a:fontRef idx="minor">
+            <a:schemeClr val="lt1"/>
+          </a:fontRef>
+        </p:style>
+        <p:txBody>
+          <a:bodyPr rtlCol="0" anchor="ctr"/>
+          <a:lstStyle/>
+          <a:p>
+            <a:pPr algn="ctr"/>
+            <a:r>
+              <a:rPr lang="en-US" altLang="zh-CN" sz="1400" dirty="0" smtClean="0">
+                <a:solidFill>
+                  <a:schemeClr val="tx1"/>
+                </a:solidFill>
+              </a:rPr>
+              <a:t>Plugin</a:t>
+            </a:r>
+          </a:p>
+          <a:p>
+            <a:pPr algn="ctr"/>
+            <a:r>
+              <a:rPr lang="en-US" altLang="zh-CN" sz="1400" dirty="0" smtClean="0">
+                <a:solidFill>
+                  <a:schemeClr val="tx1"/>
+                </a:solidFill>
+              </a:rPr>
+              <a:t>System</a:t>
+            </a:r>
+            <a:endParaRPr lang="zh-CN" altLang="en-US" sz="1400" dirty="0">
+              <a:solidFill>
+                <a:schemeClr val="tx1"/>
+              </a:solidFill>
+            </a:endParaRPr>
+          </a:p>
+        </p:txBody>
+      </p:sp>
+      <p:sp>
+        <p:nvSpPr>
+          <p:cNvPr id="27" name="矩形 26"/>
+          <p:cNvSpPr/>
+          <p:nvPr/>
+        </p:nvSpPr>
+        <p:spPr>
+          <a:xfrm>
+            <a:off x="228600" y="5562600"/>
+            <a:ext cx="8839200" cy="838200"/>
+          </a:xfrm>
+          <a:prstGeom prst="rect">
+            <a:avLst/>
+          </a:prstGeom>
+          <a:ln>
+            <a:solidFill>
+              <a:schemeClr val="bg1">
+                <a:lumMod val="65000"/>
+              </a:schemeClr>
+            </a:solidFill>
+          </a:ln>
+        </p:spPr>
+        <p:style>
+          <a:lnRef idx="2">
+            <a:schemeClr val="accent1">
+              <a:shade val="50000"/>
+            </a:schemeClr>
+          </a:lnRef>
+          <a:fillRef idx="1">
+            <a:schemeClr val="accent1"/>
+          </a:fillRef>
+          <a:effectRef idx="0">
+            <a:schemeClr val="accent1"/>
+          </a:effectRef>
+          <a:fontRef idx="minor">
+            <a:schemeClr val="lt1"/>
+          </a:fontRef>
+        </p:style>
+        <p:txBody>
+          <a:bodyPr rtlCol="0" anchor="ctr"/>
+          <a:lstStyle/>
+          <a:p>
+            <a:pPr algn="ctr"/>
+            <a:endParaRPr lang="zh-CN" altLang="en-US"/>
+          </a:p>
+        </p:txBody>
+      </p:sp>
+      <p:sp>
+        <p:nvSpPr>
+          <p:cNvPr id="28" name="矩形 27"/>
+          <p:cNvSpPr/>
+          <p:nvPr/>
+        </p:nvSpPr>
+        <p:spPr>
+          <a:xfrm>
+            <a:off x="4800600" y="1752600"/>
+            <a:ext cx="4267200" cy="3581400"/>
+          </a:xfrm>
+          <a:prstGeom prst="rect">
+            <a:avLst/>
+          </a:prstGeom>
+          <a:solidFill>
+            <a:schemeClr val="tx2">
+              <a:lumMod val="40000"/>
+              <a:lumOff val="60000"/>
+            </a:schemeClr>
+          </a:solidFill>
+          <a:ln>
+            <a:solidFill>
+              <a:schemeClr val="tx2">
+                <a:lumMod val="60000"/>
+                <a:lumOff val="40000"/>
+              </a:schemeClr>
+            </a:solidFill>
+          </a:ln>
+        </p:spPr>
+        <p:style>
+          <a:lnRef idx="2">
+            <a:schemeClr val="accent1">
+              <a:shade val="50000"/>
+            </a:schemeClr>
+          </a:lnRef>
+          <a:fillRef idx="1">
+            <a:schemeClr val="accent1"/>
+          </a:fillRef>
+          <a:effectRef idx="0">
+            <a:schemeClr val="accent1"/>
+          </a:effectRef>
+          <a:fontRef idx="minor">
+            <a:schemeClr val="lt1"/>
+          </a:fontRef>
+        </p:style>
+        <p:txBody>
+          <a:bodyPr rtlCol="0" anchor="t"/>
+          <a:lstStyle/>
+          <a:p>
+            <a:pPr algn="ctr"/>
+            <a:endParaRPr lang="en-US" altLang="zh-CN" sz="2000" b="1" dirty="0" smtClean="0">
+              <a:latin typeface="Arial" pitchFamily="34" charset="0"/>
+              <a:cs typeface="Arial" pitchFamily="34" charset="0"/>
+            </a:endParaRPr>
+          </a:p>
+        </p:txBody>
+      </p:sp>
+      <p:sp>
+        <p:nvSpPr>
+          <p:cNvPr id="29" name="圆角矩形 28"/>
+          <p:cNvSpPr/>
+          <p:nvPr/>
+        </p:nvSpPr>
+        <p:spPr>
+          <a:xfrm>
+            <a:off x="1295400" y="5715000"/>
+            <a:ext cx="2209800" cy="609600"/>
+          </a:xfrm>
+          <a:prstGeom prst="roundRect">
+            <a:avLst/>
+          </a:prstGeom>
+          <a:solidFill>
+            <a:schemeClr val="tx2">
+              <a:lumMod val="40000"/>
+              <a:lumOff val="60000"/>
+            </a:schemeClr>
+          </a:solidFill>
+        </p:spPr>
+        <p:style>
+          <a:lnRef idx="2">
+            <a:schemeClr val="accent1">
+              <a:shade val="50000"/>
+            </a:schemeClr>
+          </a:lnRef>
+          <a:fillRef idx="1">
+            <a:schemeClr val="accent1"/>
+          </a:fillRef>
+          <a:effectRef idx="0">
+            <a:schemeClr val="accent1"/>
+          </a:effectRef>
+          <a:fontRef idx="minor">
+            <a:schemeClr val="lt1"/>
+          </a:fontRef>
+        </p:style>
+        <p:txBody>
+          <a:bodyPr rtlCol="0" anchor="ctr"/>
+          <a:lstStyle/>
+          <a:p>
+            <a:pPr algn="ctr"/>
+            <a:r>
+              <a:rPr lang="en-US" altLang="zh-CN" dirty="0" smtClean="0">
+                <a:solidFill>
+                  <a:schemeClr val="tx1"/>
+                </a:solidFill>
+              </a:rPr>
+              <a:t>DB</a:t>
+            </a:r>
+            <a:endParaRPr lang="zh-CN" altLang="en-US" dirty="0">
+              <a:solidFill>
+                <a:schemeClr val="tx1"/>
+              </a:solidFill>
+            </a:endParaRPr>
+          </a:p>
+        </p:txBody>
+      </p:sp>
+      <p:sp>
+        <p:nvSpPr>
+          <p:cNvPr id="30" name="圆角矩形 29"/>
+          <p:cNvSpPr/>
+          <p:nvPr/>
+        </p:nvSpPr>
+        <p:spPr>
+          <a:xfrm>
+            <a:off x="5638800" y="5715000"/>
+            <a:ext cx="2286000" cy="609600"/>
+          </a:xfrm>
+          <a:prstGeom prst="roundRect">
+            <a:avLst/>
+          </a:prstGeom>
+          <a:solidFill>
+            <a:schemeClr val="tx2">
+              <a:lumMod val="40000"/>
+              <a:lumOff val="60000"/>
+            </a:schemeClr>
+          </a:solidFill>
+        </p:spPr>
+        <p:style>
+          <a:lnRef idx="2">
+            <a:schemeClr val="accent1">
+              <a:shade val="50000"/>
+            </a:schemeClr>
+          </a:lnRef>
+          <a:fillRef idx="1">
+            <a:schemeClr val="accent1"/>
+          </a:fillRef>
+          <a:effectRef idx="0">
+            <a:schemeClr val="accent1"/>
+          </a:effectRef>
+          <a:fontRef idx="minor">
+            <a:schemeClr val="lt1"/>
+          </a:fontRef>
+        </p:style>
+        <p:txBody>
+          <a:bodyPr rtlCol="0" anchor="ctr"/>
+          <a:lstStyle/>
+          <a:p>
+            <a:pPr algn="ctr"/>
+            <a:r>
+              <a:rPr lang="en-US" altLang="zh-CN" dirty="0" smtClean="0">
+                <a:solidFill>
+                  <a:schemeClr val="tx1"/>
+                </a:solidFill>
+              </a:rPr>
+              <a:t>home directory</a:t>
+            </a:r>
+            <a:endParaRPr lang="zh-CN" altLang="en-US" dirty="0">
+              <a:solidFill>
+                <a:schemeClr val="tx1"/>
+              </a:solidFill>
+            </a:endParaRPr>
+          </a:p>
+        </p:txBody>
+      </p:sp>
+      <p:sp>
+        <p:nvSpPr>
+          <p:cNvPr id="36" name="下箭头 35"/>
+          <p:cNvSpPr/>
+          <p:nvPr/>
+        </p:nvSpPr>
+        <p:spPr>
+          <a:xfrm>
+            <a:off x="7010400" y="5334000"/>
+            <a:ext cx="457200" cy="381000"/>
+          </a:xfrm>
+          <a:prstGeom prst="downArrow">
+            <a:avLst/>
+          </a:prstGeom>
+          <a:solidFill>
+            <a:schemeClr val="tx2">
+              <a:lumMod val="40000"/>
+              <a:lumOff val="60000"/>
+            </a:schemeClr>
+          </a:solidFill>
+          <a:ln>
+            <a:solidFill>
+              <a:schemeClr val="accent1">
+                <a:lumMod val="40000"/>
+                <a:lumOff val="60000"/>
+              </a:schemeClr>
+            </a:solidFill>
+          </a:ln>
+        </p:spPr>
+        <p:style>
+          <a:lnRef idx="2">
+            <a:schemeClr val="accent1">
+              <a:shade val="50000"/>
+            </a:schemeClr>
+          </a:lnRef>
+          <a:fillRef idx="1">
+            <a:schemeClr val="accent1"/>
+          </a:fillRef>
+          <a:effectRef idx="0">
+            <a:schemeClr val="accent1"/>
+          </a:effectRef>
+          <a:fontRef idx="minor">
+            <a:schemeClr val="lt1"/>
+          </a:fontRef>
+        </p:style>
+        <p:txBody>
+          <a:bodyPr rtlCol="0" anchor="ctr"/>
+          <a:lstStyle/>
+          <a:p>
+            <a:pPr algn="ctr"/>
+            <a:endParaRPr lang="zh-CN" altLang="en-US"/>
+          </a:p>
+        </p:txBody>
+      </p:sp>
+      <p:sp>
+        <p:nvSpPr>
+          <p:cNvPr id="37" name="下箭头 36"/>
+          <p:cNvSpPr/>
+          <p:nvPr/>
+        </p:nvSpPr>
+        <p:spPr>
+          <a:xfrm rot="4093749">
+            <a:off x="4109041" y="4639138"/>
+            <a:ext cx="303805" cy="1688528"/>
+          </a:xfrm>
+          <a:prstGeom prst="downArrow">
+            <a:avLst/>
+          </a:prstGeom>
+          <a:solidFill>
+            <a:schemeClr val="tx2">
+              <a:lumMod val="40000"/>
+              <a:lumOff val="60000"/>
+            </a:schemeClr>
+          </a:solidFill>
+          <a:ln>
+            <a:solidFill>
+              <a:schemeClr val="accent1">
+                <a:lumMod val="40000"/>
+                <a:lumOff val="60000"/>
+              </a:schemeClr>
+            </a:solidFill>
+          </a:ln>
+        </p:spPr>
+        <p:style>
+          <a:lnRef idx="2">
+            <a:schemeClr val="accent1">
+              <a:shade val="50000"/>
+            </a:schemeClr>
+          </a:lnRef>
+          <a:fillRef idx="1">
+            <a:schemeClr val="accent1"/>
+          </a:fillRef>
+          <a:effectRef idx="0">
+            <a:schemeClr val="accent1"/>
+          </a:effectRef>
+          <a:fontRef idx="minor">
+            <a:schemeClr val="lt1"/>
+          </a:fontRef>
+        </p:style>
+        <p:txBody>
+          <a:bodyPr rtlCol="0" anchor="ctr"/>
+          <a:lstStyle/>
+          <a:p>
+            <a:pPr algn="ctr"/>
+            <a:endParaRPr lang="zh-CN" altLang="en-US"/>
+          </a:p>
+        </p:txBody>
+      </p:sp>
+      <p:sp>
+        <p:nvSpPr>
+          <p:cNvPr id="15" name="下箭头 14"/>
+          <p:cNvSpPr/>
+          <p:nvPr/>
+        </p:nvSpPr>
+        <p:spPr>
+          <a:xfrm>
+            <a:off x="1752600" y="5334000"/>
+            <a:ext cx="457200" cy="381000"/>
+          </a:xfrm>
+          <a:prstGeom prst="downArrow">
+            <a:avLst/>
+          </a:prstGeom>
+          <a:solidFill>
+            <a:schemeClr val="tx2">
+              <a:lumMod val="40000"/>
+              <a:lumOff val="60000"/>
+            </a:schemeClr>
+          </a:solidFill>
+          <a:ln>
+            <a:solidFill>
+              <a:schemeClr val="accent1">
+                <a:lumMod val="40000"/>
+                <a:lumOff val="60000"/>
+              </a:schemeClr>
+            </a:solidFill>
+          </a:ln>
+        </p:spPr>
+        <p:style>
+          <a:lnRef idx="2">
+            <a:schemeClr val="accent1">
+              <a:shade val="50000"/>
+            </a:schemeClr>
+          </a:lnRef>
+          <a:fillRef idx="1">
+            <a:schemeClr val="accent1"/>
+          </a:fillRef>
+          <a:effectRef idx="0">
+            <a:schemeClr val="accent1"/>
+          </a:effectRef>
+          <a:fontRef idx="minor">
+            <a:schemeClr val="lt1"/>
+          </a:fontRef>
+        </p:style>
+        <p:txBody>
+          <a:bodyPr rtlCol="0" anchor="ctr"/>
+          <a:lstStyle/>
+          <a:p>
+            <a:pPr algn="ctr"/>
+            <a:endParaRPr lang="zh-CN" altLang="en-US"/>
+          </a:p>
+        </p:txBody>
+      </p:sp>
+      <p:sp>
+        <p:nvSpPr>
+          <p:cNvPr id="14" name="下箭头 13"/>
+          <p:cNvSpPr/>
+          <p:nvPr/>
+        </p:nvSpPr>
+        <p:spPr>
+          <a:xfrm rot="17708137">
+            <a:off x="4908723" y="4753734"/>
+            <a:ext cx="310285" cy="1446068"/>
+          </a:xfrm>
+          <a:prstGeom prst="downArrow">
+            <a:avLst/>
+          </a:prstGeom>
+          <a:solidFill>
+            <a:schemeClr val="tx2">
+              <a:lumMod val="40000"/>
+              <a:lumOff val="60000"/>
+            </a:schemeClr>
+          </a:solidFill>
+          <a:ln>
+            <a:solidFill>
+              <a:schemeClr val="accent1">
+                <a:lumMod val="40000"/>
+                <a:lumOff val="60000"/>
+              </a:schemeClr>
+            </a:solidFill>
+          </a:ln>
+        </p:spPr>
+        <p:style>
+          <a:lnRef idx="2">
+            <a:schemeClr val="accent1">
+              <a:shade val="50000"/>
+            </a:schemeClr>
+          </a:lnRef>
+          <a:fillRef idx="1">
+            <a:schemeClr val="accent1"/>
+          </a:fillRef>
+          <a:effectRef idx="0">
+            <a:schemeClr val="accent1"/>
+          </a:effectRef>
+          <a:fontRef idx="minor">
+            <a:schemeClr val="lt1"/>
+          </a:fontRef>
+        </p:style>
+        <p:txBody>
+          <a:bodyPr rtlCol="0" anchor="ctr"/>
+          <a:lstStyle/>
+          <a:p>
+            <a:pPr algn="ctr"/>
+            <a:endParaRPr lang="zh-CN" altLang="en-US"/>
+          </a:p>
+        </p:txBody>
+      </p:sp>
+      <p:sp>
+        <p:nvSpPr>
+          <p:cNvPr id="38" name="圆角矩形 37"/>
+          <p:cNvSpPr/>
+          <p:nvPr/>
+        </p:nvSpPr>
+        <p:spPr>
+          <a:xfrm>
+            <a:off x="8153400" y="3886200"/>
+            <a:ext cx="838200" cy="1295400"/>
+          </a:xfrm>
+          <a:prstGeom prst="roundRect">
+            <a:avLst/>
+          </a:prstGeom>
+          <a:solidFill>
+            <a:schemeClr val="tx2">
+              <a:lumMod val="20000"/>
+              <a:lumOff val="80000"/>
+            </a:schemeClr>
+          </a:solidFill>
+        </p:spPr>
+        <p:style>
+          <a:lnRef idx="2">
+            <a:schemeClr val="accent1">
+              <a:shade val="50000"/>
+            </a:schemeClr>
+          </a:lnRef>
+          <a:fillRef idx="1">
+            <a:schemeClr val="accent1"/>
+          </a:fillRef>
+          <a:effectRef idx="0">
+            <a:schemeClr val="accent1"/>
+          </a:effectRef>
+          <a:fontRef idx="minor">
+            <a:schemeClr val="lt1"/>
+          </a:fontRef>
+        </p:style>
+        <p:txBody>
+          <a:bodyPr rtlCol="0" anchor="ctr"/>
+          <a:lstStyle/>
+          <a:p>
+            <a:pPr algn="ctr"/>
+            <a:r>
+              <a:rPr lang="en-US" altLang="zh-CN" sz="1400" dirty="0" smtClean="0">
+                <a:solidFill>
+                  <a:schemeClr val="tx1"/>
+                </a:solidFill>
+              </a:rPr>
+              <a:t>Spring </a:t>
+            </a:r>
+            <a:r>
+              <a:rPr lang="en-US" altLang="zh-CN" sz="1200" dirty="0" smtClean="0">
+                <a:solidFill>
+                  <a:schemeClr val="tx1"/>
+                </a:solidFill>
+              </a:rPr>
+              <a:t>Security</a:t>
+            </a:r>
+            <a:endParaRPr lang="zh-CN" altLang="en-US" sz="1200" dirty="0">
+              <a:solidFill>
+                <a:schemeClr val="tx1"/>
+              </a:solidFill>
+            </a:endParaRPr>
+          </a:p>
+        </p:txBody>
+      </p:sp>
+      <p:sp>
+        <p:nvSpPr>
+          <p:cNvPr id="39" name="圆角矩形 38"/>
+          <p:cNvSpPr/>
+          <p:nvPr/>
+        </p:nvSpPr>
+        <p:spPr>
+          <a:xfrm>
+            <a:off x="8153400" y="2362200"/>
+            <a:ext cx="838200" cy="1371600"/>
+          </a:xfrm>
+          <a:prstGeom prst="roundRect">
+            <a:avLst/>
+          </a:prstGeom>
+          <a:solidFill>
+            <a:schemeClr val="tx2">
+              <a:lumMod val="20000"/>
+              <a:lumOff val="80000"/>
+            </a:schemeClr>
+          </a:solidFill>
+        </p:spPr>
+        <p:style>
+          <a:lnRef idx="2">
+            <a:schemeClr val="accent1">
+              <a:shade val="50000"/>
+            </a:schemeClr>
+          </a:lnRef>
+          <a:fillRef idx="1">
+            <a:schemeClr val="accent1"/>
+          </a:fillRef>
+          <a:effectRef idx="0">
+            <a:schemeClr val="accent1"/>
+          </a:effectRef>
+          <a:fontRef idx="minor">
+            <a:schemeClr val="lt1"/>
+          </a:fontRef>
+        </p:style>
+        <p:txBody>
+          <a:bodyPr rtlCol="0" anchor="ctr"/>
+          <a:lstStyle/>
+          <a:p>
+            <a:pPr algn="ctr"/>
+            <a:r>
+              <a:rPr lang="en-US" altLang="zh-CN" sz="1400" dirty="0" smtClean="0">
+                <a:solidFill>
+                  <a:schemeClr val="tx1"/>
+                </a:solidFill>
+              </a:rPr>
+              <a:t>Plugin</a:t>
+            </a:r>
+          </a:p>
+          <a:p>
+            <a:pPr algn="ctr"/>
+            <a:r>
+              <a:rPr lang="en-US" altLang="zh-CN" sz="1400" dirty="0" smtClean="0">
+                <a:solidFill>
+                  <a:schemeClr val="tx1"/>
+                </a:solidFill>
+              </a:rPr>
+              <a:t>System</a:t>
+            </a:r>
+            <a:endParaRPr lang="zh-CN" altLang="en-US" sz="1400" dirty="0">
+              <a:solidFill>
+                <a:schemeClr val="tx1"/>
+              </a:solidFill>
+            </a:endParaRPr>
+          </a:p>
+        </p:txBody>
+      </p:sp>
+      <p:sp>
+        <p:nvSpPr>
+          <p:cNvPr id="11" name="圆角矩形 10"/>
+          <p:cNvSpPr/>
+          <p:nvPr/>
+        </p:nvSpPr>
+        <p:spPr>
+          <a:xfrm>
+            <a:off x="1371600" y="3886200"/>
+            <a:ext cx="6629400" cy="762000"/>
+          </a:xfrm>
+          <a:prstGeom prst="roundRect">
+            <a:avLst/>
+          </a:prstGeom>
+          <a:solidFill>
+            <a:schemeClr val="tx2">
+              <a:lumMod val="20000"/>
+              <a:lumOff val="80000"/>
+            </a:schemeClr>
+          </a:solidFill>
+        </p:spPr>
+        <p:style>
+          <a:lnRef idx="2">
+            <a:schemeClr val="accent1">
+              <a:shade val="50000"/>
+            </a:schemeClr>
+          </a:lnRef>
+          <a:fillRef idx="1">
+            <a:schemeClr val="accent1"/>
+          </a:fillRef>
+          <a:effectRef idx="0">
+            <a:schemeClr val="accent1"/>
+          </a:effectRef>
+          <a:fontRef idx="minor">
+            <a:schemeClr val="lt1"/>
+          </a:fontRef>
+        </p:style>
+        <p:txBody>
+          <a:bodyPr rtlCol="0" anchor="ctr"/>
+          <a:lstStyle/>
+          <a:p>
+            <a:pPr algn="ctr"/>
+            <a:endParaRPr lang="zh-CN" altLang="en-US" sz="1400" dirty="0"/>
+          </a:p>
+        </p:txBody>
+      </p:sp>
+      <p:sp>
+        <p:nvSpPr>
+          <p:cNvPr id="40" name="圆角矩形 39"/>
+          <p:cNvSpPr/>
+          <p:nvPr/>
+        </p:nvSpPr>
+        <p:spPr>
+          <a:xfrm>
+            <a:off x="1905000" y="4191000"/>
+            <a:ext cx="2057400" cy="381000"/>
+          </a:xfrm>
+          <a:prstGeom prst="roundRect">
+            <a:avLst/>
+          </a:prstGeom>
+          <a:solidFill>
+            <a:schemeClr val="tx2">
+              <a:lumMod val="20000"/>
+              <a:lumOff val="80000"/>
+            </a:schemeClr>
+          </a:solidFill>
+        </p:spPr>
+        <p:style>
+          <a:lnRef idx="2">
+            <a:schemeClr val="accent1">
+              <a:shade val="50000"/>
+            </a:schemeClr>
+          </a:lnRef>
+          <a:fillRef idx="1">
+            <a:schemeClr val="accent1"/>
+          </a:fillRef>
+          <a:effectRef idx="0">
+            <a:schemeClr val="accent1"/>
+          </a:effectRef>
+          <a:fontRef idx="minor">
+            <a:schemeClr val="lt1"/>
+          </a:fontRef>
+        </p:style>
+        <p:txBody>
+          <a:bodyPr rtlCol="0" anchor="ctr"/>
+          <a:lstStyle/>
+          <a:p>
+            <a:pPr algn="ctr"/>
+            <a:r>
+              <a:rPr lang="en-US" altLang="zh-CN" sz="1400" dirty="0" smtClean="0">
+                <a:solidFill>
+                  <a:schemeClr val="tx1"/>
+                </a:solidFill>
+              </a:rPr>
+              <a:t>Not replicated cache</a:t>
+            </a:r>
+            <a:endParaRPr lang="zh-CN" altLang="en-US" sz="1400" dirty="0">
+              <a:solidFill>
+                <a:schemeClr val="tx1"/>
+              </a:solidFill>
+            </a:endParaRPr>
+          </a:p>
+        </p:txBody>
+      </p:sp>
+      <p:sp>
+        <p:nvSpPr>
+          <p:cNvPr id="41" name="TextBox 40"/>
+          <p:cNvSpPr txBox="1"/>
+          <p:nvPr/>
+        </p:nvSpPr>
+        <p:spPr>
+          <a:xfrm>
+            <a:off x="3733800" y="3886200"/>
+            <a:ext cx="1939057" cy="369332"/>
+          </a:xfrm>
+          <a:prstGeom prst="rect">
+            <a:avLst/>
+          </a:prstGeom>
+          <a:noFill/>
+        </p:spPr>
+        <p:txBody>
+          <a:bodyPr wrap="none" rtlCol="0">
+            <a:spAutoFit/>
+          </a:bodyPr>
+          <a:lstStyle/>
+          <a:p>
+            <a:r>
+              <a:rPr lang="en-US" altLang="zh-CN" dirty="0" smtClean="0"/>
+              <a:t>Replicated </a:t>
+            </a:r>
+            <a:r>
+              <a:rPr lang="en-US" altLang="zh-CN" dirty="0" smtClean="0"/>
+              <a:t>cache</a:t>
+            </a:r>
+            <a:endParaRPr lang="zh-CN" altLang="en-US" dirty="0" smtClean="0"/>
+          </a:p>
+        </p:txBody>
+      </p:sp>
+      <p:sp>
+        <p:nvSpPr>
+          <p:cNvPr id="45" name="圆角矩形 44"/>
+          <p:cNvSpPr/>
+          <p:nvPr/>
+        </p:nvSpPr>
+        <p:spPr>
+          <a:xfrm>
+            <a:off x="4953000" y="4724400"/>
+            <a:ext cx="1371600" cy="457200"/>
+          </a:xfrm>
+          <a:prstGeom prst="roundRect">
+            <a:avLst/>
+          </a:prstGeom>
+          <a:solidFill>
+            <a:schemeClr val="tx2">
+              <a:lumMod val="20000"/>
+              <a:lumOff val="80000"/>
+            </a:schemeClr>
+          </a:solidFill>
+        </p:spPr>
+        <p:style>
+          <a:lnRef idx="2">
+            <a:schemeClr val="accent1">
+              <a:shade val="50000"/>
+            </a:schemeClr>
+          </a:lnRef>
+          <a:fillRef idx="1">
+            <a:schemeClr val="accent1"/>
+          </a:fillRef>
+          <a:effectRef idx="0">
+            <a:schemeClr val="accent1"/>
+          </a:effectRef>
+          <a:fontRef idx="minor">
+            <a:schemeClr val="lt1"/>
+          </a:fontRef>
+        </p:style>
+        <p:txBody>
+          <a:bodyPr rtlCol="0" anchor="ctr"/>
+          <a:lstStyle/>
+          <a:p>
+            <a:pPr algn="ctr"/>
+            <a:r>
+              <a:rPr lang="en-US" altLang="zh-CN" sz="1400" dirty="0" smtClean="0">
+                <a:solidFill>
+                  <a:schemeClr val="tx1"/>
+                </a:solidFill>
+              </a:rPr>
+              <a:t>Spring Data</a:t>
+            </a:r>
+            <a:endParaRPr lang="zh-CN" altLang="en-US" sz="1400" dirty="0">
+              <a:solidFill>
+                <a:schemeClr val="tx1"/>
+              </a:solidFill>
+            </a:endParaRPr>
+          </a:p>
+        </p:txBody>
+      </p:sp>
+      <p:sp>
+        <p:nvSpPr>
+          <p:cNvPr id="46" name="圆角矩形 45"/>
+          <p:cNvSpPr/>
+          <p:nvPr/>
+        </p:nvSpPr>
+        <p:spPr>
+          <a:xfrm>
+            <a:off x="6400800" y="4724400"/>
+            <a:ext cx="1600200" cy="457200"/>
+          </a:xfrm>
+          <a:prstGeom prst="roundRect">
+            <a:avLst/>
+          </a:prstGeom>
+          <a:solidFill>
+            <a:schemeClr val="tx2">
+              <a:lumMod val="20000"/>
+              <a:lumOff val="80000"/>
+            </a:schemeClr>
+          </a:solidFill>
+        </p:spPr>
+        <p:style>
+          <a:lnRef idx="2">
+            <a:schemeClr val="accent1">
+              <a:shade val="50000"/>
+            </a:schemeClr>
+          </a:lnRef>
+          <a:fillRef idx="1">
+            <a:schemeClr val="accent1"/>
+          </a:fillRef>
+          <a:effectRef idx="0">
+            <a:schemeClr val="accent1"/>
+          </a:effectRef>
+          <a:fontRef idx="minor">
+            <a:schemeClr val="lt1"/>
+          </a:fontRef>
+        </p:style>
+        <p:txBody>
+          <a:bodyPr rtlCol="0" anchor="ctr"/>
+          <a:lstStyle/>
+          <a:p>
+            <a:pPr algn="ctr"/>
+            <a:r>
+              <a:rPr lang="en-US" altLang="zh-CN" sz="1400" dirty="0" smtClean="0">
+                <a:solidFill>
+                  <a:schemeClr val="tx1"/>
+                </a:solidFill>
+              </a:rPr>
+              <a:t>Embedded SVN</a:t>
+            </a:r>
+            <a:endParaRPr lang="zh-CN" altLang="en-US" sz="1400" dirty="0">
+              <a:solidFill>
+                <a:schemeClr val="tx1"/>
+              </a:solidFill>
+            </a:endParaRPr>
+          </a:p>
+        </p:txBody>
+      </p:sp>
+      <p:sp>
+        <p:nvSpPr>
+          <p:cNvPr id="47" name="圆角矩形 46"/>
+          <p:cNvSpPr/>
+          <p:nvPr/>
+        </p:nvSpPr>
+        <p:spPr>
+          <a:xfrm>
+            <a:off x="5562600" y="4191000"/>
+            <a:ext cx="2057400" cy="381000"/>
+          </a:xfrm>
+          <a:prstGeom prst="roundRect">
+            <a:avLst/>
+          </a:prstGeom>
+          <a:solidFill>
+            <a:schemeClr val="tx2">
+              <a:lumMod val="20000"/>
+              <a:lumOff val="80000"/>
+            </a:schemeClr>
+          </a:solidFill>
+        </p:spPr>
+        <p:style>
+          <a:lnRef idx="2">
+            <a:schemeClr val="accent1">
+              <a:shade val="50000"/>
+            </a:schemeClr>
+          </a:lnRef>
+          <a:fillRef idx="1">
+            <a:schemeClr val="accent1"/>
+          </a:fillRef>
+          <a:effectRef idx="0">
+            <a:schemeClr val="accent1"/>
+          </a:effectRef>
+          <a:fontRef idx="minor">
+            <a:schemeClr val="lt1"/>
+          </a:fontRef>
+        </p:style>
+        <p:txBody>
+          <a:bodyPr rtlCol="0" anchor="ctr"/>
+          <a:lstStyle/>
+          <a:p>
+            <a:pPr algn="ctr"/>
+            <a:r>
+              <a:rPr lang="en-US" altLang="zh-CN" sz="1400" dirty="0" smtClean="0">
+                <a:solidFill>
+                  <a:schemeClr val="tx1"/>
+                </a:solidFill>
+              </a:rPr>
+              <a:t>Not replicated cache</a:t>
+            </a:r>
+            <a:endParaRPr lang="zh-CN" altLang="en-US" sz="1400" dirty="0">
+              <a:solidFill>
+                <a:schemeClr val="tx1"/>
+              </a:solidFill>
+            </a:endParaRPr>
+          </a:p>
+        </p:txBody>
+      </p:sp>
+      <p:sp>
+        <p:nvSpPr>
+          <p:cNvPr id="48" name="TextBox 47"/>
+          <p:cNvSpPr txBox="1"/>
+          <p:nvPr/>
+        </p:nvSpPr>
+        <p:spPr>
+          <a:xfrm>
+            <a:off x="1295400" y="1828800"/>
+            <a:ext cx="2561920" cy="400110"/>
+          </a:xfrm>
+          <a:prstGeom prst="rect">
+            <a:avLst/>
+          </a:prstGeom>
+          <a:noFill/>
+        </p:spPr>
+        <p:txBody>
+          <a:bodyPr wrap="none" rtlCol="0">
+            <a:spAutoFit/>
+          </a:bodyPr>
+          <a:lstStyle/>
+          <a:p>
+            <a:r>
+              <a:rPr lang="en-US" altLang="zh-CN" sz="2000" b="1" dirty="0" smtClean="0">
+                <a:solidFill>
+                  <a:schemeClr val="bg1"/>
+                </a:solidFill>
+                <a:latin typeface="Arial" pitchFamily="34" charset="0"/>
+                <a:cs typeface="Arial" pitchFamily="34" charset="0"/>
+              </a:rPr>
+              <a:t>nGrinder Controller</a:t>
+            </a:r>
+            <a:endParaRPr lang="zh-CN" altLang="en-US" sz="2000" dirty="0">
+              <a:solidFill>
+                <a:schemeClr val="bg1"/>
+              </a:solidFill>
+            </a:endParaRPr>
+          </a:p>
+        </p:txBody>
+      </p:sp>
+      <p:sp>
+        <p:nvSpPr>
+          <p:cNvPr id="49" name="TextBox 48"/>
+          <p:cNvSpPr txBox="1"/>
+          <p:nvPr/>
+        </p:nvSpPr>
+        <p:spPr>
+          <a:xfrm>
+            <a:off x="5638800" y="1905000"/>
+            <a:ext cx="2561920" cy="400110"/>
+          </a:xfrm>
+          <a:prstGeom prst="rect">
+            <a:avLst/>
+          </a:prstGeom>
+          <a:noFill/>
+        </p:spPr>
+        <p:txBody>
+          <a:bodyPr wrap="none" rtlCol="0">
+            <a:spAutoFit/>
+          </a:bodyPr>
+          <a:lstStyle/>
+          <a:p>
+            <a:r>
+              <a:rPr lang="en-US" altLang="zh-CN" sz="2000" b="1" dirty="0" smtClean="0">
+                <a:solidFill>
+                  <a:schemeClr val="bg1"/>
+                </a:solidFill>
+                <a:latin typeface="Arial" pitchFamily="34" charset="0"/>
+                <a:cs typeface="Arial" pitchFamily="34" charset="0"/>
+              </a:rPr>
+              <a:t>nGrinder Controller</a:t>
+            </a:r>
+            <a:endParaRPr lang="zh-CN" altLang="en-US" sz="2000" dirty="0">
+              <a:solidFill>
+                <a:schemeClr val="bg1"/>
+              </a:solidFill>
+            </a:endParaRPr>
+          </a:p>
+        </p:txBody>
+      </p:sp>
+      <p:grpSp>
+        <p:nvGrpSpPr>
+          <p:cNvPr id="57" name="组合 56"/>
+          <p:cNvGrpSpPr/>
+          <p:nvPr/>
+        </p:nvGrpSpPr>
+        <p:grpSpPr>
+          <a:xfrm>
+            <a:off x="2667000" y="2362200"/>
+            <a:ext cx="1752600" cy="1371600"/>
+            <a:chOff x="5943600" y="2514600"/>
+            <a:chExt cx="1828800" cy="1371600"/>
+          </a:xfrm>
+        </p:grpSpPr>
+        <p:sp>
+          <p:nvSpPr>
+            <p:cNvPr id="58" name="圆角矩形 57"/>
+            <p:cNvSpPr/>
+            <p:nvPr/>
+          </p:nvSpPr>
+          <p:spPr>
+            <a:xfrm>
+              <a:off x="5943600" y="2514600"/>
+              <a:ext cx="1828800" cy="1371600"/>
+            </a:xfrm>
+            <a:prstGeom prst="roundRect">
+              <a:avLst/>
+            </a:prstGeom>
+            <a:solidFill>
+              <a:schemeClr val="tx2">
+                <a:lumMod val="20000"/>
+                <a:lumOff val="80000"/>
+              </a:schemeClr>
+            </a:solidFill>
+          </p:spPr>
+          <p:style>
+            <a:lnRef idx="2">
+              <a:schemeClr val="accent1">
+                <a:shade val="50000"/>
+              </a:schemeClr>
+            </a:lnRef>
+            <a:fillRef idx="1">
+              <a:schemeClr val="accent1"/>
+            </a:fillRef>
+            <a:effectRef idx="0">
+              <a:schemeClr val="accent1"/>
+            </a:effectRef>
+            <a:fontRef idx="minor">
+              <a:schemeClr val="lt1"/>
+            </a:fontRef>
+          </p:style>
+          <p:txBody>
+            <a:bodyPr rtlCol="0" anchor="ctr"/>
+            <a:lstStyle/>
+            <a:p>
+              <a:pPr algn="ctr"/>
+              <a:endParaRPr lang="zh-CN" altLang="en-US" sz="1400" dirty="0">
+                <a:solidFill>
+                  <a:schemeClr val="tx1"/>
+                </a:solidFill>
+                <a:latin typeface="Arial" pitchFamily="34" charset="0"/>
+                <a:cs typeface="Arial" pitchFamily="34" charset="0"/>
+              </a:endParaRPr>
+            </a:p>
+          </p:txBody>
+        </p:sp>
+        <p:sp>
+          <p:nvSpPr>
+            <p:cNvPr id="59" name="모서리가 둥근 직사각형 9"/>
+            <p:cNvSpPr/>
+            <p:nvPr/>
+          </p:nvSpPr>
+          <p:spPr>
+            <a:xfrm>
+              <a:off x="6400800" y="3352800"/>
+              <a:ext cx="1219200" cy="304800"/>
+            </a:xfrm>
+            <a:prstGeom prst="roundRect">
+              <a:avLst/>
+            </a:prstGeom>
+          </p:spPr>
+          <p:style>
+            <a:lnRef idx="1">
+              <a:schemeClr val="accent1"/>
+            </a:lnRef>
+            <a:fillRef idx="3">
+              <a:schemeClr val="accent1"/>
+            </a:fillRef>
+            <a:effectRef idx="2">
+              <a:schemeClr val="accent1"/>
+            </a:effectRef>
+            <a:fontRef idx="minor">
+              <a:schemeClr val="lt1"/>
+            </a:fontRef>
+          </p:style>
+          <p:txBody>
+            <a:bodyPr rtlCol="0" anchor="ctr"/>
+            <a:lstStyle/>
+            <a:p>
+              <a:pPr algn="ctr"/>
+              <a:endParaRPr lang="ko-KR" altLang="en-US" sz="1400" dirty="0">
+                <a:latin typeface="Arial" pitchFamily="34" charset="0"/>
+                <a:cs typeface="Arial" pitchFamily="34" charset="0"/>
+              </a:endParaRPr>
+            </a:p>
+          </p:txBody>
+        </p:sp>
+        <p:sp>
+          <p:nvSpPr>
+            <p:cNvPr id="60" name="모서리가 둥근 직사각형 9"/>
+            <p:cNvSpPr/>
+            <p:nvPr/>
+          </p:nvSpPr>
+          <p:spPr>
+            <a:xfrm>
+              <a:off x="6248400" y="3276600"/>
+              <a:ext cx="1219200" cy="304800"/>
+            </a:xfrm>
+            <a:prstGeom prst="roundRect">
+              <a:avLst/>
+            </a:prstGeom>
+          </p:spPr>
+          <p:style>
+            <a:lnRef idx="1">
+              <a:schemeClr val="accent1"/>
+            </a:lnRef>
+            <a:fillRef idx="3">
+              <a:schemeClr val="accent1"/>
+            </a:fillRef>
+            <a:effectRef idx="2">
+              <a:schemeClr val="accent1"/>
+            </a:effectRef>
+            <a:fontRef idx="minor">
+              <a:schemeClr val="lt1"/>
+            </a:fontRef>
+          </p:style>
+          <p:txBody>
+            <a:bodyPr rtlCol="0" anchor="ctr"/>
+            <a:lstStyle/>
+            <a:p>
+              <a:pPr algn="ctr"/>
+              <a:endParaRPr lang="ko-KR" altLang="en-US" sz="1400" dirty="0">
+                <a:latin typeface="Arial" pitchFamily="34" charset="0"/>
+                <a:cs typeface="Arial" pitchFamily="34" charset="0"/>
+              </a:endParaRPr>
+            </a:p>
+          </p:txBody>
+        </p:sp>
+        <p:sp>
+          <p:nvSpPr>
+            <p:cNvPr id="61" name="모서리가 둥근 직사각형 9"/>
+            <p:cNvSpPr/>
+            <p:nvPr/>
+          </p:nvSpPr>
+          <p:spPr>
+            <a:xfrm>
+              <a:off x="6096000" y="3200400"/>
+              <a:ext cx="1219200" cy="304800"/>
+            </a:xfrm>
+            <a:prstGeom prst="roundRect">
+              <a:avLst/>
+            </a:prstGeom>
+          </p:spPr>
+          <p:style>
+            <a:lnRef idx="1">
+              <a:schemeClr val="accent1"/>
+            </a:lnRef>
+            <a:fillRef idx="3">
+              <a:schemeClr val="accent1"/>
+            </a:fillRef>
+            <a:effectRef idx="2">
+              <a:schemeClr val="accent1"/>
+            </a:effectRef>
+            <a:fontRef idx="minor">
+              <a:schemeClr val="lt1"/>
+            </a:fontRef>
+          </p:style>
+          <p:txBody>
+            <a:bodyPr rtlCol="0" anchor="ctr"/>
+            <a:lstStyle/>
+            <a:p>
+              <a:pPr algn="ctr"/>
+              <a:r>
+                <a:rPr lang="en-US" altLang="ko-KR" sz="1050" dirty="0" smtClean="0">
+                  <a:latin typeface="Arial" pitchFamily="34" charset="0"/>
+                  <a:cs typeface="Arial" pitchFamily="34" charset="0"/>
+                </a:rPr>
+                <a:t>Grinder </a:t>
+              </a:r>
+              <a:r>
+                <a:rPr lang="en-US" altLang="ko-KR" sz="1050" dirty="0" smtClean="0">
+                  <a:latin typeface="Arial" pitchFamily="34" charset="0"/>
+                  <a:cs typeface="Arial" pitchFamily="34" charset="0"/>
+                </a:rPr>
+                <a:t>Console</a:t>
+              </a:r>
+              <a:endParaRPr lang="ko-KR" altLang="en-US" sz="1050" dirty="0">
+                <a:latin typeface="Arial" pitchFamily="34" charset="0"/>
+                <a:cs typeface="Arial" pitchFamily="34" charset="0"/>
+              </a:endParaRPr>
+            </a:p>
+          </p:txBody>
+        </p:sp>
+        <p:sp>
+          <p:nvSpPr>
+            <p:cNvPr id="62" name="TextBox 61"/>
+            <p:cNvSpPr txBox="1"/>
+            <p:nvPr/>
+          </p:nvSpPr>
+          <p:spPr>
+            <a:xfrm>
+              <a:off x="6019800" y="2667000"/>
+              <a:ext cx="1616148" cy="307777"/>
+            </a:xfrm>
+            <a:prstGeom prst="rect">
+              <a:avLst/>
+            </a:prstGeom>
+            <a:noFill/>
+          </p:spPr>
+          <p:txBody>
+            <a:bodyPr wrap="none" rtlCol="0">
+              <a:spAutoFit/>
+            </a:bodyPr>
+            <a:lstStyle/>
+            <a:p>
+              <a:r>
+                <a:rPr lang="en-US" altLang="zh-CN" sz="1400" dirty="0" smtClean="0">
+                  <a:latin typeface="Arial" pitchFamily="34" charset="0"/>
+                  <a:cs typeface="Arial" pitchFamily="34" charset="0"/>
+                </a:rPr>
+                <a:t>Console manager</a:t>
+              </a:r>
+              <a:endParaRPr lang="zh-CN" altLang="en-US" sz="1400" dirty="0">
+                <a:latin typeface="Arial" pitchFamily="34" charset="0"/>
+                <a:cs typeface="Arial" pitchFamily="34" charset="0"/>
+              </a:endParaRPr>
+            </a:p>
+          </p:txBody>
+        </p:sp>
+      </p:grpSp>
+      <p:grpSp>
+        <p:nvGrpSpPr>
+          <p:cNvPr id="63" name="组合 62"/>
+          <p:cNvGrpSpPr/>
+          <p:nvPr/>
+        </p:nvGrpSpPr>
+        <p:grpSpPr>
+          <a:xfrm>
+            <a:off x="1371600" y="2362200"/>
+            <a:ext cx="1143000" cy="1371600"/>
+            <a:chOff x="4118812" y="2514600"/>
+            <a:chExt cx="1203158" cy="1371600"/>
+          </a:xfrm>
+        </p:grpSpPr>
+        <p:sp>
+          <p:nvSpPr>
+            <p:cNvPr id="64" name="圆角矩形 63"/>
+            <p:cNvSpPr/>
+            <p:nvPr/>
+          </p:nvSpPr>
+          <p:spPr>
+            <a:xfrm>
+              <a:off x="4118812" y="2514600"/>
+              <a:ext cx="1203158" cy="1371600"/>
+            </a:xfrm>
+            <a:prstGeom prst="roundRect">
+              <a:avLst/>
+            </a:prstGeom>
+            <a:solidFill>
+              <a:schemeClr val="tx2">
+                <a:lumMod val="20000"/>
+                <a:lumOff val="80000"/>
+              </a:schemeClr>
+            </a:solidFill>
+          </p:spPr>
+          <p:style>
+            <a:lnRef idx="2">
+              <a:schemeClr val="accent1">
+                <a:shade val="50000"/>
+              </a:schemeClr>
+            </a:lnRef>
+            <a:fillRef idx="1">
+              <a:schemeClr val="accent1"/>
+            </a:fillRef>
+            <a:effectRef idx="0">
+              <a:schemeClr val="accent1"/>
+            </a:effectRef>
+            <a:fontRef idx="minor">
+              <a:schemeClr val="lt1"/>
+            </a:fontRef>
+          </p:style>
+          <p:txBody>
+            <a:bodyPr rtlCol="0" anchor="ctr"/>
+            <a:lstStyle/>
+            <a:p>
+              <a:pPr algn="ctr"/>
+              <a:endParaRPr lang="zh-CN" altLang="en-US" sz="1400" dirty="0">
+                <a:solidFill>
+                  <a:schemeClr val="tx1"/>
+                </a:solidFill>
+                <a:latin typeface="Arial" pitchFamily="34" charset="0"/>
+                <a:cs typeface="Arial" pitchFamily="34" charset="0"/>
+              </a:endParaRPr>
+            </a:p>
+          </p:txBody>
+        </p:sp>
+        <p:sp>
+          <p:nvSpPr>
+            <p:cNvPr id="65" name="TextBox 64"/>
+            <p:cNvSpPr txBox="1"/>
+            <p:nvPr/>
+          </p:nvSpPr>
+          <p:spPr>
+            <a:xfrm>
+              <a:off x="4199023" y="2743200"/>
+              <a:ext cx="1000338" cy="954107"/>
+            </a:xfrm>
+            <a:prstGeom prst="rect">
+              <a:avLst/>
+            </a:prstGeom>
+            <a:noFill/>
+          </p:spPr>
+          <p:txBody>
+            <a:bodyPr wrap="none" rtlCol="0">
+              <a:spAutoFit/>
+            </a:bodyPr>
+            <a:lstStyle/>
+            <a:p>
+              <a:r>
+                <a:rPr lang="en-US" altLang="zh-CN" sz="1400" dirty="0" smtClean="0">
+                  <a:latin typeface="Arial" pitchFamily="34" charset="0"/>
+                  <a:cs typeface="Arial" pitchFamily="34" charset="0"/>
+                </a:rPr>
+                <a:t>nGrinder</a:t>
+              </a:r>
+            </a:p>
+            <a:p>
+              <a:r>
+                <a:rPr lang="en-US" altLang="zh-CN" sz="1400" dirty="0" smtClean="0">
+                  <a:latin typeface="Arial" pitchFamily="34" charset="0"/>
+                  <a:cs typeface="Arial" pitchFamily="34" charset="0"/>
+                </a:rPr>
+                <a:t>Controller,</a:t>
+              </a:r>
+            </a:p>
+            <a:p>
+              <a:r>
+                <a:rPr lang="en-US" altLang="zh-CN" sz="1400" dirty="0" smtClean="0">
+                  <a:latin typeface="Arial" pitchFamily="34" charset="0"/>
+                  <a:cs typeface="Arial" pitchFamily="34" charset="0"/>
+                </a:rPr>
+                <a:t>Services,</a:t>
+              </a:r>
+            </a:p>
+            <a:p>
+              <a:r>
+                <a:rPr lang="en-US" altLang="zh-CN" sz="1400" dirty="0" smtClean="0">
+                  <a:latin typeface="Arial" pitchFamily="34" charset="0"/>
+                  <a:cs typeface="Arial" pitchFamily="34" charset="0"/>
+                </a:rPr>
+                <a:t>Utilities.</a:t>
+              </a:r>
+              <a:endParaRPr lang="zh-CN" altLang="en-US" sz="1400" dirty="0">
+                <a:latin typeface="Arial" pitchFamily="34" charset="0"/>
+                <a:cs typeface="Arial" pitchFamily="34" charset="0"/>
+              </a:endParaRPr>
+            </a:p>
+          </p:txBody>
+        </p:sp>
+      </p:grpSp>
+      <p:grpSp>
+        <p:nvGrpSpPr>
+          <p:cNvPr id="66" name="组合 65"/>
+          <p:cNvGrpSpPr/>
+          <p:nvPr/>
+        </p:nvGrpSpPr>
+        <p:grpSpPr>
+          <a:xfrm>
+            <a:off x="6248400" y="2362200"/>
+            <a:ext cx="1752600" cy="1371600"/>
+            <a:chOff x="5943600" y="2514600"/>
+            <a:chExt cx="1828800" cy="1371600"/>
+          </a:xfrm>
+        </p:grpSpPr>
+        <p:sp>
+          <p:nvSpPr>
+            <p:cNvPr id="67" name="圆角矩形 66"/>
+            <p:cNvSpPr/>
+            <p:nvPr/>
+          </p:nvSpPr>
+          <p:spPr>
+            <a:xfrm>
+              <a:off x="5943600" y="2514600"/>
+              <a:ext cx="1828800" cy="1371600"/>
+            </a:xfrm>
+            <a:prstGeom prst="roundRect">
+              <a:avLst/>
+            </a:prstGeom>
+            <a:solidFill>
+              <a:schemeClr val="tx2">
+                <a:lumMod val="20000"/>
+                <a:lumOff val="80000"/>
+              </a:schemeClr>
+            </a:solidFill>
+          </p:spPr>
+          <p:style>
+            <a:lnRef idx="2">
+              <a:schemeClr val="accent1">
+                <a:shade val="50000"/>
+              </a:schemeClr>
+            </a:lnRef>
+            <a:fillRef idx="1">
+              <a:schemeClr val="accent1"/>
+            </a:fillRef>
+            <a:effectRef idx="0">
+              <a:schemeClr val="accent1"/>
+            </a:effectRef>
+            <a:fontRef idx="minor">
+              <a:schemeClr val="lt1"/>
+            </a:fontRef>
+          </p:style>
+          <p:txBody>
+            <a:bodyPr rtlCol="0" anchor="ctr"/>
+            <a:lstStyle/>
+            <a:p>
+              <a:pPr algn="ctr"/>
+              <a:endParaRPr lang="zh-CN" altLang="en-US" sz="1400" dirty="0">
+                <a:solidFill>
+                  <a:schemeClr val="tx1"/>
+                </a:solidFill>
+                <a:latin typeface="Arial" pitchFamily="34" charset="0"/>
+                <a:cs typeface="Arial" pitchFamily="34" charset="0"/>
+              </a:endParaRPr>
+            </a:p>
+          </p:txBody>
+        </p:sp>
+        <p:sp>
+          <p:nvSpPr>
+            <p:cNvPr id="68" name="모서리가 둥근 직사각형 9"/>
+            <p:cNvSpPr/>
+            <p:nvPr/>
+          </p:nvSpPr>
+          <p:spPr>
+            <a:xfrm>
+              <a:off x="6400800" y="3352800"/>
+              <a:ext cx="1219200" cy="304800"/>
+            </a:xfrm>
+            <a:prstGeom prst="roundRect">
+              <a:avLst/>
+            </a:prstGeom>
+          </p:spPr>
+          <p:style>
+            <a:lnRef idx="1">
+              <a:schemeClr val="accent1"/>
+            </a:lnRef>
+            <a:fillRef idx="3">
+              <a:schemeClr val="accent1"/>
+            </a:fillRef>
+            <a:effectRef idx="2">
+              <a:schemeClr val="accent1"/>
+            </a:effectRef>
+            <a:fontRef idx="minor">
+              <a:schemeClr val="lt1"/>
+            </a:fontRef>
+          </p:style>
+          <p:txBody>
+            <a:bodyPr rtlCol="0" anchor="ctr"/>
+            <a:lstStyle/>
+            <a:p>
+              <a:pPr algn="ctr"/>
+              <a:endParaRPr lang="ko-KR" altLang="en-US" sz="1400" dirty="0">
+                <a:latin typeface="Arial" pitchFamily="34" charset="0"/>
+                <a:cs typeface="Arial" pitchFamily="34" charset="0"/>
+              </a:endParaRPr>
+            </a:p>
+          </p:txBody>
+        </p:sp>
+        <p:sp>
+          <p:nvSpPr>
+            <p:cNvPr id="69" name="모서리가 둥근 직사각형 9"/>
+            <p:cNvSpPr/>
+            <p:nvPr/>
+          </p:nvSpPr>
+          <p:spPr>
+            <a:xfrm>
+              <a:off x="6248400" y="3276600"/>
+              <a:ext cx="1219200" cy="304800"/>
+            </a:xfrm>
+            <a:prstGeom prst="roundRect">
+              <a:avLst/>
+            </a:prstGeom>
+          </p:spPr>
+          <p:style>
+            <a:lnRef idx="1">
+              <a:schemeClr val="accent1"/>
+            </a:lnRef>
+            <a:fillRef idx="3">
+              <a:schemeClr val="accent1"/>
+            </a:fillRef>
+            <a:effectRef idx="2">
+              <a:schemeClr val="accent1"/>
+            </a:effectRef>
+            <a:fontRef idx="minor">
+              <a:schemeClr val="lt1"/>
+            </a:fontRef>
+          </p:style>
+          <p:txBody>
+            <a:bodyPr rtlCol="0" anchor="ctr"/>
+            <a:lstStyle/>
+            <a:p>
+              <a:pPr algn="ctr"/>
+              <a:endParaRPr lang="ko-KR" altLang="en-US" sz="1400" dirty="0">
+                <a:latin typeface="Arial" pitchFamily="34" charset="0"/>
+                <a:cs typeface="Arial" pitchFamily="34" charset="0"/>
+              </a:endParaRPr>
+            </a:p>
+          </p:txBody>
+        </p:sp>
+        <p:sp>
+          <p:nvSpPr>
+            <p:cNvPr id="70" name="모서리가 둥근 직사각형 9"/>
+            <p:cNvSpPr/>
+            <p:nvPr/>
+          </p:nvSpPr>
+          <p:spPr>
+            <a:xfrm>
+              <a:off x="6096000" y="3200400"/>
+              <a:ext cx="1219200" cy="304800"/>
+            </a:xfrm>
+            <a:prstGeom prst="roundRect">
+              <a:avLst/>
+            </a:prstGeom>
+          </p:spPr>
+          <p:style>
+            <a:lnRef idx="1">
+              <a:schemeClr val="accent1"/>
+            </a:lnRef>
+            <a:fillRef idx="3">
+              <a:schemeClr val="accent1"/>
+            </a:fillRef>
+            <a:effectRef idx="2">
+              <a:schemeClr val="accent1"/>
+            </a:effectRef>
+            <a:fontRef idx="minor">
+              <a:schemeClr val="lt1"/>
+            </a:fontRef>
+          </p:style>
+          <p:txBody>
+            <a:bodyPr rtlCol="0" anchor="ctr"/>
+            <a:lstStyle/>
+            <a:p>
+              <a:pPr algn="ctr"/>
+              <a:r>
+                <a:rPr lang="en-US" altLang="ko-KR" sz="1050" dirty="0" smtClean="0">
+                  <a:latin typeface="Arial" pitchFamily="34" charset="0"/>
+                  <a:cs typeface="Arial" pitchFamily="34" charset="0"/>
+                </a:rPr>
+                <a:t>Grinder </a:t>
+              </a:r>
+              <a:r>
+                <a:rPr lang="en-US" altLang="ko-KR" sz="1050" dirty="0" smtClean="0">
+                  <a:latin typeface="Arial" pitchFamily="34" charset="0"/>
+                  <a:cs typeface="Arial" pitchFamily="34" charset="0"/>
+                </a:rPr>
+                <a:t>Console</a:t>
+              </a:r>
+              <a:endParaRPr lang="ko-KR" altLang="en-US" sz="1050" dirty="0">
+                <a:latin typeface="Arial" pitchFamily="34" charset="0"/>
+                <a:cs typeface="Arial" pitchFamily="34" charset="0"/>
+              </a:endParaRPr>
+            </a:p>
+          </p:txBody>
+        </p:sp>
+        <p:sp>
+          <p:nvSpPr>
+            <p:cNvPr id="71" name="TextBox 70"/>
+            <p:cNvSpPr txBox="1"/>
+            <p:nvPr/>
+          </p:nvSpPr>
+          <p:spPr>
+            <a:xfrm>
+              <a:off x="6019800" y="2667000"/>
+              <a:ext cx="1616148" cy="307777"/>
+            </a:xfrm>
+            <a:prstGeom prst="rect">
+              <a:avLst/>
+            </a:prstGeom>
+            <a:noFill/>
+          </p:spPr>
+          <p:txBody>
+            <a:bodyPr wrap="none" rtlCol="0">
+              <a:spAutoFit/>
+            </a:bodyPr>
+            <a:lstStyle/>
+            <a:p>
+              <a:r>
+                <a:rPr lang="en-US" altLang="zh-CN" sz="1400" dirty="0" smtClean="0">
+                  <a:latin typeface="Arial" pitchFamily="34" charset="0"/>
+                  <a:cs typeface="Arial" pitchFamily="34" charset="0"/>
+                </a:rPr>
+                <a:t>Console manager</a:t>
+              </a:r>
+              <a:endParaRPr lang="zh-CN" altLang="en-US" sz="1400" dirty="0">
+                <a:latin typeface="Arial" pitchFamily="34" charset="0"/>
+                <a:cs typeface="Arial" pitchFamily="34" charset="0"/>
+              </a:endParaRPr>
+            </a:p>
+          </p:txBody>
+        </p:sp>
+      </p:grpSp>
+      <p:grpSp>
+        <p:nvGrpSpPr>
+          <p:cNvPr id="72" name="组合 71"/>
+          <p:cNvGrpSpPr/>
+          <p:nvPr/>
+        </p:nvGrpSpPr>
+        <p:grpSpPr>
+          <a:xfrm>
+            <a:off x="4953000" y="2362200"/>
+            <a:ext cx="1143000" cy="1371600"/>
+            <a:chOff x="4118812" y="2514600"/>
+            <a:chExt cx="1203158" cy="1371600"/>
+          </a:xfrm>
+        </p:grpSpPr>
+        <p:sp>
+          <p:nvSpPr>
+            <p:cNvPr id="73" name="圆角矩形 72"/>
+            <p:cNvSpPr/>
+            <p:nvPr/>
+          </p:nvSpPr>
+          <p:spPr>
+            <a:xfrm>
+              <a:off x="4118812" y="2514600"/>
+              <a:ext cx="1203158" cy="1371600"/>
+            </a:xfrm>
+            <a:prstGeom prst="roundRect">
+              <a:avLst/>
+            </a:prstGeom>
+            <a:solidFill>
+              <a:schemeClr val="tx2">
+                <a:lumMod val="20000"/>
+                <a:lumOff val="80000"/>
+              </a:schemeClr>
+            </a:solidFill>
+          </p:spPr>
+          <p:style>
+            <a:lnRef idx="2">
+              <a:schemeClr val="accent1">
+                <a:shade val="50000"/>
+              </a:schemeClr>
+            </a:lnRef>
+            <a:fillRef idx="1">
+              <a:schemeClr val="accent1"/>
+            </a:fillRef>
+            <a:effectRef idx="0">
+              <a:schemeClr val="accent1"/>
+            </a:effectRef>
+            <a:fontRef idx="minor">
+              <a:schemeClr val="lt1"/>
+            </a:fontRef>
+          </p:style>
+          <p:txBody>
+            <a:bodyPr rtlCol="0" anchor="ctr"/>
+            <a:lstStyle/>
+            <a:p>
+              <a:pPr algn="ctr"/>
+              <a:endParaRPr lang="zh-CN" altLang="en-US" sz="1400" dirty="0">
+                <a:solidFill>
+                  <a:schemeClr val="tx1"/>
+                </a:solidFill>
+                <a:latin typeface="Arial" pitchFamily="34" charset="0"/>
+                <a:cs typeface="Arial" pitchFamily="34" charset="0"/>
+              </a:endParaRPr>
+            </a:p>
+          </p:txBody>
+        </p:sp>
+        <p:sp>
+          <p:nvSpPr>
+            <p:cNvPr id="74" name="TextBox 73"/>
+            <p:cNvSpPr txBox="1"/>
+            <p:nvPr/>
+          </p:nvSpPr>
+          <p:spPr>
+            <a:xfrm>
+              <a:off x="4199023" y="2743200"/>
+              <a:ext cx="1000338" cy="954107"/>
+            </a:xfrm>
+            <a:prstGeom prst="rect">
+              <a:avLst/>
+            </a:prstGeom>
+            <a:noFill/>
+          </p:spPr>
+          <p:txBody>
+            <a:bodyPr wrap="none" rtlCol="0">
+              <a:spAutoFit/>
+            </a:bodyPr>
+            <a:lstStyle/>
+            <a:p>
+              <a:r>
+                <a:rPr lang="en-US" altLang="zh-CN" sz="1400" dirty="0" smtClean="0">
+                  <a:latin typeface="Arial" pitchFamily="34" charset="0"/>
+                  <a:cs typeface="Arial" pitchFamily="34" charset="0"/>
+                </a:rPr>
+                <a:t>nGrinder</a:t>
+              </a:r>
+            </a:p>
+            <a:p>
+              <a:r>
+                <a:rPr lang="en-US" altLang="zh-CN" sz="1400" dirty="0" smtClean="0">
+                  <a:latin typeface="Arial" pitchFamily="34" charset="0"/>
+                  <a:cs typeface="Arial" pitchFamily="34" charset="0"/>
+                </a:rPr>
+                <a:t>Controller,</a:t>
+              </a:r>
+            </a:p>
+            <a:p>
+              <a:r>
+                <a:rPr lang="en-US" altLang="zh-CN" sz="1400" dirty="0" smtClean="0">
+                  <a:latin typeface="Arial" pitchFamily="34" charset="0"/>
+                  <a:cs typeface="Arial" pitchFamily="34" charset="0"/>
+                </a:rPr>
+                <a:t>Services,</a:t>
+              </a:r>
+            </a:p>
+            <a:p>
+              <a:r>
+                <a:rPr lang="en-US" altLang="zh-CN" sz="1400" dirty="0" smtClean="0">
+                  <a:latin typeface="Arial" pitchFamily="34" charset="0"/>
+                  <a:cs typeface="Arial" pitchFamily="34" charset="0"/>
+                </a:rPr>
+                <a:t>Utilities.</a:t>
+              </a:r>
+              <a:endParaRPr lang="zh-CN" altLang="en-US" sz="1400" dirty="0">
+                <a:latin typeface="Arial" pitchFamily="34" charset="0"/>
+                <a:cs typeface="Arial" pitchFamily="34" charset="0"/>
+              </a:endParaRPr>
+            </a:p>
+          </p:txBody>
+        </p:sp>
+      </p:grpSp>
+    </p:spTree>
   </p:cSld>
   <p:clrMapOvr>
     <a:masterClrMapping/>
@@ -5754,7 +9040,7 @@
         <a:sysClr val="windowText" lastClr="000000"/>
       </a:dk1>
       <a:lt1>
-        <a:sysClr val="window" lastClr="FFFFFF"/>
+        <a:sysClr val="window" lastClr="C8E6C8"/>
       </a:lt1>
       <a:dk2>
         <a:srgbClr val="1F497D"/>

</xml_diff>

<commit_message>
[NOBTS] Add ngrinder recorder architecture
</commit_message>
<xml_diff>
--- a/docs/ngrinder_system_architecture.pptx
+++ b/docs/ngrinder_system_architecture.pptx
@@ -5,12 +5,13 @@
     <p:sldMasterId id="2147483648" r:id="rId1"/>
   </p:sldMasterIdLst>
   <p:notesMasterIdLst>
-    <p:notesMasterId r:id="rId5"/>
+    <p:notesMasterId r:id="rId6"/>
   </p:notesMasterIdLst>
   <p:sldIdLst>
     <p:sldId id="258" r:id="rId2"/>
     <p:sldId id="259" r:id="rId3"/>
     <p:sldId id="261" r:id="rId4"/>
+    <p:sldId id="262" r:id="rId5"/>
   </p:sldIdLst>
   <p:sldSz cx="9144000" cy="6858000" type="screen4x3"/>
   <p:notesSz cx="6858000" cy="9144000"/>
@@ -194,7 +195,7 @@
           <a:p>
             <a:fld id="{2A2B3CE2-2F8B-4FBE-BB12-285F0C3855D4}" type="datetimeFigureOut">
               <a:rPr lang="ko-KR" altLang="en-US" smtClean="0"/>
-              <a:t>2013-01-07</a:t>
+              <a:t>2013-04-12</a:t>
             </a:fld>
             <a:endParaRPr lang="ko-KR" altLang="en-US"/>
           </a:p>
@@ -728,7 +729,7 @@
             <a:fld id="{26036BE6-1911-40BC-AA55-6B3310415E80}" type="datetimeFigureOut">
               <a:rPr lang="ko-KR" altLang="en-US" smtClean="0"/>
               <a:pPr/>
-              <a:t>2013-01-07</a:t>
+              <a:t>2013-04-12</a:t>
             </a:fld>
             <a:endParaRPr lang="ko-KR" altLang="en-US"/>
           </a:p>
@@ -900,7 +901,7 @@
             <a:fld id="{26036BE6-1911-40BC-AA55-6B3310415E80}" type="datetimeFigureOut">
               <a:rPr lang="ko-KR" altLang="en-US" smtClean="0"/>
               <a:pPr/>
-              <a:t>2013-01-07</a:t>
+              <a:t>2013-04-12</a:t>
             </a:fld>
             <a:endParaRPr lang="ko-KR" altLang="en-US"/>
           </a:p>
@@ -1082,7 +1083,7 @@
             <a:fld id="{26036BE6-1911-40BC-AA55-6B3310415E80}" type="datetimeFigureOut">
               <a:rPr lang="ko-KR" altLang="en-US" smtClean="0"/>
               <a:pPr/>
-              <a:t>2013-01-07</a:t>
+              <a:t>2013-04-12</a:t>
             </a:fld>
             <a:endParaRPr lang="ko-KR" altLang="en-US"/>
           </a:p>
@@ -1254,7 +1255,7 @@
             <a:fld id="{26036BE6-1911-40BC-AA55-6B3310415E80}" type="datetimeFigureOut">
               <a:rPr lang="ko-KR" altLang="en-US" smtClean="0"/>
               <a:pPr/>
-              <a:t>2013-01-07</a:t>
+              <a:t>2013-04-12</a:t>
             </a:fld>
             <a:endParaRPr lang="ko-KR" altLang="en-US"/>
           </a:p>
@@ -1502,7 +1503,7 @@
             <a:fld id="{26036BE6-1911-40BC-AA55-6B3310415E80}" type="datetimeFigureOut">
               <a:rPr lang="ko-KR" altLang="en-US" smtClean="0"/>
               <a:pPr/>
-              <a:t>2013-01-07</a:t>
+              <a:t>2013-04-12</a:t>
             </a:fld>
             <a:endParaRPr lang="ko-KR" altLang="en-US"/>
           </a:p>
@@ -1792,7 +1793,7 @@
             <a:fld id="{26036BE6-1911-40BC-AA55-6B3310415E80}" type="datetimeFigureOut">
               <a:rPr lang="ko-KR" altLang="en-US" smtClean="0"/>
               <a:pPr/>
-              <a:t>2013-01-07</a:t>
+              <a:t>2013-04-12</a:t>
             </a:fld>
             <a:endParaRPr lang="ko-KR" altLang="en-US"/>
           </a:p>
@@ -2216,7 +2217,7 @@
             <a:fld id="{26036BE6-1911-40BC-AA55-6B3310415E80}" type="datetimeFigureOut">
               <a:rPr lang="ko-KR" altLang="en-US" smtClean="0"/>
               <a:pPr/>
-              <a:t>2013-01-07</a:t>
+              <a:t>2013-04-12</a:t>
             </a:fld>
             <a:endParaRPr lang="ko-KR" altLang="en-US"/>
           </a:p>
@@ -2336,7 +2337,7 @@
             <a:fld id="{26036BE6-1911-40BC-AA55-6B3310415E80}" type="datetimeFigureOut">
               <a:rPr lang="ko-KR" altLang="en-US" smtClean="0"/>
               <a:pPr/>
-              <a:t>2013-01-07</a:t>
+              <a:t>2013-04-12</a:t>
             </a:fld>
             <a:endParaRPr lang="ko-KR" altLang="en-US"/>
           </a:p>
@@ -2433,7 +2434,7 @@
             <a:fld id="{26036BE6-1911-40BC-AA55-6B3310415E80}" type="datetimeFigureOut">
               <a:rPr lang="ko-KR" altLang="en-US" smtClean="0"/>
               <a:pPr/>
-              <a:t>2013-01-07</a:t>
+              <a:t>2013-04-12</a:t>
             </a:fld>
             <a:endParaRPr lang="ko-KR" altLang="en-US"/>
           </a:p>
@@ -2712,7 +2713,7 @@
             <a:fld id="{26036BE6-1911-40BC-AA55-6B3310415E80}" type="datetimeFigureOut">
               <a:rPr lang="ko-KR" altLang="en-US" smtClean="0"/>
               <a:pPr/>
-              <a:t>2013-01-07</a:t>
+              <a:t>2013-04-12</a:t>
             </a:fld>
             <a:endParaRPr lang="ko-KR" altLang="en-US"/>
           </a:p>
@@ -2967,7 +2968,7 @@
             <a:fld id="{26036BE6-1911-40BC-AA55-6B3310415E80}" type="datetimeFigureOut">
               <a:rPr lang="ko-KR" altLang="en-US" smtClean="0"/>
               <a:pPr/>
-              <a:t>2013-01-07</a:t>
+              <a:t>2013-04-12</a:t>
             </a:fld>
             <a:endParaRPr lang="ko-KR" altLang="en-US"/>
           </a:p>
@@ -3182,7 +3183,7 @@
             <a:fld id="{26036BE6-1911-40BC-AA55-6B3310415E80}" type="datetimeFigureOut">
               <a:rPr lang="ko-KR" altLang="en-US" smtClean="0"/>
               <a:pPr/>
-              <a:t>2013-01-07</a:t>
+              <a:t>2013-04-12</a:t>
             </a:fld>
             <a:endParaRPr lang="ko-KR" altLang="en-US"/>
           </a:p>
@@ -4403,12 +4404,8 @@
           <a:lstStyle/>
           <a:p>
             <a:r>
-              <a:rPr lang="en-US" altLang="ko-KR" sz="1200" b="1" dirty="0" err="1" smtClean="0"/>
-              <a:t>nGrinder</a:t>
-            </a:r>
-            <a:r>
               <a:rPr lang="en-US" altLang="ko-KR" sz="1200" b="1" dirty="0" smtClean="0"/>
-              <a:t> Controller</a:t>
+              <a:t>nGrinder Controller</a:t>
             </a:r>
             <a:endParaRPr lang="ko-KR" altLang="en-US" sz="1200" b="1" dirty="0"/>
           </a:p>
@@ -5839,7 +5836,7 @@
           <a:lstStyle/>
           <a:p>
             <a:r>
-              <a:rPr lang="en-US" altLang="ko-KR" sz="1400" b="1" dirty="0" err="1" smtClean="0">
+              <a:rPr lang="en-US" altLang="ko-KR" sz="1400" b="1" dirty="0" smtClean="0">
                 <a:solidFill>
                   <a:schemeClr val="tx2">
                     <a:lumMod val="60000"/>
@@ -5847,18 +5844,7 @@
                   </a:schemeClr>
                 </a:solidFill>
               </a:rPr>
-              <a:t>nGrinder</a:t>
-            </a:r>
-            <a:r>
-              <a:rPr lang="en-US" altLang="ko-KR" sz="1400" b="1" dirty="0" smtClean="0">
-                <a:solidFill>
-                  <a:schemeClr val="tx2">
-                    <a:lumMod val="60000"/>
-                    <a:lumOff val="40000"/>
-                  </a:schemeClr>
-                </a:solidFill>
-              </a:rPr>
-              <a:t> TCP communication</a:t>
+              <a:t>nGrinder TCP communication</a:t>
             </a:r>
             <a:endParaRPr lang="ko-KR" altLang="en-US" sz="1400" b="1" dirty="0">
               <a:solidFill>
@@ -6185,7 +6171,7 @@
           <a:p>
             <a:pPr algn="ctr"/>
             <a:r>
-              <a:rPr lang="en-US" altLang="ko-KR" sz="2800" b="1" dirty="0" err="1" smtClean="0">
+              <a:rPr lang="en-US" altLang="ko-KR" sz="2800" b="1" dirty="0" smtClean="0">
                 <a:latin typeface="Arial" pitchFamily="34" charset="0"/>
                 <a:ea typeface="+mj-ea"/>
                 <a:cs typeface="Arial" pitchFamily="34" charset="0"/>
@@ -6320,18 +6306,11 @@
           <a:lstStyle/>
           <a:p>
             <a:r>
-              <a:rPr lang="en-US" altLang="zh-CN" sz="2800" b="1" dirty="0" err="1" smtClean="0">
-                <a:latin typeface="Arial" pitchFamily="34" charset="0"/>
-                <a:cs typeface="Arial" pitchFamily="34" charset="0"/>
-              </a:rPr>
-              <a:t>nGrinder</a:t>
-            </a:r>
-            <a:r>
               <a:rPr lang="en-US" altLang="zh-CN" sz="2800" b="1" dirty="0" smtClean="0">
                 <a:latin typeface="Arial" pitchFamily="34" charset="0"/>
                 <a:cs typeface="Arial" pitchFamily="34" charset="0"/>
               </a:rPr>
-              <a:t> controller without clustering</a:t>
+              <a:t>nGrinder controller without clustering</a:t>
             </a:r>
             <a:endParaRPr lang="zh-CN" altLang="en-US" sz="2800" b="1" dirty="0" smtClean="0">
               <a:latin typeface="Arial" pitchFamily="34" charset="0"/>
@@ -7830,18 +7809,11 @@
           <a:lstStyle/>
           <a:p>
             <a:r>
-              <a:rPr lang="en-US" altLang="zh-CN" sz="2800" b="1" dirty="0" err="1" smtClean="0">
-                <a:latin typeface="Arial" pitchFamily="34" charset="0"/>
-                <a:cs typeface="Arial" pitchFamily="34" charset="0"/>
-              </a:rPr>
-              <a:t>nGrinder</a:t>
-            </a:r>
-            <a:r>
               <a:rPr lang="en-US" altLang="zh-CN" sz="2800" b="1" dirty="0" smtClean="0">
                 <a:latin typeface="Arial" pitchFamily="34" charset="0"/>
                 <a:cs typeface="Arial" pitchFamily="34" charset="0"/>
               </a:rPr>
-              <a:t> controller with clustering</a:t>
+              <a:t>nGrinder controller with clustering</a:t>
             </a:r>
             <a:endParaRPr lang="zh-CN" altLang="en-US" sz="2800" b="1" dirty="0" smtClean="0">
               <a:latin typeface="Arial" pitchFamily="34" charset="0"/>
@@ -10909,6 +10881,1908 @@
     <p:extLst>
       <p:ext uri="{BB962C8B-B14F-4D97-AF65-F5344CB8AC3E}">
         <p14:creationId xmlns:p14="http://schemas.microsoft.com/office/powerpoint/2010/main" val="3318526940"/>
+      </p:ext>
+    </p:extLst>
+  </p:cSld>
+  <p:clrMapOvr>
+    <a:masterClrMapping/>
+  </p:clrMapOvr>
+  <p:timing>
+    <p:tnLst>
+      <p:par>
+        <p:cTn id="1" dur="indefinite" restart="never" nodeType="tmRoot"/>
+      </p:par>
+    </p:tnLst>
+  </p:timing>
+</p:sld>
+</file>
+
+<file path=ppt/slides/slide4.xml><?xml version="1.0" encoding="utf-8"?>
+<p:sld xmlns:a="http://schemas.openxmlformats.org/drawingml/2006/main" xmlns:r="http://schemas.openxmlformats.org/officeDocument/2006/relationships" xmlns:p="http://schemas.openxmlformats.org/presentationml/2006/main">
+  <p:cSld>
+    <p:spTree>
+      <p:nvGrpSpPr>
+        <p:cNvPr id="1" name=""/>
+        <p:cNvGrpSpPr/>
+        <p:nvPr/>
+      </p:nvGrpSpPr>
+      <p:grpSpPr>
+        <a:xfrm>
+          <a:off x="0" y="0"/>
+          <a:ext cx="0" cy="0"/>
+          <a:chOff x="0" y="0"/>
+          <a:chExt cx="0" cy="0"/>
+        </a:xfrm>
+      </p:grpSpPr>
+      <p:sp>
+        <p:nvSpPr>
+          <p:cNvPr id="119" name="TextBox 118"/>
+          <p:cNvSpPr txBox="1"/>
+          <p:nvPr/>
+        </p:nvSpPr>
+        <p:spPr>
+          <a:xfrm>
+            <a:off x="1828800" y="152400"/>
+            <a:ext cx="6096000" cy="523220"/>
+          </a:xfrm>
+          <a:prstGeom prst="rect">
+            <a:avLst/>
+          </a:prstGeom>
+          <a:noFill/>
+        </p:spPr>
+        <p:txBody>
+          <a:bodyPr wrap="square" rtlCol="0">
+            <a:spAutoFit/>
+          </a:bodyPr>
+          <a:lstStyle/>
+          <a:p>
+            <a:pPr algn="ctr"/>
+            <a:r>
+              <a:rPr lang="en-US" altLang="ko-KR" sz="2800" b="1" dirty="0" smtClean="0">
+                <a:latin typeface="Arial" pitchFamily="34" charset="0"/>
+                <a:ea typeface="+mj-ea"/>
+                <a:cs typeface="Arial" pitchFamily="34" charset="0"/>
+              </a:rPr>
+              <a:t>nGrinder Recorder</a:t>
+            </a:r>
+            <a:r>
+              <a:rPr lang="en-US" altLang="ko-KR" sz="2000" b="1" dirty="0" smtClean="0"/>
+              <a:t> </a:t>
+            </a:r>
+            <a:r>
+              <a:rPr lang="en-US" altLang="ko-KR" sz="2800" b="1" dirty="0" smtClean="0">
+                <a:latin typeface="Arial" pitchFamily="34" charset="0"/>
+                <a:ea typeface="+mj-ea"/>
+                <a:cs typeface="Arial" pitchFamily="34" charset="0"/>
+              </a:rPr>
+              <a:t>Architecture</a:t>
+            </a:r>
+            <a:endParaRPr lang="ko-KR" altLang="en-US" sz="2800" b="1" dirty="0">
+              <a:latin typeface="Arial" pitchFamily="34" charset="0"/>
+              <a:ea typeface="+mj-ea"/>
+              <a:cs typeface="Arial" pitchFamily="34" charset="0"/>
+            </a:endParaRPr>
+          </a:p>
+        </p:txBody>
+      </p:sp>
+      <p:grpSp>
+        <p:nvGrpSpPr>
+          <p:cNvPr id="27" name="그룹 26"/>
+          <p:cNvGrpSpPr/>
+          <p:nvPr/>
+        </p:nvGrpSpPr>
+        <p:grpSpPr>
+          <a:xfrm>
+            <a:off x="1429778" y="958561"/>
+            <a:ext cx="7104622" cy="4114800"/>
+            <a:chOff x="4559695" y="1130481"/>
+            <a:chExt cx="4686968" cy="2659336"/>
+          </a:xfrm>
+        </p:grpSpPr>
+        <p:pic>
+          <p:nvPicPr>
+            <p:cNvPr id="24" name="Picture 3"/>
+            <p:cNvPicPr>
+              <a:picLocks noChangeAspect="1" noChangeArrowheads="1"/>
+            </p:cNvPicPr>
+            <p:nvPr/>
+          </p:nvPicPr>
+          <p:blipFill>
+            <a:blip r:embed="rId2">
+              <a:extLst>
+                <a:ext uri="{28A0092B-C50C-407E-A947-70E740481C1C}">
+                  <a14:useLocalDpi xmlns:a14="http://schemas.microsoft.com/office/drawing/2010/main" val="0"/>
+                </a:ext>
+              </a:extLst>
+            </a:blip>
+            <a:srcRect/>
+            <a:stretch>
+              <a:fillRect/>
+            </a:stretch>
+          </p:blipFill>
+          <p:spPr bwMode="auto">
+            <a:xfrm>
+              <a:off x="4559695" y="1130482"/>
+              <a:ext cx="4686968" cy="2659335"/>
+            </a:xfrm>
+            <a:prstGeom prst="rect">
+              <a:avLst/>
+            </a:prstGeom>
+            <a:noFill/>
+            <a:ln>
+              <a:noFill/>
+            </a:ln>
+            <a:extLst>
+              <a:ext uri="{909E8E84-426E-40DD-AFC4-6F175D3DCCD1}">
+                <a14:hiddenFill xmlns:a14="http://schemas.microsoft.com/office/drawing/2010/main">
+                  <a:solidFill>
+                    <a:schemeClr val="accent1"/>
+                  </a:solidFill>
+                </a14:hiddenFill>
+              </a:ext>
+              <a:ext uri="{91240B29-F687-4F45-9708-019B960494DF}">
+                <a14:hiddenLine xmlns:a14="http://schemas.microsoft.com/office/drawing/2010/main" w="9525">
+                  <a:solidFill>
+                    <a:schemeClr val="tx1"/>
+                  </a:solidFill>
+                  <a:miter lim="800000"/>
+                  <a:headEnd/>
+                  <a:tailEnd/>
+                </a14:hiddenLine>
+              </a:ext>
+            </a:extLst>
+          </p:spPr>
+        </p:pic>
+        <p:sp>
+          <p:nvSpPr>
+            <p:cNvPr id="25" name="직사각형 24"/>
+            <p:cNvSpPr/>
+            <p:nvPr/>
+          </p:nvSpPr>
+          <p:spPr>
+            <a:xfrm>
+              <a:off x="4559695" y="1130481"/>
+              <a:ext cx="4686968" cy="2659335"/>
+            </a:xfrm>
+            <a:prstGeom prst="rect">
+              <a:avLst/>
+            </a:prstGeom>
+            <a:solidFill>
+              <a:srgbClr val="FFFFFF">
+                <a:alpha val="90980"/>
+              </a:srgbClr>
+            </a:solidFill>
+            <a:ln w="12700">
+              <a:solidFill>
+                <a:schemeClr val="bg1">
+                  <a:lumMod val="65000"/>
+                </a:schemeClr>
+              </a:solidFill>
+            </a:ln>
+          </p:spPr>
+          <p:style>
+            <a:lnRef idx="2">
+              <a:schemeClr val="accent1">
+                <a:shade val="50000"/>
+              </a:schemeClr>
+            </a:lnRef>
+            <a:fillRef idx="1">
+              <a:schemeClr val="accent1"/>
+            </a:fillRef>
+            <a:effectRef idx="0">
+              <a:schemeClr val="accent1"/>
+            </a:effectRef>
+            <a:fontRef idx="minor">
+              <a:schemeClr val="lt1"/>
+            </a:fontRef>
+          </p:style>
+          <p:txBody>
+            <a:bodyPr rtlCol="0" anchor="ctr"/>
+            <a:lstStyle/>
+            <a:p>
+              <a:pPr algn="ctr"/>
+              <a:endParaRPr lang="ko-KR" altLang="en-US"/>
+            </a:p>
+          </p:txBody>
+        </p:sp>
+      </p:grpSp>
+      <p:pic>
+        <p:nvPicPr>
+          <p:cNvPr id="1031" name="Picture 7" descr="C:\Users\junoyoon\AppData\Local\Microsoft\Windows\Temporary Internet Files\Content.IE5\7JZ1PCPF\MC900432625[1].png"/>
+          <p:cNvPicPr>
+            <a:picLocks noChangeAspect="1" noChangeArrowheads="1"/>
+          </p:cNvPicPr>
+          <p:nvPr/>
+        </p:nvPicPr>
+        <p:blipFill>
+          <a:blip r:embed="rId3" cstate="print">
+            <a:extLst>
+              <a:ext uri="{28A0092B-C50C-407E-A947-70E740481C1C}">
+                <a14:useLocalDpi xmlns:a14="http://schemas.microsoft.com/office/drawing/2010/main" val="0"/>
+              </a:ext>
+            </a:extLst>
+          </a:blip>
+          <a:srcRect/>
+          <a:stretch>
+            <a:fillRect/>
+          </a:stretch>
+        </p:blipFill>
+        <p:spPr bwMode="auto">
+          <a:xfrm flipH="1">
+            <a:off x="685799" y="2152510"/>
+            <a:ext cx="638817" cy="637797"/>
+          </a:xfrm>
+          <a:prstGeom prst="rect">
+            <a:avLst/>
+          </a:prstGeom>
+          <a:noFill/>
+          <a:extLst>
+            <a:ext uri="{909E8E84-426E-40DD-AFC4-6F175D3DCCD1}">
+              <a14:hiddenFill xmlns:a14="http://schemas.microsoft.com/office/drawing/2010/main">
+                <a:solidFill>
+                  <a:srgbClr val="FFFFFF"/>
+                </a:solidFill>
+              </a14:hiddenFill>
+            </a:ext>
+          </a:extLst>
+        </p:spPr>
+      </p:pic>
+      <p:sp>
+        <p:nvSpPr>
+          <p:cNvPr id="66" name="모서리가 둥근 직사각형 65"/>
+          <p:cNvSpPr/>
+          <p:nvPr/>
+        </p:nvSpPr>
+        <p:spPr>
+          <a:xfrm>
+            <a:off x="5072289" y="2285483"/>
+            <a:ext cx="1524000" cy="381000"/>
+          </a:xfrm>
+          <a:prstGeom prst="roundRect">
+            <a:avLst/>
+          </a:prstGeom>
+        </p:spPr>
+        <p:style>
+          <a:lnRef idx="1">
+            <a:schemeClr val="accent4"/>
+          </a:lnRef>
+          <a:fillRef idx="3">
+            <a:schemeClr val="accent4"/>
+          </a:fillRef>
+          <a:effectRef idx="2">
+            <a:schemeClr val="accent4"/>
+          </a:effectRef>
+          <a:fontRef idx="minor">
+            <a:schemeClr val="lt1"/>
+          </a:fontRef>
+        </p:style>
+        <p:txBody>
+          <a:bodyPr rtlCol="0" anchor="ctr"/>
+          <a:lstStyle/>
+          <a:p>
+            <a:pPr algn="ctr"/>
+            <a:r>
+              <a:rPr lang="en-US" altLang="ko-KR" sz="1100" dirty="0" smtClean="0">
+                <a:latin typeface="+mn-ea"/>
+              </a:rPr>
+              <a:t>TCPProxy</a:t>
+            </a:r>
+            <a:endParaRPr lang="ko-KR" altLang="en-US" sz="1100" dirty="0">
+              <a:latin typeface="+mn-ea"/>
+            </a:endParaRPr>
+          </a:p>
+        </p:txBody>
+      </p:sp>
+      <p:sp>
+        <p:nvSpPr>
+          <p:cNvPr id="67" name="모서리가 둥근 직사각형 66"/>
+          <p:cNvSpPr/>
+          <p:nvPr/>
+        </p:nvSpPr>
+        <p:spPr>
+          <a:xfrm>
+            <a:off x="2801378" y="2280088"/>
+            <a:ext cx="1524000" cy="381000"/>
+          </a:xfrm>
+          <a:prstGeom prst="roundRect">
+            <a:avLst/>
+          </a:prstGeom>
+        </p:spPr>
+        <p:style>
+          <a:lnRef idx="1">
+            <a:schemeClr val="accent1"/>
+          </a:lnRef>
+          <a:fillRef idx="3">
+            <a:schemeClr val="accent1"/>
+          </a:fillRef>
+          <a:effectRef idx="2">
+            <a:schemeClr val="accent1"/>
+          </a:effectRef>
+          <a:fontRef idx="minor">
+            <a:schemeClr val="lt1"/>
+          </a:fontRef>
+        </p:style>
+        <p:txBody>
+          <a:bodyPr rtlCol="0" anchor="ctr"/>
+          <a:lstStyle/>
+          <a:p>
+            <a:pPr algn="ctr"/>
+            <a:r>
+              <a:rPr lang="en-US" altLang="ko-KR" sz="1100" b="1" dirty="0" smtClean="0">
+                <a:solidFill>
+                  <a:schemeClr val="bg1"/>
+                </a:solidFill>
+                <a:latin typeface="+mn-ea"/>
+              </a:rPr>
+              <a:t>JxBrowser</a:t>
+            </a:r>
+            <a:endParaRPr lang="ko-KR" altLang="en-US" sz="1100" b="1" dirty="0">
+              <a:solidFill>
+                <a:schemeClr val="bg1"/>
+              </a:solidFill>
+              <a:latin typeface="+mn-ea"/>
+            </a:endParaRPr>
+          </a:p>
+        </p:txBody>
+      </p:sp>
+      <p:sp>
+        <p:nvSpPr>
+          <p:cNvPr id="80" name="TextBox 79"/>
+          <p:cNvSpPr txBox="1"/>
+          <p:nvPr/>
+        </p:nvSpPr>
+        <p:spPr>
+          <a:xfrm>
+            <a:off x="1429777" y="1339561"/>
+            <a:ext cx="1127927" cy="461665"/>
+          </a:xfrm>
+          <a:prstGeom prst="rect">
+            <a:avLst/>
+          </a:prstGeom>
+          <a:noFill/>
+        </p:spPr>
+        <p:txBody>
+          <a:bodyPr wrap="square" rtlCol="0">
+            <a:spAutoFit/>
+          </a:bodyPr>
+          <a:lstStyle/>
+          <a:p>
+            <a:r>
+              <a:rPr lang="en-US" altLang="ko-KR" sz="800" dirty="0" smtClean="0"/>
+              <a:t>1. Run Recorder</a:t>
+            </a:r>
+          </a:p>
+          <a:p>
+            <a:r>
+              <a:rPr lang="en-US" altLang="ko-KR" sz="800" dirty="0" smtClean="0"/>
+              <a:t>6. Start Recording</a:t>
+            </a:r>
+          </a:p>
+          <a:p>
+            <a:r>
+              <a:rPr lang="en-US" altLang="ko-KR" sz="800" dirty="0" smtClean="0"/>
+              <a:t>18. Stop Recording</a:t>
+            </a:r>
+            <a:endParaRPr lang="ko-KR" altLang="en-US" sz="800" dirty="0"/>
+          </a:p>
+        </p:txBody>
+      </p:sp>
+      <p:sp>
+        <p:nvSpPr>
+          <p:cNvPr id="83" name="모서리가 둥근 직사각형 82"/>
+          <p:cNvSpPr/>
+          <p:nvPr/>
+        </p:nvSpPr>
+        <p:spPr>
+          <a:xfrm>
+            <a:off x="3959769" y="1339460"/>
+            <a:ext cx="1524000" cy="381000"/>
+          </a:xfrm>
+          <a:prstGeom prst="roundRect">
+            <a:avLst/>
+          </a:prstGeom>
+        </p:spPr>
+        <p:style>
+          <a:lnRef idx="1">
+            <a:schemeClr val="accent1"/>
+          </a:lnRef>
+          <a:fillRef idx="3">
+            <a:schemeClr val="accent1"/>
+          </a:fillRef>
+          <a:effectRef idx="2">
+            <a:schemeClr val="accent1"/>
+          </a:effectRef>
+          <a:fontRef idx="minor">
+            <a:schemeClr val="lt1"/>
+          </a:fontRef>
+        </p:style>
+        <p:txBody>
+          <a:bodyPr rtlCol="0" anchor="ctr"/>
+          <a:lstStyle/>
+          <a:p>
+            <a:pPr algn="ctr"/>
+            <a:r>
+              <a:rPr lang="en-US" altLang="ko-KR" sz="1100" b="1" dirty="0" smtClean="0">
+                <a:solidFill>
+                  <a:schemeClr val="bg1"/>
+                </a:solidFill>
+                <a:latin typeface="+mn-ea"/>
+              </a:rPr>
+              <a:t>Recorder</a:t>
+            </a:r>
+            <a:endParaRPr lang="ko-KR" altLang="en-US" sz="1100" b="1" dirty="0">
+              <a:solidFill>
+                <a:schemeClr val="bg1"/>
+              </a:solidFill>
+              <a:latin typeface="+mn-ea"/>
+            </a:endParaRPr>
+          </a:p>
+        </p:txBody>
+      </p:sp>
+      <p:cxnSp>
+        <p:nvCxnSpPr>
+          <p:cNvPr id="85" name="구부러진 연결선 84"/>
+          <p:cNvCxnSpPr>
+            <a:stCxn id="83" idx="2"/>
+            <a:endCxn id="66" idx="0"/>
+          </p:cNvCxnSpPr>
+          <p:nvPr/>
+        </p:nvCxnSpPr>
+        <p:spPr>
+          <a:xfrm rot="16200000" flipH="1">
+            <a:off x="4995518" y="1446711"/>
+            <a:ext cx="565023" cy="1112520"/>
+          </a:xfrm>
+          <a:prstGeom prst="curvedConnector3">
+            <a:avLst>
+              <a:gd name="adj1" fmla="val 50000"/>
+            </a:avLst>
+          </a:prstGeom>
+          <a:ln w="28575">
+            <a:headEnd type="none" w="med" len="med"/>
+            <a:tailEnd type="triangle" w="med" len="med"/>
+          </a:ln>
+        </p:spPr>
+        <p:style>
+          <a:lnRef idx="1">
+            <a:schemeClr val="accent1"/>
+          </a:lnRef>
+          <a:fillRef idx="0">
+            <a:schemeClr val="accent1"/>
+          </a:fillRef>
+          <a:effectRef idx="0">
+            <a:schemeClr val="accent1"/>
+          </a:effectRef>
+          <a:fontRef idx="minor">
+            <a:schemeClr val="tx1"/>
+          </a:fontRef>
+        </p:style>
+      </p:cxnSp>
+      <p:cxnSp>
+        <p:nvCxnSpPr>
+          <p:cNvPr id="21" name="구부러진 연결선 20"/>
+          <p:cNvCxnSpPr>
+            <a:stCxn id="1031" idx="1"/>
+            <a:endCxn id="83" idx="1"/>
+          </p:cNvCxnSpPr>
+          <p:nvPr/>
+        </p:nvCxnSpPr>
+        <p:spPr>
+          <a:xfrm flipV="1">
+            <a:off x="1324616" y="1529960"/>
+            <a:ext cx="2635153" cy="941449"/>
+          </a:xfrm>
+          <a:prstGeom prst="curvedConnector3">
+            <a:avLst>
+              <a:gd name="adj1" fmla="val 19266"/>
+            </a:avLst>
+          </a:prstGeom>
+          <a:ln w="28575">
+            <a:headEnd type="none" w="med" len="med"/>
+            <a:tailEnd type="triangle" w="med" len="med"/>
+          </a:ln>
+        </p:spPr>
+        <p:style>
+          <a:lnRef idx="1">
+            <a:schemeClr val="accent1"/>
+          </a:lnRef>
+          <a:fillRef idx="0">
+            <a:schemeClr val="accent1"/>
+          </a:fillRef>
+          <a:effectRef idx="0">
+            <a:schemeClr val="accent1"/>
+          </a:effectRef>
+          <a:fontRef idx="minor">
+            <a:schemeClr val="tx1"/>
+          </a:fontRef>
+        </p:style>
+      </p:cxnSp>
+      <p:sp>
+        <p:nvSpPr>
+          <p:cNvPr id="86" name="TextBox 85"/>
+          <p:cNvSpPr txBox="1"/>
+          <p:nvPr/>
+        </p:nvSpPr>
+        <p:spPr>
+          <a:xfrm>
+            <a:off x="5522227" y="1491961"/>
+            <a:ext cx="1393951" cy="830997"/>
+          </a:xfrm>
+          <a:prstGeom prst="rect">
+            <a:avLst/>
+          </a:prstGeom>
+          <a:noFill/>
+        </p:spPr>
+        <p:txBody>
+          <a:bodyPr wrap="square" rtlCol="0">
+            <a:spAutoFit/>
+          </a:bodyPr>
+          <a:lstStyle/>
+          <a:p>
+            <a:r>
+              <a:rPr lang="en-US" altLang="ko-KR" sz="800" dirty="0" smtClean="0"/>
+              <a:t>2. Run HTTP / HTTPS </a:t>
+            </a:r>
+            <a:br>
+              <a:rPr lang="en-US" altLang="ko-KR" sz="800" dirty="0" smtClean="0"/>
+            </a:br>
+            <a:r>
+              <a:rPr lang="en-US" altLang="ko-KR" sz="800" dirty="0" smtClean="0"/>
+              <a:t>   proxy in local PC</a:t>
+            </a:r>
+            <a:br>
+              <a:rPr lang="en-US" altLang="ko-KR" sz="800" dirty="0" smtClean="0"/>
+            </a:br>
+            <a:r>
+              <a:rPr lang="en-US" altLang="ko-KR" sz="800" dirty="0" smtClean="0"/>
+              <a:t>3. Get the proxy port</a:t>
+            </a:r>
+          </a:p>
+          <a:p>
+            <a:r>
+              <a:rPr lang="en-US" altLang="ko-KR" sz="800" dirty="0" smtClean="0"/>
+              <a:t>7. Run TCPProxy </a:t>
+            </a:r>
+            <a:br>
+              <a:rPr lang="en-US" altLang="ko-KR" sz="800" dirty="0" smtClean="0"/>
+            </a:br>
+            <a:r>
+              <a:rPr lang="en-US" altLang="ko-KR" sz="800" dirty="0" smtClean="0"/>
+              <a:t>   recorder </a:t>
+            </a:r>
+          </a:p>
+          <a:p>
+            <a:r>
+              <a:rPr lang="en-US" altLang="ko-KR" sz="800" dirty="0" smtClean="0"/>
+              <a:t> </a:t>
+            </a:r>
+            <a:endParaRPr lang="ko-KR" altLang="en-US" sz="800" dirty="0"/>
+          </a:p>
+        </p:txBody>
+      </p:sp>
+      <p:sp>
+        <p:nvSpPr>
+          <p:cNvPr id="89" name="TextBox 88"/>
+          <p:cNvSpPr txBox="1"/>
+          <p:nvPr/>
+        </p:nvSpPr>
+        <p:spPr>
+          <a:xfrm>
+            <a:off x="2557705" y="1693300"/>
+            <a:ext cx="1584869" cy="584775"/>
+          </a:xfrm>
+          <a:prstGeom prst="rect">
+            <a:avLst/>
+          </a:prstGeom>
+          <a:noFill/>
+        </p:spPr>
+        <p:txBody>
+          <a:bodyPr wrap="square" rtlCol="0">
+            <a:spAutoFit/>
+          </a:bodyPr>
+          <a:lstStyle/>
+          <a:p>
+            <a:r>
+              <a:rPr lang="en-US" altLang="ko-KR" sz="800" dirty="0" smtClean="0"/>
+              <a:t>4. Create Browser instance</a:t>
+            </a:r>
+          </a:p>
+          <a:p>
+            <a:r>
+              <a:rPr lang="en-US" altLang="ko-KR" sz="800" dirty="0" smtClean="0"/>
+              <a:t>5. Set the proxy port on the </a:t>
+            </a:r>
+            <a:br>
+              <a:rPr lang="en-US" altLang="ko-KR" sz="800" dirty="0" smtClean="0"/>
+            </a:br>
+            <a:r>
+              <a:rPr lang="en-US" altLang="ko-KR" sz="800" dirty="0" smtClean="0"/>
+              <a:t>   instance</a:t>
+            </a:r>
+          </a:p>
+          <a:p>
+            <a:r>
+              <a:rPr lang="en-US" altLang="ko-KR" sz="800" dirty="0" smtClean="0"/>
+              <a:t> </a:t>
+            </a:r>
+            <a:endParaRPr lang="ko-KR" altLang="en-US" sz="800" dirty="0"/>
+          </a:p>
+        </p:txBody>
+      </p:sp>
+      <p:cxnSp>
+        <p:nvCxnSpPr>
+          <p:cNvPr id="90" name="구부러진 연결선 89"/>
+          <p:cNvCxnSpPr>
+            <a:stCxn id="83" idx="2"/>
+            <a:endCxn id="67" idx="0"/>
+          </p:cNvCxnSpPr>
+          <p:nvPr/>
+        </p:nvCxnSpPr>
+        <p:spPr>
+          <a:xfrm rot="5400000">
+            <a:off x="3862760" y="1421079"/>
+            <a:ext cx="559628" cy="1158391"/>
+          </a:xfrm>
+          <a:prstGeom prst="curvedConnector3">
+            <a:avLst>
+              <a:gd name="adj1" fmla="val 50000"/>
+            </a:avLst>
+          </a:prstGeom>
+          <a:ln w="28575">
+            <a:headEnd type="none" w="med" len="med"/>
+            <a:tailEnd type="triangle" w="med" len="med"/>
+          </a:ln>
+        </p:spPr>
+        <p:style>
+          <a:lnRef idx="1">
+            <a:schemeClr val="accent1"/>
+          </a:lnRef>
+          <a:fillRef idx="0">
+            <a:schemeClr val="accent1"/>
+          </a:fillRef>
+          <a:effectRef idx="0">
+            <a:schemeClr val="accent1"/>
+          </a:effectRef>
+          <a:fontRef idx="minor">
+            <a:schemeClr val="tx1"/>
+          </a:fontRef>
+        </p:style>
+      </p:cxnSp>
+      <p:sp>
+        <p:nvSpPr>
+          <p:cNvPr id="91" name="모서리가 둥근 직사각형 90"/>
+          <p:cNvSpPr/>
+          <p:nvPr/>
+        </p:nvSpPr>
+        <p:spPr>
+          <a:xfrm>
+            <a:off x="7372289" y="2761437"/>
+            <a:ext cx="1016726" cy="437347"/>
+          </a:xfrm>
+          <a:prstGeom prst="roundRect">
+            <a:avLst/>
+          </a:prstGeom>
+        </p:spPr>
+        <p:style>
+          <a:lnRef idx="1">
+            <a:schemeClr val="accent1"/>
+          </a:lnRef>
+          <a:fillRef idx="3">
+            <a:schemeClr val="accent1"/>
+          </a:fillRef>
+          <a:effectRef idx="2">
+            <a:schemeClr val="accent1"/>
+          </a:effectRef>
+          <a:fontRef idx="minor">
+            <a:schemeClr val="lt1"/>
+          </a:fontRef>
+        </p:style>
+        <p:txBody>
+          <a:bodyPr rtlCol="0" anchor="ctr"/>
+          <a:lstStyle/>
+          <a:p>
+            <a:pPr algn="ctr"/>
+            <a:r>
+              <a:rPr lang="en-US" altLang="ko-KR" sz="1100" b="1" dirty="0" smtClean="0">
+                <a:latin typeface="+mn-ea"/>
+              </a:rPr>
+              <a:t>Connection Filter</a:t>
+            </a:r>
+            <a:endParaRPr lang="ko-KR" altLang="en-US" sz="1100" b="1" dirty="0">
+              <a:latin typeface="+mn-ea"/>
+            </a:endParaRPr>
+          </a:p>
+        </p:txBody>
+      </p:sp>
+      <p:cxnSp>
+        <p:nvCxnSpPr>
+          <p:cNvPr id="93" name="구부러진 연결선 92"/>
+          <p:cNvCxnSpPr>
+            <a:stCxn id="1031" idx="1"/>
+            <a:endCxn id="67" idx="1"/>
+          </p:cNvCxnSpPr>
+          <p:nvPr/>
+        </p:nvCxnSpPr>
+        <p:spPr>
+          <a:xfrm flipV="1">
+            <a:off x="1324616" y="2470588"/>
+            <a:ext cx="1476762" cy="821"/>
+          </a:xfrm>
+          <a:prstGeom prst="curvedConnector3">
+            <a:avLst>
+              <a:gd name="adj1" fmla="val 50000"/>
+            </a:avLst>
+          </a:prstGeom>
+          <a:ln w="28575">
+            <a:headEnd type="none" w="med" len="med"/>
+            <a:tailEnd type="triangle" w="med" len="med"/>
+          </a:ln>
+        </p:spPr>
+        <p:style>
+          <a:lnRef idx="1">
+            <a:schemeClr val="accent1"/>
+          </a:lnRef>
+          <a:fillRef idx="0">
+            <a:schemeClr val="accent1"/>
+          </a:fillRef>
+          <a:effectRef idx="0">
+            <a:schemeClr val="accent1"/>
+          </a:effectRef>
+          <a:fontRef idx="minor">
+            <a:schemeClr val="tx1"/>
+          </a:fontRef>
+        </p:style>
+      </p:cxnSp>
+      <p:sp>
+        <p:nvSpPr>
+          <p:cNvPr id="96" name="TextBox 95"/>
+          <p:cNvSpPr txBox="1"/>
+          <p:nvPr/>
+        </p:nvSpPr>
+        <p:spPr>
+          <a:xfrm>
+            <a:off x="1429778" y="2448807"/>
+            <a:ext cx="1556518" cy="338554"/>
+          </a:xfrm>
+          <a:prstGeom prst="rect">
+            <a:avLst/>
+          </a:prstGeom>
+          <a:noFill/>
+        </p:spPr>
+        <p:txBody>
+          <a:bodyPr wrap="square" rtlCol="0">
+            <a:spAutoFit/>
+          </a:bodyPr>
+          <a:lstStyle/>
+          <a:p>
+            <a:r>
+              <a:rPr lang="en-US" altLang="ko-KR" sz="800" dirty="0" smtClean="0"/>
+              <a:t/>
+            </a:r>
+            <a:br>
+              <a:rPr lang="en-US" altLang="ko-KR" sz="800" dirty="0" smtClean="0"/>
+            </a:br>
+            <a:r>
+              <a:rPr lang="en-US" altLang="ko-KR" sz="800" dirty="0" smtClean="0"/>
+              <a:t>9. browse</a:t>
+            </a:r>
+            <a:r>
+              <a:rPr lang="en-US" altLang="ko-KR" sz="800" dirty="0" smtClean="0"/>
+              <a:t> recording target</a:t>
+            </a:r>
+            <a:endParaRPr lang="ko-KR" altLang="en-US" sz="800" dirty="0"/>
+          </a:p>
+        </p:txBody>
+      </p:sp>
+      <p:cxnSp>
+        <p:nvCxnSpPr>
+          <p:cNvPr id="97" name="구부러진 연결선 96"/>
+          <p:cNvCxnSpPr>
+            <a:stCxn id="67" idx="3"/>
+            <a:endCxn id="66" idx="1"/>
+          </p:cNvCxnSpPr>
+          <p:nvPr/>
+        </p:nvCxnSpPr>
+        <p:spPr>
+          <a:xfrm>
+            <a:off x="4325378" y="2470588"/>
+            <a:ext cx="746911" cy="5395"/>
+          </a:xfrm>
+          <a:prstGeom prst="curvedConnector3">
+            <a:avLst>
+              <a:gd name="adj1" fmla="val 50000"/>
+            </a:avLst>
+          </a:prstGeom>
+          <a:ln w="28575">
+            <a:headEnd type="none" w="med" len="med"/>
+            <a:tailEnd type="triangle" w="med" len="med"/>
+          </a:ln>
+        </p:spPr>
+        <p:style>
+          <a:lnRef idx="1">
+            <a:schemeClr val="accent1"/>
+          </a:lnRef>
+          <a:fillRef idx="0">
+            <a:schemeClr val="accent1"/>
+          </a:fillRef>
+          <a:effectRef idx="0">
+            <a:schemeClr val="accent1"/>
+          </a:effectRef>
+          <a:fontRef idx="minor">
+            <a:schemeClr val="tx1"/>
+          </a:fontRef>
+        </p:style>
+      </p:cxnSp>
+      <p:sp>
+        <p:nvSpPr>
+          <p:cNvPr id="100" name="TextBox 99"/>
+          <p:cNvSpPr txBox="1"/>
+          <p:nvPr/>
+        </p:nvSpPr>
+        <p:spPr>
+          <a:xfrm>
+            <a:off x="4072557" y="1991607"/>
+            <a:ext cx="1768083" cy="338554"/>
+          </a:xfrm>
+          <a:prstGeom prst="rect">
+            <a:avLst/>
+          </a:prstGeom>
+          <a:noFill/>
+        </p:spPr>
+        <p:txBody>
+          <a:bodyPr wrap="square" rtlCol="0">
+            <a:spAutoFit/>
+          </a:bodyPr>
+          <a:lstStyle/>
+          <a:p>
+            <a:r>
+              <a:rPr lang="en-US" altLang="ko-KR" sz="800" dirty="0" smtClean="0"/>
+              <a:t>10. Send HTTP request to Proxy</a:t>
+            </a:r>
+          </a:p>
+          <a:p>
+            <a:r>
+              <a:rPr lang="en-US" altLang="ko-KR" sz="800" dirty="0" smtClean="0"/>
+              <a:t>17. Send HTTP Response back</a:t>
+            </a:r>
+            <a:endParaRPr lang="ko-KR" altLang="en-US" sz="800" dirty="0"/>
+          </a:p>
+        </p:txBody>
+      </p:sp>
+      <p:sp>
+        <p:nvSpPr>
+          <p:cNvPr id="105" name="TextBox 104"/>
+          <p:cNvSpPr txBox="1"/>
+          <p:nvPr/>
+        </p:nvSpPr>
+        <p:spPr>
+          <a:xfrm>
+            <a:off x="4755904" y="4428683"/>
+            <a:ext cx="1398274" cy="461665"/>
+          </a:xfrm>
+          <a:prstGeom prst="rect">
+            <a:avLst/>
+          </a:prstGeom>
+          <a:noFill/>
+        </p:spPr>
+        <p:txBody>
+          <a:bodyPr wrap="square" rtlCol="0">
+            <a:spAutoFit/>
+          </a:bodyPr>
+          <a:lstStyle/>
+          <a:p>
+            <a:r>
+              <a:rPr lang="en-US" altLang="ko-KR" sz="800" dirty="0" smtClean="0"/>
+              <a:t>13. Send the request </a:t>
+            </a:r>
+            <a:br>
+              <a:rPr lang="en-US" altLang="ko-KR" sz="800" dirty="0" smtClean="0"/>
+            </a:br>
+            <a:r>
+              <a:rPr lang="en-US" altLang="ko-KR" sz="800" dirty="0" smtClean="0"/>
+              <a:t>     </a:t>
+            </a:r>
+            <a:r>
+              <a:rPr lang="en-US" altLang="ko-KR" sz="800" dirty="0" smtClean="0"/>
+              <a:t>to target</a:t>
+            </a:r>
+            <a:br>
+              <a:rPr lang="en-US" altLang="ko-KR" sz="800" dirty="0" smtClean="0"/>
+            </a:br>
+            <a:r>
+              <a:rPr lang="en-US" altLang="ko-KR" sz="800" dirty="0" smtClean="0"/>
+              <a:t>15. Return the response</a:t>
+            </a:r>
+          </a:p>
+        </p:txBody>
+      </p:sp>
+      <p:cxnSp>
+        <p:nvCxnSpPr>
+          <p:cNvPr id="107" name="구부러진 연결선 106"/>
+          <p:cNvCxnSpPr>
+            <a:stCxn id="66" idx="3"/>
+            <a:endCxn id="91" idx="0"/>
+          </p:cNvCxnSpPr>
+          <p:nvPr/>
+        </p:nvCxnSpPr>
+        <p:spPr>
+          <a:xfrm>
+            <a:off x="6596289" y="2475983"/>
+            <a:ext cx="1284363" cy="285454"/>
+          </a:xfrm>
+          <a:prstGeom prst="curvedConnector2">
+            <a:avLst/>
+          </a:prstGeom>
+          <a:ln w="28575">
+            <a:headEnd type="triangle" w="med" len="med"/>
+            <a:tailEnd type="triangle" w="med" len="med"/>
+          </a:ln>
+        </p:spPr>
+        <p:style>
+          <a:lnRef idx="1">
+            <a:schemeClr val="accent1"/>
+          </a:lnRef>
+          <a:fillRef idx="0">
+            <a:schemeClr val="accent1"/>
+          </a:fillRef>
+          <a:effectRef idx="0">
+            <a:schemeClr val="accent1"/>
+          </a:effectRef>
+          <a:fontRef idx="minor">
+            <a:schemeClr val="tx1"/>
+          </a:fontRef>
+        </p:style>
+      </p:cxnSp>
+      <p:sp>
+        <p:nvSpPr>
+          <p:cNvPr id="111" name="TextBox 110"/>
+          <p:cNvSpPr txBox="1"/>
+          <p:nvPr/>
+        </p:nvSpPr>
+        <p:spPr>
+          <a:xfrm>
+            <a:off x="6763778" y="1897786"/>
+            <a:ext cx="1573061" cy="584775"/>
+          </a:xfrm>
+          <a:prstGeom prst="rect">
+            <a:avLst/>
+          </a:prstGeom>
+          <a:noFill/>
+        </p:spPr>
+        <p:txBody>
+          <a:bodyPr wrap="square" rtlCol="0">
+            <a:spAutoFit/>
+          </a:bodyPr>
+          <a:lstStyle/>
+          <a:p>
+            <a:r>
+              <a:rPr lang="en-US" altLang="ko-KR" sz="800" dirty="0" smtClean="0"/>
+              <a:t>11. Register connection</a:t>
+            </a:r>
+          </a:p>
+          <a:p>
+            <a:r>
+              <a:rPr lang="en-US" altLang="ko-KR" sz="800" dirty="0" smtClean="0"/>
+              <a:t>12. Check if the </a:t>
+            </a:r>
+            <a:br>
+              <a:rPr lang="en-US" altLang="ko-KR" sz="800" dirty="0" smtClean="0"/>
+            </a:br>
+            <a:r>
+              <a:rPr lang="en-US" altLang="ko-KR" sz="800" dirty="0" smtClean="0"/>
+              <a:t>   connection is filtered </a:t>
+            </a:r>
+            <a:br>
+              <a:rPr lang="en-US" altLang="ko-KR" sz="800" dirty="0" smtClean="0"/>
+            </a:br>
+            <a:r>
+              <a:rPr lang="en-US" altLang="ko-KR" sz="800" dirty="0" smtClean="0"/>
+              <a:t>   or not</a:t>
+            </a:r>
+            <a:endParaRPr lang="ko-KR" altLang="en-US" sz="800" dirty="0"/>
+          </a:p>
+        </p:txBody>
+      </p:sp>
+      <p:sp>
+        <p:nvSpPr>
+          <p:cNvPr id="112" name="모서리가 둥근 직사각형 111"/>
+          <p:cNvSpPr/>
+          <p:nvPr/>
+        </p:nvSpPr>
+        <p:spPr>
+          <a:xfrm>
+            <a:off x="3310557" y="3507997"/>
+            <a:ext cx="1524000" cy="381000"/>
+          </a:xfrm>
+          <a:prstGeom prst="roundRect">
+            <a:avLst/>
+          </a:prstGeom>
+        </p:spPr>
+        <p:style>
+          <a:lnRef idx="1">
+            <a:schemeClr val="accent4"/>
+          </a:lnRef>
+          <a:fillRef idx="3">
+            <a:schemeClr val="accent4"/>
+          </a:fillRef>
+          <a:effectRef idx="2">
+            <a:schemeClr val="accent4"/>
+          </a:effectRef>
+          <a:fontRef idx="minor">
+            <a:schemeClr val="lt1"/>
+          </a:fontRef>
+        </p:style>
+        <p:txBody>
+          <a:bodyPr rtlCol="0" anchor="ctr"/>
+          <a:lstStyle/>
+          <a:p>
+            <a:pPr algn="ctr"/>
+            <a:r>
+              <a:rPr lang="en-US" altLang="ko-KR" sz="1100" dirty="0" smtClean="0">
+                <a:latin typeface="+mn-ea"/>
+              </a:rPr>
+              <a:t>HTTPRecording</a:t>
+            </a:r>
+            <a:endParaRPr lang="ko-KR" altLang="en-US" sz="1100" dirty="0">
+              <a:latin typeface="+mn-ea"/>
+            </a:endParaRPr>
+          </a:p>
+        </p:txBody>
+      </p:sp>
+      <p:cxnSp>
+        <p:nvCxnSpPr>
+          <p:cNvPr id="118" name="구부러진 연결선 117"/>
+          <p:cNvCxnSpPr>
+            <a:stCxn id="66" idx="2"/>
+            <a:endCxn id="112" idx="0"/>
+          </p:cNvCxnSpPr>
+          <p:nvPr/>
+        </p:nvCxnSpPr>
+        <p:spPr>
+          <a:xfrm rot="5400000">
+            <a:off x="4532666" y="2206374"/>
+            <a:ext cx="841514" cy="1761732"/>
+          </a:xfrm>
+          <a:prstGeom prst="curvedConnector3">
+            <a:avLst>
+              <a:gd name="adj1" fmla="val 50000"/>
+            </a:avLst>
+          </a:prstGeom>
+          <a:ln w="28575">
+            <a:headEnd type="none" w="med" len="med"/>
+            <a:tailEnd type="triangle" w="med" len="med"/>
+          </a:ln>
+        </p:spPr>
+        <p:style>
+          <a:lnRef idx="1">
+            <a:schemeClr val="accent1"/>
+          </a:lnRef>
+          <a:fillRef idx="0">
+            <a:schemeClr val="accent1"/>
+          </a:fillRef>
+          <a:effectRef idx="0">
+            <a:schemeClr val="accent1"/>
+          </a:effectRef>
+          <a:fontRef idx="minor">
+            <a:schemeClr val="tx1"/>
+          </a:fontRef>
+        </p:style>
+      </p:cxnSp>
+      <p:cxnSp>
+        <p:nvCxnSpPr>
+          <p:cNvPr id="128" name="구부러진 연결선 127"/>
+          <p:cNvCxnSpPr>
+            <a:stCxn id="66" idx="2"/>
+            <a:endCxn id="167" idx="0"/>
+          </p:cNvCxnSpPr>
+          <p:nvPr/>
+        </p:nvCxnSpPr>
+        <p:spPr>
+          <a:xfrm rot="5400000">
+            <a:off x="4493417" y="3989789"/>
+            <a:ext cx="2664179" cy="17567"/>
+          </a:xfrm>
+          <a:prstGeom prst="curvedConnector3">
+            <a:avLst>
+              <a:gd name="adj1" fmla="val 50000"/>
+            </a:avLst>
+          </a:prstGeom>
+          <a:ln w="28575">
+            <a:headEnd type="none" w="med" len="med"/>
+            <a:tailEnd type="triangle" w="med" len="med"/>
+          </a:ln>
+        </p:spPr>
+        <p:style>
+          <a:lnRef idx="1">
+            <a:schemeClr val="accent1"/>
+          </a:lnRef>
+          <a:fillRef idx="0">
+            <a:schemeClr val="accent1"/>
+          </a:fillRef>
+          <a:effectRef idx="0">
+            <a:schemeClr val="accent1"/>
+          </a:effectRef>
+          <a:fontRef idx="minor">
+            <a:schemeClr val="tx1"/>
+          </a:fontRef>
+        </p:style>
+      </p:cxnSp>
+      <p:sp>
+        <p:nvSpPr>
+          <p:cNvPr id="131" name="모서리가 둥근 직사각형 130"/>
+          <p:cNvSpPr/>
+          <p:nvPr/>
+        </p:nvSpPr>
+        <p:spPr>
+          <a:xfrm>
+            <a:off x="6001778" y="3503640"/>
+            <a:ext cx="1524000" cy="381000"/>
+          </a:xfrm>
+          <a:prstGeom prst="roundRect">
+            <a:avLst/>
+          </a:prstGeom>
+        </p:spPr>
+        <p:style>
+          <a:lnRef idx="1">
+            <a:schemeClr val="accent4"/>
+          </a:lnRef>
+          <a:fillRef idx="3">
+            <a:schemeClr val="accent4"/>
+          </a:fillRef>
+          <a:effectRef idx="2">
+            <a:schemeClr val="accent4"/>
+          </a:effectRef>
+          <a:fontRef idx="minor">
+            <a:schemeClr val="lt1"/>
+          </a:fontRef>
+        </p:style>
+        <p:txBody>
+          <a:bodyPr rtlCol="0" anchor="ctr"/>
+          <a:lstStyle/>
+          <a:p>
+            <a:pPr algn="ctr"/>
+            <a:r>
+              <a:rPr lang="en-US" altLang="ko-KR" sz="1100" dirty="0" smtClean="0">
+                <a:latin typeface="+mn-ea"/>
+              </a:rPr>
+              <a:t>DelegateSSLEngine</a:t>
+            </a:r>
+            <a:endParaRPr lang="ko-KR" altLang="en-US" sz="1100" dirty="0">
+              <a:latin typeface="+mn-ea"/>
+            </a:endParaRPr>
+          </a:p>
+        </p:txBody>
+      </p:sp>
+      <p:cxnSp>
+        <p:nvCxnSpPr>
+          <p:cNvPr id="132" name="구부러진 연결선 131"/>
+          <p:cNvCxnSpPr>
+            <a:stCxn id="66" idx="2"/>
+            <a:endCxn id="131" idx="0"/>
+          </p:cNvCxnSpPr>
+          <p:nvPr/>
+        </p:nvCxnSpPr>
+        <p:spPr>
+          <a:xfrm rot="16200000" flipH="1">
+            <a:off x="5880455" y="2620316"/>
+            <a:ext cx="837157" cy="929489"/>
+          </a:xfrm>
+          <a:prstGeom prst="curvedConnector3">
+            <a:avLst>
+              <a:gd name="adj1" fmla="val 50000"/>
+            </a:avLst>
+          </a:prstGeom>
+          <a:ln w="28575">
+            <a:solidFill>
+              <a:schemeClr val="accent6">
+                <a:lumMod val="75000"/>
+              </a:schemeClr>
+            </a:solidFill>
+            <a:headEnd type="none" w="med" len="med"/>
+            <a:tailEnd type="triangle" w="med" len="med"/>
+          </a:ln>
+        </p:spPr>
+        <p:style>
+          <a:lnRef idx="1">
+            <a:schemeClr val="accent1"/>
+          </a:lnRef>
+          <a:fillRef idx="0">
+            <a:schemeClr val="accent1"/>
+          </a:fillRef>
+          <a:effectRef idx="0">
+            <a:schemeClr val="accent1"/>
+          </a:effectRef>
+          <a:fontRef idx="minor">
+            <a:schemeClr val="tx1"/>
+          </a:fontRef>
+        </p:style>
+      </p:cxnSp>
+      <p:sp>
+        <p:nvSpPr>
+          <p:cNvPr id="134" name="TextBox 133"/>
+          <p:cNvSpPr txBox="1"/>
+          <p:nvPr/>
+        </p:nvSpPr>
+        <p:spPr>
+          <a:xfrm>
+            <a:off x="6820262" y="3929089"/>
+            <a:ext cx="1714138" cy="954107"/>
+          </a:xfrm>
+          <a:prstGeom prst="rect">
+            <a:avLst/>
+          </a:prstGeom>
+          <a:noFill/>
+        </p:spPr>
+        <p:txBody>
+          <a:bodyPr wrap="square" rtlCol="0">
+            <a:spAutoFit/>
+          </a:bodyPr>
+          <a:lstStyle/>
+          <a:p>
+            <a:r>
+              <a:rPr lang="en-US" altLang="ko-KR" sz="800" dirty="0" smtClean="0"/>
+              <a:t>13. D</a:t>
+            </a:r>
+            <a:r>
+              <a:rPr lang="en-US" altLang="ko-KR" sz="800" dirty="0" smtClean="0"/>
+              <a:t>ecode user request with </a:t>
+            </a:r>
+            <a:br>
+              <a:rPr lang="en-US" altLang="ko-KR" sz="800" dirty="0" smtClean="0"/>
+            </a:br>
+            <a:r>
+              <a:rPr lang="en-US" altLang="ko-KR" sz="800" dirty="0" smtClean="0"/>
+              <a:t>     private cert.</a:t>
+            </a:r>
+          </a:p>
+          <a:p>
+            <a:r>
+              <a:rPr lang="en-US" altLang="ko-KR" sz="800" dirty="0" smtClean="0"/>
+              <a:t>15. Decode response with web </a:t>
+            </a:r>
+            <a:br>
+              <a:rPr lang="en-US" altLang="ko-KR" sz="800" dirty="0" smtClean="0"/>
+            </a:br>
+            <a:r>
+              <a:rPr lang="en-US" altLang="ko-KR" sz="800" dirty="0" smtClean="0"/>
+              <a:t>     server’s cert and </a:t>
+            </a:r>
+            <a:br>
+              <a:rPr lang="en-US" altLang="ko-KR" sz="800" dirty="0" smtClean="0"/>
+            </a:br>
+            <a:r>
+              <a:rPr lang="en-US" altLang="ko-KR" sz="800" dirty="0" smtClean="0"/>
+              <a:t>     encode response with </a:t>
+            </a:r>
+            <a:br>
+              <a:rPr lang="en-US" altLang="ko-KR" sz="800" dirty="0" smtClean="0"/>
+            </a:br>
+            <a:r>
+              <a:rPr lang="en-US" altLang="ko-KR" sz="800" dirty="0" smtClean="0"/>
+              <a:t>     private cert and </a:t>
+            </a:r>
+            <a:br>
+              <a:rPr lang="en-US" altLang="ko-KR" sz="800" dirty="0" smtClean="0"/>
+            </a:br>
+            <a:r>
+              <a:rPr lang="en-US" altLang="ko-KR" sz="800" dirty="0" smtClean="0"/>
+              <a:t>     send back.</a:t>
+            </a:r>
+            <a:endParaRPr lang="ko-KR" altLang="en-US" sz="800" dirty="0"/>
+          </a:p>
+        </p:txBody>
+      </p:sp>
+      <p:cxnSp>
+        <p:nvCxnSpPr>
+          <p:cNvPr id="135" name="구부러진 연결선 134"/>
+          <p:cNvCxnSpPr>
+            <a:stCxn id="131" idx="1"/>
+            <a:endCxn id="112" idx="3"/>
+          </p:cNvCxnSpPr>
+          <p:nvPr/>
+        </p:nvCxnSpPr>
+        <p:spPr>
+          <a:xfrm rot="10800000" flipV="1">
+            <a:off x="4834558" y="3694139"/>
+            <a:ext cx="1167221" cy="4357"/>
+          </a:xfrm>
+          <a:prstGeom prst="curvedConnector3">
+            <a:avLst>
+              <a:gd name="adj1" fmla="val 50000"/>
+            </a:avLst>
+          </a:prstGeom>
+          <a:ln w="28575">
+            <a:headEnd type="none" w="med" len="med"/>
+            <a:tailEnd type="triangle" w="med" len="med"/>
+          </a:ln>
+        </p:spPr>
+        <p:style>
+          <a:lnRef idx="1">
+            <a:schemeClr val="accent1"/>
+          </a:lnRef>
+          <a:fillRef idx="0">
+            <a:schemeClr val="accent1"/>
+          </a:fillRef>
+          <a:effectRef idx="0">
+            <a:schemeClr val="accent1"/>
+          </a:effectRef>
+          <a:fontRef idx="minor">
+            <a:schemeClr val="tx1"/>
+          </a:fontRef>
+        </p:style>
+      </p:cxnSp>
+      <p:sp>
+        <p:nvSpPr>
+          <p:cNvPr id="138" name="TextBox 137"/>
+          <p:cNvSpPr txBox="1"/>
+          <p:nvPr/>
+        </p:nvSpPr>
+        <p:spPr>
+          <a:xfrm>
+            <a:off x="4294509" y="3168361"/>
+            <a:ext cx="1267641" cy="338554"/>
+          </a:xfrm>
+          <a:prstGeom prst="rect">
+            <a:avLst/>
+          </a:prstGeom>
+          <a:noFill/>
+        </p:spPr>
+        <p:txBody>
+          <a:bodyPr wrap="square" rtlCol="0">
+            <a:spAutoFit/>
+          </a:bodyPr>
+          <a:lstStyle/>
+          <a:p>
+            <a:r>
+              <a:rPr lang="en-US" altLang="ko-KR" sz="800" dirty="0" smtClean="0"/>
+              <a:t>14. Record Request</a:t>
+            </a:r>
+          </a:p>
+          <a:p>
+            <a:r>
+              <a:rPr lang="en-US" altLang="ko-KR" sz="800" dirty="0" smtClean="0"/>
+              <a:t>16. Record Response</a:t>
+            </a:r>
+            <a:endParaRPr lang="ko-KR" altLang="en-US" sz="800" dirty="0"/>
+          </a:p>
+        </p:txBody>
+      </p:sp>
+      <p:cxnSp>
+        <p:nvCxnSpPr>
+          <p:cNvPr id="139" name="구부러진 연결선 138"/>
+          <p:cNvCxnSpPr>
+            <a:stCxn id="131" idx="2"/>
+            <a:endCxn id="167" idx="0"/>
+          </p:cNvCxnSpPr>
+          <p:nvPr/>
+        </p:nvCxnSpPr>
+        <p:spPr>
+          <a:xfrm rot="5400000">
+            <a:off x="5567239" y="4134123"/>
+            <a:ext cx="1446022" cy="947056"/>
+          </a:xfrm>
+          <a:prstGeom prst="curvedConnector3">
+            <a:avLst>
+              <a:gd name="adj1" fmla="val 50000"/>
+            </a:avLst>
+          </a:prstGeom>
+          <a:ln w="28575">
+            <a:solidFill>
+              <a:schemeClr val="accent6">
+                <a:lumMod val="75000"/>
+              </a:schemeClr>
+            </a:solidFill>
+            <a:headEnd type="none" w="med" len="med"/>
+            <a:tailEnd type="triangle" w="med" len="med"/>
+          </a:ln>
+        </p:spPr>
+        <p:style>
+          <a:lnRef idx="1">
+            <a:schemeClr val="accent1"/>
+          </a:lnRef>
+          <a:fillRef idx="0">
+            <a:schemeClr val="accent1"/>
+          </a:fillRef>
+          <a:effectRef idx="0">
+            <a:schemeClr val="accent1"/>
+          </a:effectRef>
+          <a:fontRef idx="minor">
+            <a:schemeClr val="tx1"/>
+          </a:fontRef>
+        </p:style>
+      </p:cxnSp>
+      <p:sp>
+        <p:nvSpPr>
+          <p:cNvPr id="148" name="모서리가 둥근 직사각형 147"/>
+          <p:cNvSpPr/>
+          <p:nvPr/>
+        </p:nvSpPr>
+        <p:spPr>
+          <a:xfrm>
+            <a:off x="2286000" y="4416278"/>
+            <a:ext cx="2223830" cy="381000"/>
+          </a:xfrm>
+          <a:prstGeom prst="roundRect">
+            <a:avLst/>
+          </a:prstGeom>
+        </p:spPr>
+        <p:style>
+          <a:lnRef idx="1">
+            <a:schemeClr val="accent4"/>
+          </a:lnRef>
+          <a:fillRef idx="3">
+            <a:schemeClr val="accent4"/>
+          </a:fillRef>
+          <a:effectRef idx="2">
+            <a:schemeClr val="accent4"/>
+          </a:effectRef>
+          <a:fontRef idx="minor">
+            <a:schemeClr val="lt1"/>
+          </a:fontRef>
+        </p:style>
+        <p:txBody>
+          <a:bodyPr rtlCol="0" anchor="ctr"/>
+          <a:lstStyle/>
+          <a:p>
+            <a:pPr algn="ctr"/>
+            <a:r>
+              <a:rPr lang="en-US" altLang="ko-KR" sz="1100" dirty="0" smtClean="0">
+                <a:latin typeface="+mn-ea"/>
+              </a:rPr>
+              <a:t>HTTPRecording</a:t>
+            </a:r>
+            <a:r>
+              <a:rPr lang="en-US" altLang="ko-KR" sz="1100" dirty="0" smtClean="0">
+                <a:latin typeface="+mn-ea"/>
+              </a:rPr>
+              <a:t>Result</a:t>
+            </a:r>
+            <a:br>
+              <a:rPr lang="en-US" altLang="ko-KR" sz="1100" dirty="0" smtClean="0">
+                <a:latin typeface="+mn-ea"/>
+              </a:rPr>
+            </a:br>
+            <a:r>
+              <a:rPr lang="en-US" altLang="ko-KR" sz="1100" dirty="0" smtClean="0">
+                <a:latin typeface="+mn-ea"/>
+              </a:rPr>
+              <a:t>ProcessorWithFreeMarker</a:t>
+            </a:r>
+            <a:endParaRPr lang="ko-KR" altLang="en-US" sz="1100" dirty="0">
+              <a:latin typeface="+mn-ea"/>
+            </a:endParaRPr>
+          </a:p>
+        </p:txBody>
+      </p:sp>
+      <p:cxnSp>
+        <p:nvCxnSpPr>
+          <p:cNvPr id="153" name="구부러진 연결선 152"/>
+          <p:cNvCxnSpPr>
+            <a:stCxn id="112" idx="2"/>
+            <a:endCxn id="148" idx="0"/>
+          </p:cNvCxnSpPr>
+          <p:nvPr/>
+        </p:nvCxnSpPr>
+        <p:spPr>
+          <a:xfrm rot="5400000">
+            <a:off x="3471596" y="3815316"/>
+            <a:ext cx="527281" cy="674642"/>
+          </a:xfrm>
+          <a:prstGeom prst="curvedConnector3">
+            <a:avLst>
+              <a:gd name="adj1" fmla="val 50000"/>
+            </a:avLst>
+          </a:prstGeom>
+          <a:ln w="28575">
+            <a:headEnd type="none" w="med" len="med"/>
+            <a:tailEnd type="triangle" w="med" len="med"/>
+          </a:ln>
+        </p:spPr>
+        <p:style>
+          <a:lnRef idx="1">
+            <a:schemeClr val="accent1"/>
+          </a:lnRef>
+          <a:fillRef idx="0">
+            <a:schemeClr val="accent1"/>
+          </a:fillRef>
+          <a:effectRef idx="0">
+            <a:schemeClr val="accent1"/>
+          </a:effectRef>
+          <a:fontRef idx="minor">
+            <a:schemeClr val="tx1"/>
+          </a:fontRef>
+        </p:style>
+      </p:cxnSp>
+      <p:sp>
+        <p:nvSpPr>
+          <p:cNvPr id="159" name="TextBox 158"/>
+          <p:cNvSpPr txBox="1"/>
+          <p:nvPr/>
+        </p:nvSpPr>
+        <p:spPr>
+          <a:xfrm>
+            <a:off x="1561426" y="3831503"/>
+            <a:ext cx="1992556" cy="584775"/>
+          </a:xfrm>
+          <a:prstGeom prst="rect">
+            <a:avLst/>
+          </a:prstGeom>
+          <a:noFill/>
+        </p:spPr>
+        <p:txBody>
+          <a:bodyPr wrap="square" rtlCol="0">
+            <a:spAutoFit/>
+          </a:bodyPr>
+          <a:lstStyle/>
+          <a:p>
+            <a:r>
+              <a:rPr lang="en-US" altLang="ko-KR" sz="800" dirty="0" smtClean="0"/>
+              <a:t>19. Filter requests with connection</a:t>
+            </a:r>
+            <a:r>
+              <a:rPr lang="en-US" altLang="ko-KR" sz="800" dirty="0" smtClean="0"/>
+              <a:t> </a:t>
+            </a:r>
+            <a:br>
+              <a:rPr lang="en-US" altLang="ko-KR" sz="800" dirty="0" smtClean="0"/>
+            </a:br>
+            <a:r>
+              <a:rPr lang="en-US" altLang="ko-KR" sz="800" dirty="0" smtClean="0"/>
+              <a:t>     again and</a:t>
+            </a:r>
+            <a:r>
+              <a:rPr lang="en-US" altLang="ko-KR" sz="800" dirty="0" smtClean="0"/>
+              <a:t> analyze the relation </a:t>
+            </a:r>
+            <a:br>
+              <a:rPr lang="en-US" altLang="ko-KR" sz="800" dirty="0" smtClean="0"/>
+            </a:br>
+            <a:r>
+              <a:rPr lang="en-US" altLang="ko-KR" sz="800" dirty="0" smtClean="0"/>
+              <a:t>     b/w requests</a:t>
+            </a:r>
+          </a:p>
+          <a:p>
+            <a:endParaRPr lang="ko-KR" altLang="en-US" sz="800" dirty="0"/>
+          </a:p>
+        </p:txBody>
+      </p:sp>
+      <p:sp>
+        <p:nvSpPr>
+          <p:cNvPr id="166" name="TextBox 165"/>
+          <p:cNvSpPr txBox="1"/>
+          <p:nvPr/>
+        </p:nvSpPr>
+        <p:spPr>
+          <a:xfrm>
+            <a:off x="2557764" y="4843046"/>
+            <a:ext cx="1992556" cy="338554"/>
+          </a:xfrm>
+          <a:prstGeom prst="rect">
+            <a:avLst/>
+          </a:prstGeom>
+          <a:noFill/>
+        </p:spPr>
+        <p:txBody>
+          <a:bodyPr wrap="square" rtlCol="0">
+            <a:spAutoFit/>
+          </a:bodyPr>
+          <a:lstStyle/>
+          <a:p>
+            <a:r>
+              <a:rPr lang="en-US" altLang="ko-KR" sz="800" dirty="0" smtClean="0"/>
+              <a:t>20. Generate script with template</a:t>
+            </a:r>
+          </a:p>
+          <a:p>
+            <a:endParaRPr lang="ko-KR" altLang="en-US" sz="800" dirty="0"/>
+          </a:p>
+        </p:txBody>
+      </p:sp>
+      <p:sp>
+        <p:nvSpPr>
+          <p:cNvPr id="167" name="모서리가 둥근 직사각형 166"/>
+          <p:cNvSpPr/>
+          <p:nvPr/>
+        </p:nvSpPr>
+        <p:spPr>
+          <a:xfrm>
+            <a:off x="4952999" y="5330662"/>
+            <a:ext cx="1727446" cy="765338"/>
+          </a:xfrm>
+          <a:prstGeom prst="roundRect">
+            <a:avLst>
+              <a:gd name="adj" fmla="val 13454"/>
+            </a:avLst>
+          </a:prstGeom>
+          <a:solidFill>
+            <a:schemeClr val="accent1">
+              <a:lumMod val="40000"/>
+              <a:lumOff val="60000"/>
+            </a:schemeClr>
+          </a:solidFill>
+          <a:ln>
+            <a:noFill/>
+          </a:ln>
+        </p:spPr>
+        <p:style>
+          <a:lnRef idx="2">
+            <a:schemeClr val="accent1">
+              <a:shade val="50000"/>
+            </a:schemeClr>
+          </a:lnRef>
+          <a:fillRef idx="1">
+            <a:schemeClr val="accent1"/>
+          </a:fillRef>
+          <a:effectRef idx="0">
+            <a:schemeClr val="accent1"/>
+          </a:effectRef>
+          <a:fontRef idx="minor">
+            <a:schemeClr val="lt1"/>
+          </a:fontRef>
+        </p:style>
+        <p:txBody>
+          <a:bodyPr rtlCol="0" anchor="ctr"/>
+          <a:lstStyle/>
+          <a:p>
+            <a:pPr algn="ctr"/>
+            <a:r>
+              <a:rPr lang="en-US" altLang="ko-KR" sz="1100" dirty="0" smtClean="0">
+                <a:solidFill>
+                  <a:schemeClr val="tx1"/>
+                </a:solidFill>
+              </a:rPr>
+              <a:t>Web Server</a:t>
+            </a:r>
+            <a:endParaRPr lang="en-US" altLang="ko-KR" sz="1100" dirty="0" smtClean="0">
+              <a:solidFill>
+                <a:schemeClr val="tx1"/>
+              </a:solidFill>
+            </a:endParaRPr>
+          </a:p>
+          <a:p>
+            <a:pPr algn="ctr"/>
+            <a:endParaRPr lang="en-US" altLang="ko-KR" sz="1100" dirty="0" smtClean="0">
+              <a:solidFill>
+                <a:schemeClr val="tx1"/>
+              </a:solidFill>
+            </a:endParaRPr>
+          </a:p>
+          <a:p>
+            <a:pPr algn="ctr"/>
+            <a:endParaRPr lang="en-US" altLang="ko-KR" sz="1100" dirty="0">
+              <a:solidFill>
+                <a:schemeClr val="tx1"/>
+              </a:solidFill>
+            </a:endParaRPr>
+          </a:p>
+          <a:p>
+            <a:pPr algn="ctr"/>
+            <a:endParaRPr lang="ko-KR" altLang="en-US" sz="1100" dirty="0">
+              <a:solidFill>
+                <a:schemeClr val="tx1"/>
+              </a:solidFill>
+            </a:endParaRPr>
+          </a:p>
+        </p:txBody>
+      </p:sp>
+      <p:pic>
+        <p:nvPicPr>
+          <p:cNvPr id="168" name="Picture 5" descr="C:\Users\junoyoon\AppData\Local\Microsoft\Windows\Temporary Internet Files\Content.IE5\6EG7NM5I\MC900428971[1].wmf"/>
+          <p:cNvPicPr>
+            <a:picLocks noChangeAspect="1" noChangeArrowheads="1"/>
+          </p:cNvPicPr>
+          <p:nvPr/>
+        </p:nvPicPr>
+        <p:blipFill>
+          <a:blip r:embed="rId4" cstate="print">
+            <a:extLst>
+              <a:ext uri="{28A0092B-C50C-407E-A947-70E740481C1C}">
+                <a14:useLocalDpi xmlns:a14="http://schemas.microsoft.com/office/drawing/2010/main" val="0"/>
+              </a:ext>
+            </a:extLst>
+          </a:blip>
+          <a:srcRect/>
+          <a:stretch>
+            <a:fillRect/>
+          </a:stretch>
+        </p:blipFill>
+        <p:spPr bwMode="auto">
+          <a:xfrm>
+            <a:off x="5747316" y="5536621"/>
+            <a:ext cx="382813" cy="559379"/>
+          </a:xfrm>
+          <a:prstGeom prst="rect">
+            <a:avLst/>
+          </a:prstGeom>
+          <a:noFill/>
+          <a:extLst>
+            <a:ext uri="{909E8E84-426E-40DD-AFC4-6F175D3DCCD1}">
+              <a14:hiddenFill xmlns:a14="http://schemas.microsoft.com/office/drawing/2010/main">
+                <a:solidFill>
+                  <a:srgbClr val="FFFFFF"/>
+                </a:solidFill>
+              </a14:hiddenFill>
+            </a:ext>
+          </a:extLst>
+        </p:spPr>
+      </p:pic>
+      <p:grpSp>
+        <p:nvGrpSpPr>
+          <p:cNvPr id="1050" name="그룹 1049"/>
+          <p:cNvGrpSpPr/>
+          <p:nvPr/>
+        </p:nvGrpSpPr>
+        <p:grpSpPr>
+          <a:xfrm>
+            <a:off x="6629400" y="2819400"/>
+            <a:ext cx="642181" cy="385357"/>
+            <a:chOff x="6553200" y="2891243"/>
+            <a:chExt cx="642181" cy="385357"/>
+          </a:xfrm>
+        </p:grpSpPr>
+        <p:pic>
+          <p:nvPicPr>
+            <p:cNvPr id="173" name="Picture 5" descr="http://www.open-ministry.org/images/certificate_icon_small.jpg"/>
+            <p:cNvPicPr>
+              <a:picLocks noChangeAspect="1" noChangeArrowheads="1"/>
+            </p:cNvPicPr>
+            <p:nvPr/>
+          </p:nvPicPr>
+          <p:blipFill>
+            <a:blip r:embed="rId5" cstate="print">
+              <a:extLst>
+                <a:ext uri="{28A0092B-C50C-407E-A947-70E740481C1C}">
+                  <a14:useLocalDpi xmlns:a14="http://schemas.microsoft.com/office/drawing/2010/main" val="0"/>
+                </a:ext>
+              </a:extLst>
+            </a:blip>
+            <a:srcRect/>
+            <a:stretch>
+              <a:fillRect/>
+            </a:stretch>
+          </p:blipFill>
+          <p:spPr bwMode="auto">
+            <a:xfrm>
+              <a:off x="6609999" y="2891243"/>
+              <a:ext cx="385357" cy="385357"/>
+            </a:xfrm>
+            <a:prstGeom prst="rect">
+              <a:avLst/>
+            </a:prstGeom>
+            <a:noFill/>
+            <a:extLst>
+              <a:ext uri="{909E8E84-426E-40DD-AFC4-6F175D3DCCD1}">
+                <a14:hiddenFill xmlns:a14="http://schemas.microsoft.com/office/drawing/2010/main">
+                  <a:solidFill>
+                    <a:srgbClr val="FFFFFF"/>
+                  </a:solidFill>
+                </a14:hiddenFill>
+              </a:ext>
+            </a:extLst>
+          </p:spPr>
+        </p:pic>
+        <p:sp>
+          <p:nvSpPr>
+            <p:cNvPr id="1049" name="TextBox 1048"/>
+            <p:cNvSpPr txBox="1"/>
+            <p:nvPr/>
+          </p:nvSpPr>
+          <p:spPr>
+            <a:xfrm>
+              <a:off x="6553200" y="2894874"/>
+              <a:ext cx="642181" cy="215444"/>
+            </a:xfrm>
+            <a:prstGeom prst="rect">
+              <a:avLst/>
+            </a:prstGeom>
+            <a:noFill/>
+          </p:spPr>
+          <p:txBody>
+            <a:bodyPr wrap="square" rtlCol="0">
+              <a:spAutoFit/>
+            </a:bodyPr>
+            <a:lstStyle/>
+            <a:p>
+              <a:r>
+                <a:rPr lang="en-US" altLang="ko-KR" sz="800" dirty="0" smtClean="0"/>
+                <a:t>private</a:t>
+              </a:r>
+              <a:endParaRPr lang="ko-KR" altLang="en-US" sz="800" dirty="0"/>
+            </a:p>
+          </p:txBody>
+        </p:sp>
+      </p:grpSp>
+      <p:grpSp>
+        <p:nvGrpSpPr>
+          <p:cNvPr id="176" name="그룹 175"/>
+          <p:cNvGrpSpPr/>
+          <p:nvPr/>
+        </p:nvGrpSpPr>
+        <p:grpSpPr>
+          <a:xfrm>
+            <a:off x="6299395" y="4643843"/>
+            <a:ext cx="642181" cy="385357"/>
+            <a:chOff x="6553200" y="2891243"/>
+            <a:chExt cx="642181" cy="385357"/>
+          </a:xfrm>
+        </p:grpSpPr>
+        <p:pic>
+          <p:nvPicPr>
+            <p:cNvPr id="177" name="Picture 5" descr="http://www.open-ministry.org/images/certificate_icon_small.jpg"/>
+            <p:cNvPicPr>
+              <a:picLocks noChangeAspect="1" noChangeArrowheads="1"/>
+            </p:cNvPicPr>
+            <p:nvPr/>
+          </p:nvPicPr>
+          <p:blipFill>
+            <a:blip r:embed="rId5" cstate="print">
+              <a:extLst>
+                <a:ext uri="{28A0092B-C50C-407E-A947-70E740481C1C}">
+                  <a14:useLocalDpi xmlns:a14="http://schemas.microsoft.com/office/drawing/2010/main" val="0"/>
+                </a:ext>
+              </a:extLst>
+            </a:blip>
+            <a:srcRect/>
+            <a:stretch>
+              <a:fillRect/>
+            </a:stretch>
+          </p:blipFill>
+          <p:spPr bwMode="auto">
+            <a:xfrm>
+              <a:off x="6609999" y="2891243"/>
+              <a:ext cx="385357" cy="385357"/>
+            </a:xfrm>
+            <a:prstGeom prst="rect">
+              <a:avLst/>
+            </a:prstGeom>
+            <a:noFill/>
+            <a:extLst>
+              <a:ext uri="{909E8E84-426E-40DD-AFC4-6F175D3DCCD1}">
+                <a14:hiddenFill xmlns:a14="http://schemas.microsoft.com/office/drawing/2010/main">
+                  <a:solidFill>
+                    <a:srgbClr val="FFFFFF"/>
+                  </a:solidFill>
+                </a14:hiddenFill>
+              </a:ext>
+            </a:extLst>
+          </p:spPr>
+        </p:pic>
+        <p:sp>
+          <p:nvSpPr>
+            <p:cNvPr id="178" name="TextBox 177"/>
+            <p:cNvSpPr txBox="1"/>
+            <p:nvPr/>
+          </p:nvSpPr>
+          <p:spPr>
+            <a:xfrm>
+              <a:off x="6553200" y="2894874"/>
+              <a:ext cx="642181" cy="215444"/>
+            </a:xfrm>
+            <a:prstGeom prst="rect">
+              <a:avLst/>
+            </a:prstGeom>
+            <a:noFill/>
+          </p:spPr>
+          <p:txBody>
+            <a:bodyPr wrap="square" rtlCol="0">
+              <a:spAutoFit/>
+            </a:bodyPr>
+            <a:lstStyle/>
+            <a:p>
+              <a:r>
+                <a:rPr lang="en-US" altLang="ko-KR" sz="800" dirty="0" smtClean="0"/>
+                <a:t>public</a:t>
+              </a:r>
+              <a:endParaRPr lang="ko-KR" altLang="en-US" sz="800" dirty="0"/>
+            </a:p>
+          </p:txBody>
+        </p:sp>
+      </p:grpSp>
+    </p:spTree>
+    <p:extLst>
+      <p:ext uri="{BB962C8B-B14F-4D97-AF65-F5344CB8AC3E}">
+        <p14:creationId xmlns:p14="http://schemas.microsoft.com/office/powerpoint/2010/main" val="1433215706"/>
       </p:ext>
     </p:extLst>
   </p:cSld>

</xml_diff>